<commit_message>
Updated diagram on July 18, with essential processes & html pages.
</commit_message>
<xml_diff>
--- a/JHP_Design.pptx
+++ b/JHP_Design.pptx
@@ -259,7 +259,7 @@
           <a:p>
             <a:fld id="{65F3756F-6BA0-BE41-9226-AD7D2B2262FF}" type="datetimeFigureOut">
               <a:rPr lang="en-US" smtClean="0"/>
-              <a:t>7/13/20</a:t>
+              <a:t>7/18/20</a:t>
             </a:fld>
             <a:endParaRPr lang="en-US"/>
           </a:p>
@@ -457,7 +457,7 @@
           <a:p>
             <a:fld id="{65F3756F-6BA0-BE41-9226-AD7D2B2262FF}" type="datetimeFigureOut">
               <a:rPr lang="en-US" smtClean="0"/>
-              <a:t>7/13/20</a:t>
+              <a:t>7/18/20</a:t>
             </a:fld>
             <a:endParaRPr lang="en-US"/>
           </a:p>
@@ -665,7 +665,7 @@
           <a:p>
             <a:fld id="{65F3756F-6BA0-BE41-9226-AD7D2B2262FF}" type="datetimeFigureOut">
               <a:rPr lang="en-US" smtClean="0"/>
-              <a:t>7/13/20</a:t>
+              <a:t>7/18/20</a:t>
             </a:fld>
             <a:endParaRPr lang="en-US"/>
           </a:p>
@@ -863,7 +863,7 @@
           <a:p>
             <a:fld id="{65F3756F-6BA0-BE41-9226-AD7D2B2262FF}" type="datetimeFigureOut">
               <a:rPr lang="en-US" smtClean="0"/>
-              <a:t>7/13/20</a:t>
+              <a:t>7/18/20</a:t>
             </a:fld>
             <a:endParaRPr lang="en-US"/>
           </a:p>
@@ -1138,7 +1138,7 @@
           <a:p>
             <a:fld id="{65F3756F-6BA0-BE41-9226-AD7D2B2262FF}" type="datetimeFigureOut">
               <a:rPr lang="en-US" smtClean="0"/>
-              <a:t>7/13/20</a:t>
+              <a:t>7/18/20</a:t>
             </a:fld>
             <a:endParaRPr lang="en-US"/>
           </a:p>
@@ -1403,7 +1403,7 @@
           <a:p>
             <a:fld id="{65F3756F-6BA0-BE41-9226-AD7D2B2262FF}" type="datetimeFigureOut">
               <a:rPr lang="en-US" smtClean="0"/>
-              <a:t>7/13/20</a:t>
+              <a:t>7/18/20</a:t>
             </a:fld>
             <a:endParaRPr lang="en-US"/>
           </a:p>
@@ -1815,7 +1815,7 @@
           <a:p>
             <a:fld id="{65F3756F-6BA0-BE41-9226-AD7D2B2262FF}" type="datetimeFigureOut">
               <a:rPr lang="en-US" smtClean="0"/>
-              <a:t>7/13/20</a:t>
+              <a:t>7/18/20</a:t>
             </a:fld>
             <a:endParaRPr lang="en-US"/>
           </a:p>
@@ -1956,7 +1956,7 @@
           <a:p>
             <a:fld id="{65F3756F-6BA0-BE41-9226-AD7D2B2262FF}" type="datetimeFigureOut">
               <a:rPr lang="en-US" smtClean="0"/>
-              <a:t>7/13/20</a:t>
+              <a:t>7/18/20</a:t>
             </a:fld>
             <a:endParaRPr lang="en-US"/>
           </a:p>
@@ -2069,7 +2069,7 @@
           <a:p>
             <a:fld id="{65F3756F-6BA0-BE41-9226-AD7D2B2262FF}" type="datetimeFigureOut">
               <a:rPr lang="en-US" smtClean="0"/>
-              <a:t>7/13/20</a:t>
+              <a:t>7/18/20</a:t>
             </a:fld>
             <a:endParaRPr lang="en-US"/>
           </a:p>
@@ -2380,7 +2380,7 @@
           <a:p>
             <a:fld id="{65F3756F-6BA0-BE41-9226-AD7D2B2262FF}" type="datetimeFigureOut">
               <a:rPr lang="en-US" smtClean="0"/>
-              <a:t>7/13/20</a:t>
+              <a:t>7/18/20</a:t>
             </a:fld>
             <a:endParaRPr lang="en-US"/>
           </a:p>
@@ -2668,7 +2668,7 @@
           <a:p>
             <a:fld id="{65F3756F-6BA0-BE41-9226-AD7D2B2262FF}" type="datetimeFigureOut">
               <a:rPr lang="en-US" smtClean="0"/>
-              <a:t>7/13/20</a:t>
+              <a:t>7/18/20</a:t>
             </a:fld>
             <a:endParaRPr lang="en-US"/>
           </a:p>
@@ -2909,7 +2909,7 @@
           <a:p>
             <a:fld id="{65F3756F-6BA0-BE41-9226-AD7D2B2262FF}" type="datetimeFigureOut">
               <a:rPr lang="en-US" smtClean="0"/>
-              <a:t>7/13/20</a:t>
+              <a:t>7/18/20</a:t>
             </a:fld>
             <a:endParaRPr lang="en-US"/>
           </a:p>
@@ -3326,6 +3326,231 @@
           <a:chExt cx="0" cy="0"/>
         </a:xfrm>
       </p:grpSpPr>
+      <p:sp>
+        <p:nvSpPr>
+          <p:cNvPr id="82" name="Oval 81">
+            <a:extLst>
+              <a:ext uri="{FF2B5EF4-FFF2-40B4-BE49-F238E27FC236}">
+                <a16:creationId xmlns:a16="http://schemas.microsoft.com/office/drawing/2014/main" id="{559677F5-E2CA-2741-B80D-BCC657ADBC31}"/>
+              </a:ext>
+            </a:extLst>
+          </p:cNvPr>
+          <p:cNvSpPr/>
+          <p:nvPr/>
+        </p:nvSpPr>
+        <p:spPr>
+          <a:xfrm>
+            <a:off x="1968353" y="-58941"/>
+            <a:ext cx="4785873" cy="1079687"/>
+          </a:xfrm>
+          <a:prstGeom prst="ellipse">
+            <a:avLst/>
+          </a:prstGeom>
+          <a:solidFill>
+            <a:schemeClr val="bg1">
+              <a:lumMod val="85000"/>
+            </a:schemeClr>
+          </a:solidFill>
+        </p:spPr>
+        <p:style>
+          <a:lnRef idx="2">
+            <a:schemeClr val="accent1">
+              <a:shade val="50000"/>
+            </a:schemeClr>
+          </a:lnRef>
+          <a:fillRef idx="1">
+            <a:schemeClr val="accent1"/>
+          </a:fillRef>
+          <a:effectRef idx="0">
+            <a:schemeClr val="accent1"/>
+          </a:effectRef>
+          <a:fontRef idx="minor">
+            <a:schemeClr val="lt1"/>
+          </a:fontRef>
+        </p:style>
+        <p:txBody>
+          <a:bodyPr rtlCol="0" anchor="ctr"/>
+          <a:lstStyle/>
+          <a:p>
+            <a:pPr algn="ctr"/>
+            <a:endParaRPr lang="en-US" dirty="0"/>
+          </a:p>
+        </p:txBody>
+      </p:sp>
+      <p:sp>
+        <p:nvSpPr>
+          <p:cNvPr id="83" name="TextBox 82">
+            <a:extLst>
+              <a:ext uri="{FF2B5EF4-FFF2-40B4-BE49-F238E27FC236}">
+                <a16:creationId xmlns:a16="http://schemas.microsoft.com/office/drawing/2014/main" id="{B84AA3E1-9C69-0745-BFB2-4C232B2E2713}"/>
+              </a:ext>
+            </a:extLst>
+          </p:cNvPr>
+          <p:cNvSpPr txBox="1"/>
+          <p:nvPr/>
+        </p:nvSpPr>
+        <p:spPr>
+          <a:xfrm>
+            <a:off x="3844330" y="-85506"/>
+            <a:ext cx="1351924" cy="246221"/>
+          </a:xfrm>
+          <a:prstGeom prst="rect">
+            <a:avLst/>
+          </a:prstGeom>
+          <a:noFill/>
+        </p:spPr>
+        <p:txBody>
+          <a:bodyPr wrap="square" rtlCol="0">
+            <a:spAutoFit/>
+          </a:bodyPr>
+          <a:lstStyle/>
+          <a:p>
+            <a:r>
+              <a:rPr lang="en-US" sz="1000" dirty="0" err="1"/>
+              <a:t>Admin.html</a:t>
+            </a:r>
+            <a:endParaRPr lang="en-US" sz="1000" dirty="0"/>
+          </a:p>
+        </p:txBody>
+      </p:sp>
+      <p:sp>
+        <p:nvSpPr>
+          <p:cNvPr id="78" name="Oval 77">
+            <a:extLst>
+              <a:ext uri="{FF2B5EF4-FFF2-40B4-BE49-F238E27FC236}">
+                <a16:creationId xmlns:a16="http://schemas.microsoft.com/office/drawing/2014/main" id="{D0FCAD9C-4A09-0347-B146-6B5F58C105ED}"/>
+              </a:ext>
+            </a:extLst>
+          </p:cNvPr>
+          <p:cNvSpPr/>
+          <p:nvPr/>
+        </p:nvSpPr>
+        <p:spPr>
+          <a:xfrm>
+            <a:off x="909984" y="1619821"/>
+            <a:ext cx="2516650" cy="2093204"/>
+          </a:xfrm>
+          <a:prstGeom prst="ellipse">
+            <a:avLst/>
+          </a:prstGeom>
+          <a:solidFill>
+            <a:schemeClr val="bg1">
+              <a:lumMod val="85000"/>
+            </a:schemeClr>
+          </a:solidFill>
+        </p:spPr>
+        <p:style>
+          <a:lnRef idx="2">
+            <a:schemeClr val="accent1">
+              <a:shade val="50000"/>
+            </a:schemeClr>
+          </a:lnRef>
+          <a:fillRef idx="1">
+            <a:schemeClr val="accent1"/>
+          </a:fillRef>
+          <a:effectRef idx="0">
+            <a:schemeClr val="accent1"/>
+          </a:effectRef>
+          <a:fontRef idx="minor">
+            <a:schemeClr val="lt1"/>
+          </a:fontRef>
+        </p:style>
+        <p:txBody>
+          <a:bodyPr rtlCol="0" anchor="ctr"/>
+          <a:lstStyle/>
+          <a:p>
+            <a:pPr algn="ctr"/>
+            <a:endParaRPr lang="en-US" dirty="0"/>
+          </a:p>
+        </p:txBody>
+      </p:sp>
+      <p:sp>
+        <p:nvSpPr>
+          <p:cNvPr id="79" name="TextBox 78">
+            <a:extLst>
+              <a:ext uri="{FF2B5EF4-FFF2-40B4-BE49-F238E27FC236}">
+                <a16:creationId xmlns:a16="http://schemas.microsoft.com/office/drawing/2014/main" id="{437A9EDE-F974-6B48-98A8-D723F6274817}"/>
+              </a:ext>
+            </a:extLst>
+          </p:cNvPr>
+          <p:cNvSpPr txBox="1"/>
+          <p:nvPr/>
+        </p:nvSpPr>
+        <p:spPr>
+          <a:xfrm>
+            <a:off x="1590125" y="1742972"/>
+            <a:ext cx="1396536" cy="246221"/>
+          </a:xfrm>
+          <a:prstGeom prst="rect">
+            <a:avLst/>
+          </a:prstGeom>
+          <a:noFill/>
+        </p:spPr>
+        <p:txBody>
+          <a:bodyPr wrap="none" rtlCol="0">
+            <a:spAutoFit/>
+          </a:bodyPr>
+          <a:lstStyle/>
+          <a:p>
+            <a:r>
+              <a:rPr lang="en-US" sz="1000" dirty="0" err="1"/>
+              <a:t>PoolTeamRegistry.html</a:t>
+            </a:r>
+            <a:endParaRPr lang="en-US" sz="1000" dirty="0"/>
+          </a:p>
+        </p:txBody>
+      </p:sp>
+      <p:sp>
+        <p:nvSpPr>
+          <p:cNvPr id="26" name="Oval 25">
+            <a:extLst>
+              <a:ext uri="{FF2B5EF4-FFF2-40B4-BE49-F238E27FC236}">
+                <a16:creationId xmlns:a16="http://schemas.microsoft.com/office/drawing/2014/main" id="{5E38BE2B-8ACA-9B4C-B8CB-F86438AE840D}"/>
+              </a:ext>
+            </a:extLst>
+          </p:cNvPr>
+          <p:cNvSpPr/>
+          <p:nvPr/>
+        </p:nvSpPr>
+        <p:spPr>
+          <a:xfrm>
+            <a:off x="7944873" y="62418"/>
+            <a:ext cx="2516650" cy="2093204"/>
+          </a:xfrm>
+          <a:prstGeom prst="ellipse">
+            <a:avLst/>
+          </a:prstGeom>
+          <a:solidFill>
+            <a:schemeClr val="bg1">
+              <a:lumMod val="85000"/>
+            </a:schemeClr>
+          </a:solidFill>
+        </p:spPr>
+        <p:style>
+          <a:lnRef idx="2">
+            <a:schemeClr val="accent1">
+              <a:shade val="50000"/>
+            </a:schemeClr>
+          </a:lnRef>
+          <a:fillRef idx="1">
+            <a:schemeClr val="accent1"/>
+          </a:fillRef>
+          <a:effectRef idx="0">
+            <a:schemeClr val="accent1"/>
+          </a:effectRef>
+          <a:fontRef idx="minor">
+            <a:schemeClr val="lt1"/>
+          </a:fontRef>
+        </p:style>
+        <p:txBody>
+          <a:bodyPr rtlCol="0" anchor="ctr"/>
+          <a:lstStyle/>
+          <a:p>
+            <a:pPr algn="ctr"/>
+            <a:endParaRPr lang="en-US" dirty="0"/>
+          </a:p>
+        </p:txBody>
+      </p:sp>
       <p:grpSp>
         <p:nvGrpSpPr>
           <p:cNvPr id="7" name="Group 6">
@@ -3523,76 +3748,6 @@
       </p:grpSp>
       <p:sp>
         <p:nvSpPr>
-          <p:cNvPr id="8" name="Oval 7">
-            <a:extLst>
-              <a:ext uri="{FF2B5EF4-FFF2-40B4-BE49-F238E27FC236}">
-                <a16:creationId xmlns:a16="http://schemas.microsoft.com/office/drawing/2014/main" id="{0CF7FAF7-E620-BE47-B41E-1182D2321F4A}"/>
-              </a:ext>
-            </a:extLst>
-          </p:cNvPr>
-          <p:cNvSpPr/>
-          <p:nvPr/>
-        </p:nvSpPr>
-        <p:spPr>
-          <a:xfrm>
-            <a:off x="8126300" y="999521"/>
-            <a:ext cx="2074537" cy="432881"/>
-          </a:xfrm>
-          <a:prstGeom prst="ellipse">
-            <a:avLst/>
-          </a:prstGeom>
-          <a:solidFill>
-            <a:schemeClr val="accent4">
-              <a:lumMod val="75000"/>
-            </a:schemeClr>
-          </a:solidFill>
-          <a:ln>
-            <a:solidFill>
-              <a:schemeClr val="accent4">
-                <a:lumMod val="50000"/>
-              </a:schemeClr>
-            </a:solidFill>
-          </a:ln>
-        </p:spPr>
-        <p:style>
-          <a:lnRef idx="2">
-            <a:schemeClr val="accent1">
-              <a:shade val="50000"/>
-            </a:schemeClr>
-          </a:lnRef>
-          <a:fillRef idx="1">
-            <a:schemeClr val="accent1"/>
-          </a:fillRef>
-          <a:effectRef idx="0">
-            <a:schemeClr val="accent1"/>
-          </a:effectRef>
-          <a:fontRef idx="minor">
-            <a:schemeClr val="lt1"/>
-          </a:fontRef>
-        </p:style>
-        <p:txBody>
-          <a:bodyPr rtlCol="0" anchor="ctr"/>
-          <a:lstStyle/>
-          <a:p>
-            <a:pPr algn="ctr"/>
-            <a:endParaRPr lang="en-US" sz="1200" dirty="0"/>
-          </a:p>
-          <a:p>
-            <a:pPr algn="ctr"/>
-            <a:r>
-              <a:rPr lang="en-US" sz="1400" dirty="0" err="1"/>
-              <a:t>PlayersUpdate.py</a:t>
-            </a:r>
-            <a:endParaRPr lang="en-US" sz="1400" dirty="0"/>
-          </a:p>
-          <a:p>
-            <a:pPr algn="ctr"/>
-            <a:endParaRPr lang="en-US" dirty="0"/>
-          </a:p>
-        </p:txBody>
-      </p:sp>
-      <p:sp>
-        <p:nvSpPr>
           <p:cNvPr id="9" name="Cloud 8">
             <a:extLst>
               <a:ext uri="{FF2B5EF4-FFF2-40B4-BE49-F238E27FC236}">
@@ -3669,10 +3824,9 @@
           <a:lstStyle/>
           <a:p>
             <a:r>
-              <a:rPr lang="en-US" dirty="0" err="1"/>
+              <a:rPr lang="en-US" dirty="0"/>
               <a:t>playersDB</a:t>
             </a:r>
-            <a:endParaRPr lang="en-US" dirty="0"/>
           </a:p>
         </p:txBody>
       </p:sp>
@@ -3690,7 +3844,7 @@
         </p:nvSpPr>
         <p:spPr>
           <a:xfrm>
-            <a:off x="9834665" y="1257302"/>
+            <a:off x="9599900" y="1365077"/>
             <a:ext cx="1235410" cy="1534538"/>
           </a:xfrm>
           <a:prstGeom prst="arc">
@@ -3741,11 +3895,14 @@
         </p:nvSpPr>
         <p:spPr>
           <a:xfrm rot="17102652">
-            <a:off x="7501745" y="1360189"/>
-            <a:ext cx="924128" cy="846467"/>
+            <a:off x="7391877" y="1525446"/>
+            <a:ext cx="1471207" cy="778035"/>
           </a:xfrm>
           <a:prstGeom prst="arc">
-            <a:avLst/>
+            <a:avLst>
+              <a:gd name="adj1" fmla="val 16200000"/>
+              <a:gd name="adj2" fmla="val 20021132"/>
+            </a:avLst>
           </a:prstGeom>
           <a:ln w="12700">
             <a:headEnd type="triangle" w="med" len="med"/>
@@ -3999,10 +4156,9 @@
           <a:lstStyle/>
           <a:p>
             <a:r>
-              <a:rPr lang="en-US" dirty="0" err="1"/>
+              <a:rPr lang="en-US" dirty="0"/>
               <a:t>poolDB</a:t>
             </a:r>
-            <a:endParaRPr lang="en-US" dirty="0"/>
           </a:p>
         </p:txBody>
       </p:sp>
@@ -4065,10 +4221,15 @@
           <a:p>
             <a:pPr algn="ctr"/>
             <a:r>
-              <a:rPr lang="en-US" sz="1400" dirty="0" err="1"/>
+              <a:rPr lang="en-US" sz="1400" dirty="0">
+                <a:solidFill>
+                  <a:schemeClr val="accent6">
+                    <a:lumMod val="50000"/>
+                  </a:schemeClr>
+                </a:solidFill>
+              </a:rPr>
               <a:t>PoolUpdate.py</a:t>
             </a:r>
-            <a:endParaRPr lang="en-US" sz="1400" dirty="0"/>
           </a:p>
           <a:p>
             <a:pPr algn="ctr"/>
@@ -4234,10 +4395,9 @@
           <a:p>
             <a:pPr algn="ctr"/>
             <a:r>
-              <a:rPr lang="en-US" sz="1400" dirty="0" err="1"/>
+              <a:rPr lang="en-US" sz="1400" dirty="0"/>
               <a:t>RenderPool.py</a:t>
             </a:r>
-            <a:endParaRPr lang="en-US" sz="1400" dirty="0"/>
           </a:p>
           <a:p>
             <a:pPr algn="ctr"/>
@@ -4245,84 +4405,6 @@
           </a:p>
         </p:txBody>
       </p:sp>
-      <p:pic>
-        <p:nvPicPr>
-          <p:cNvPr id="23" name="Picture 22" descr="A picture containing lamp, light&#10;&#10;Description automatically generated">
-            <a:extLst>
-              <a:ext uri="{FF2B5EF4-FFF2-40B4-BE49-F238E27FC236}">
-                <a16:creationId xmlns:a16="http://schemas.microsoft.com/office/drawing/2014/main" id="{4AB7E156-3A91-8F46-8D07-31F2D514AF46}"/>
-              </a:ext>
-            </a:extLst>
-          </p:cNvPr>
-          <p:cNvPicPr>
-            <a:picLocks noChangeAspect="1"/>
-          </p:cNvPicPr>
-          <p:nvPr/>
-        </p:nvPicPr>
-        <p:blipFill>
-          <a:blip r:embed="rId2">
-            <a:extLst>
-              <a:ext uri="{28A0092B-C50C-407E-A947-70E740481C1C}">
-                <a14:useLocalDpi xmlns:a14="http://schemas.microsoft.com/office/drawing/2010/main" val="0"/>
-              </a:ext>
-            </a:extLst>
-          </a:blip>
-          <a:stretch>
-            <a:fillRect/>
-          </a:stretch>
-        </p:blipFill>
-        <p:spPr>
-          <a:xfrm>
-            <a:off x="-131681" y="3662029"/>
-            <a:ext cx="1205504" cy="1205504"/>
-          </a:xfrm>
-          <a:prstGeom prst="rect">
-            <a:avLst/>
-          </a:prstGeom>
-        </p:spPr>
-      </p:pic>
-      <p:cxnSp>
-        <p:nvCxnSpPr>
-          <p:cNvPr id="25" name="Straight Arrow Connector 24">
-            <a:extLst>
-              <a:ext uri="{FF2B5EF4-FFF2-40B4-BE49-F238E27FC236}">
-                <a16:creationId xmlns:a16="http://schemas.microsoft.com/office/drawing/2014/main" id="{B07B6C11-97BB-E842-A051-51DEF433F097}"/>
-              </a:ext>
-            </a:extLst>
-          </p:cNvPr>
-          <p:cNvCxnSpPr>
-            <a:cxnSpLocks/>
-          </p:cNvCxnSpPr>
-          <p:nvPr/>
-        </p:nvCxnSpPr>
-        <p:spPr>
-          <a:xfrm>
-            <a:off x="856034" y="980064"/>
-            <a:ext cx="364244" cy="128891"/>
-          </a:xfrm>
-          <a:prstGeom prst="straightConnector1">
-            <a:avLst/>
-          </a:prstGeom>
-          <a:ln w="12700">
-            <a:headEnd type="triangle"/>
-            <a:tailEnd type="triangle"/>
-          </a:ln>
-        </p:spPr>
-        <p:style>
-          <a:lnRef idx="1">
-            <a:schemeClr val="accent1"/>
-          </a:lnRef>
-          <a:fillRef idx="0">
-            <a:schemeClr val="accent1"/>
-          </a:fillRef>
-          <a:effectRef idx="0">
-            <a:schemeClr val="accent1"/>
-          </a:effectRef>
-          <a:fontRef idx="minor">
-            <a:schemeClr val="tx1"/>
-          </a:fontRef>
-        </p:style>
-      </p:cxnSp>
       <p:sp>
         <p:nvSpPr>
           <p:cNvPr id="27" name="Arc 26">
@@ -4374,62 +4456,38 @@
           </a:p>
         </p:txBody>
       </p:sp>
-      <p:cxnSp>
-        <p:nvCxnSpPr>
-          <p:cNvPr id="29" name="Straight Connector 28">
-            <a:extLst>
-              <a:ext uri="{FF2B5EF4-FFF2-40B4-BE49-F238E27FC236}">
-                <a16:creationId xmlns:a16="http://schemas.microsoft.com/office/drawing/2014/main" id="{AF967EF9-D09A-2649-A4F9-A6BCE99F7DE4}"/>
-              </a:ext>
-            </a:extLst>
-          </p:cNvPr>
-          <p:cNvCxnSpPr/>
+      <p:sp>
+        <p:nvSpPr>
+          <p:cNvPr id="57" name="Oval 56">
+            <a:extLst>
+              <a:ext uri="{FF2B5EF4-FFF2-40B4-BE49-F238E27FC236}">
+                <a16:creationId xmlns:a16="http://schemas.microsoft.com/office/drawing/2014/main" id="{601AE9CA-21EF-A149-8798-F16BBFDC9B61}"/>
+              </a:ext>
+            </a:extLst>
+          </p:cNvPr>
+          <p:cNvSpPr/>
           <p:nvPr/>
-        </p:nvCxnSpPr>
+        </p:nvSpPr>
         <p:spPr>
           <a:xfrm>
-            <a:off x="194555" y="3832695"/>
-            <a:ext cx="11741285" cy="0"/>
+            <a:off x="1104634" y="2852065"/>
+            <a:ext cx="2188571" cy="432881"/>
           </a:xfrm>
-          <a:prstGeom prst="line">
+          <a:prstGeom prst="ellipse">
             <a:avLst/>
           </a:prstGeom>
-        </p:spPr>
-        <p:style>
-          <a:lnRef idx="1">
-            <a:schemeClr val="accent1"/>
-          </a:lnRef>
-          <a:fillRef idx="0">
-            <a:schemeClr val="accent1"/>
-          </a:fillRef>
-          <a:effectRef idx="0">
-            <a:schemeClr val="accent1"/>
-          </a:effectRef>
-          <a:fontRef idx="minor">
-            <a:schemeClr val="tx1"/>
-          </a:fontRef>
-        </p:style>
-      </p:cxnSp>
-      <p:sp>
-        <p:nvSpPr>
-          <p:cNvPr id="37" name="Cloud 36">
-            <a:extLst>
-              <a:ext uri="{FF2B5EF4-FFF2-40B4-BE49-F238E27FC236}">
-                <a16:creationId xmlns:a16="http://schemas.microsoft.com/office/drawing/2014/main" id="{01B4A190-9287-5E4E-A00E-AC8393DEF9D6}"/>
-              </a:ext>
-            </a:extLst>
-          </p:cNvPr>
-          <p:cNvSpPr/>
-          <p:nvPr/>
-        </p:nvSpPr>
-        <p:spPr>
-          <a:xfrm>
-            <a:off x="6434143" y="5257793"/>
-            <a:ext cx="2159538" cy="1298643"/>
-          </a:xfrm>
-          <a:prstGeom prst="cloud">
-            <a:avLst/>
-          </a:prstGeom>
+          <a:solidFill>
+            <a:schemeClr val="accent4">
+              <a:lumMod val="75000"/>
+            </a:schemeClr>
+          </a:solidFill>
+          <a:ln>
+            <a:solidFill>
+              <a:schemeClr val="accent4">
+                <a:lumMod val="50000"/>
+              </a:schemeClr>
+            </a:solidFill>
+          </a:ln>
         </p:spPr>
         <p:style>
           <a:lnRef idx="2">
@@ -4452,19 +4510,189 @@
           <a:lstStyle/>
           <a:p>
             <a:pPr algn="ctr"/>
-            <a:r>
-              <a:rPr lang="en-US" dirty="0"/>
-              <a:t>NHL API</a:t>
-            </a:r>
-          </a:p>
-        </p:txBody>
-      </p:sp>
-      <p:sp>
-        <p:nvSpPr>
-          <p:cNvPr id="39" name="Arc 38">
-            <a:extLst>
-              <a:ext uri="{FF2B5EF4-FFF2-40B4-BE49-F238E27FC236}">
-                <a16:creationId xmlns:a16="http://schemas.microsoft.com/office/drawing/2014/main" id="{B9DD443F-29D1-EB4A-86C4-7C5CC353AA37}"/>
+            <a:endParaRPr lang="en-US" sz="1200" dirty="0"/>
+          </a:p>
+          <a:p>
+            <a:pPr algn="ctr"/>
+            <a:r>
+              <a:rPr lang="en-US" sz="1400" dirty="0">
+                <a:solidFill>
+                  <a:schemeClr val="bg1"/>
+                </a:solidFill>
+              </a:rPr>
+              <a:t>PlayerSelection.py</a:t>
+            </a:r>
+          </a:p>
+          <a:p>
+            <a:pPr algn="ctr"/>
+            <a:endParaRPr lang="en-US" dirty="0"/>
+          </a:p>
+        </p:txBody>
+      </p:sp>
+      <p:sp>
+        <p:nvSpPr>
+          <p:cNvPr id="60" name="TextBox 59">
+            <a:extLst>
+              <a:ext uri="{FF2B5EF4-FFF2-40B4-BE49-F238E27FC236}">
+                <a16:creationId xmlns:a16="http://schemas.microsoft.com/office/drawing/2014/main" id="{6E2E68D4-6739-E445-A5A7-9C77EB14D0C1}"/>
+              </a:ext>
+            </a:extLst>
+          </p:cNvPr>
+          <p:cNvSpPr txBox="1"/>
+          <p:nvPr/>
+        </p:nvSpPr>
+        <p:spPr>
+          <a:xfrm>
+            <a:off x="7021369" y="3580826"/>
+            <a:ext cx="5213436" cy="2708434"/>
+          </a:xfrm>
+          <a:prstGeom prst="rect">
+            <a:avLst/>
+          </a:prstGeom>
+          <a:noFill/>
+        </p:spPr>
+        <p:txBody>
+          <a:bodyPr wrap="square" rtlCol="0">
+            <a:spAutoFit/>
+          </a:bodyPr>
+          <a:lstStyle/>
+          <a:p>
+            <a:r>
+              <a:rPr lang="en-US" sz="1600" i="1" dirty="0">
+                <a:solidFill>
+                  <a:schemeClr val="accent6">
+                    <a:lumMod val="50000"/>
+                  </a:schemeClr>
+                </a:solidFill>
+              </a:rPr>
+              <a:t>PoolTeams</a:t>
+            </a:r>
+            <a:r>
+              <a:rPr lang="en-US" sz="1600" dirty="0">
+                <a:solidFill>
+                  <a:schemeClr val="accent6">
+                    <a:lumMod val="50000"/>
+                  </a:schemeClr>
+                </a:solidFill>
+              </a:rPr>
+              <a:t>:</a:t>
+            </a:r>
+          </a:p>
+          <a:p>
+            <a:r>
+              <a:rPr lang="en-US" sz="1400" dirty="0">
+                <a:solidFill>
+                  <a:srgbClr val="FF0000"/>
+                </a:solidFill>
+              </a:rPr>
+              <a:t>PoolTeamName: [QuadSquad]</a:t>
+            </a:r>
+          </a:p>
+          <a:p>
+            <a:r>
+              <a:rPr lang="en-US" sz="1400" dirty="0">
+                <a:solidFill>
+                  <a:srgbClr val="FF0000"/>
+                </a:solidFill>
+              </a:rPr>
+              <a:t>GM: [GM Name]</a:t>
+            </a:r>
+          </a:p>
+          <a:p>
+            <a:r>
+              <a:rPr lang="en-US" sz="1400" dirty="0">
+                <a:solidFill>
+                  <a:srgbClr val="FF0000"/>
+                </a:solidFill>
+              </a:rPr>
+              <a:t>Email:</a:t>
+            </a:r>
+          </a:p>
+          <a:p>
+            <a:r>
+              <a:rPr lang="en-US" sz="1400" dirty="0">
+                <a:solidFill>
+                  <a:srgbClr val="FF0000"/>
+                </a:solidFill>
+              </a:rPr>
+              <a:t>Hometown:</a:t>
+            </a:r>
+          </a:p>
+          <a:p>
+            <a:r>
+              <a:rPr lang="en-US" sz="1400" dirty="0">
+                <a:solidFill>
+                  <a:srgbClr val="FF0000"/>
+                </a:solidFill>
+              </a:rPr>
+              <a:t>Country:</a:t>
+            </a:r>
+          </a:p>
+          <a:p>
+            <a:r>
+              <a:rPr lang="en-US" sz="1400" dirty="0">
+                <a:solidFill>
+                  <a:srgbClr val="FF0000"/>
+                </a:solidFill>
+              </a:rPr>
+              <a:t>Pay Status: [NotPaid, PayPal, Cheque, Cash, Coupon]</a:t>
+            </a:r>
+          </a:p>
+          <a:p>
+            <a:r>
+              <a:rPr lang="en-US" sz="1400" dirty="0">
+                <a:solidFill>
+                  <a:srgbClr val="FF0000"/>
+                </a:solidFill>
+              </a:rPr>
+              <a:t>Pay Amount: </a:t>
+            </a:r>
+          </a:p>
+          <a:p>
+            <a:r>
+              <a:rPr lang="en-US" sz="1400" dirty="0">
+                <a:solidFill>
+                  <a:srgbClr val="FF0000"/>
+                </a:solidFill>
+              </a:rPr>
+              <a:t>Status:  [Incomplete, complete]  </a:t>
+            </a:r>
+          </a:p>
+          <a:p>
+            <a:endParaRPr lang="en-US" sz="1400" dirty="0">
+              <a:solidFill>
+                <a:srgbClr val="FF0000"/>
+              </a:solidFill>
+            </a:endParaRPr>
+          </a:p>
+          <a:p>
+            <a:r>
+              <a:rPr lang="en-US" sz="1400" dirty="0">
+                <a:solidFill>
+                  <a:srgbClr val="FF0000"/>
+                </a:solidFill>
+              </a:rPr>
+              <a:t>25* </a:t>
+            </a:r>
+          </a:p>
+          <a:p>
+            <a:r>
+              <a:rPr lang="en-US" sz="1400" dirty="0">
+                <a:solidFill>
+                  <a:srgbClr val="FF0000"/>
+                </a:solidFill>
+              </a:rPr>
+              <a:t>ID, Name, Team, G, A, W, SO, Pts, State</a:t>
+            </a:r>
+          </a:p>
+        </p:txBody>
+      </p:sp>
+      <p:sp>
+        <p:nvSpPr>
+          <p:cNvPr id="49" name="Oval 48">
+            <a:extLst>
+              <a:ext uri="{FF2B5EF4-FFF2-40B4-BE49-F238E27FC236}">
+                <a16:creationId xmlns:a16="http://schemas.microsoft.com/office/drawing/2014/main" id="{03A8D5E4-FFA6-4248-8C29-32D7B872CB27}"/>
               </a:ext>
             </a:extLst>
           </p:cNvPr>
@@ -4473,18 +4701,92 @@
         </p:nvSpPr>
         <p:spPr>
           <a:xfrm>
-            <a:off x="6278502" y="4440672"/>
-            <a:ext cx="1235410" cy="1534538"/>
+            <a:off x="4138550" y="174280"/>
+            <a:ext cx="2313566" cy="432881"/>
+          </a:xfrm>
+          <a:prstGeom prst="ellipse">
+            <a:avLst/>
+          </a:prstGeom>
+          <a:solidFill>
+            <a:schemeClr val="accent2">
+              <a:lumMod val="60000"/>
+              <a:lumOff val="40000"/>
+            </a:schemeClr>
+          </a:solidFill>
+          <a:ln>
+            <a:solidFill>
+              <a:schemeClr val="accent4">
+                <a:lumMod val="50000"/>
+              </a:schemeClr>
+            </a:solidFill>
+          </a:ln>
+        </p:spPr>
+        <p:style>
+          <a:lnRef idx="2">
+            <a:schemeClr val="accent1">
+              <a:shade val="50000"/>
+            </a:schemeClr>
+          </a:lnRef>
+          <a:fillRef idx="1">
+            <a:schemeClr val="accent1"/>
+          </a:fillRef>
+          <a:effectRef idx="0">
+            <a:schemeClr val="accent1"/>
+          </a:effectRef>
+          <a:fontRef idx="minor">
+            <a:schemeClr val="lt1"/>
+          </a:fontRef>
+        </p:style>
+        <p:txBody>
+          <a:bodyPr rtlCol="0" anchor="ctr"/>
+          <a:lstStyle/>
+          <a:p>
+            <a:pPr algn="ctr"/>
+            <a:endParaRPr lang="en-US" sz="1200" dirty="0"/>
+          </a:p>
+          <a:p>
+            <a:pPr algn="ctr"/>
+            <a:r>
+              <a:rPr lang="en-US" sz="1100" dirty="0">
+                <a:solidFill>
+                  <a:schemeClr val="bg1"/>
+                </a:solidFill>
+              </a:rPr>
+              <a:t>UpdateGoalieAssist.py</a:t>
+            </a:r>
+          </a:p>
+          <a:p>
+            <a:pPr algn="ctr"/>
+            <a:endParaRPr lang="en-US" dirty="0"/>
+          </a:p>
+        </p:txBody>
+      </p:sp>
+      <p:sp>
+        <p:nvSpPr>
+          <p:cNvPr id="62" name="Arc 61">
+            <a:extLst>
+              <a:ext uri="{FF2B5EF4-FFF2-40B4-BE49-F238E27FC236}">
+                <a16:creationId xmlns:a16="http://schemas.microsoft.com/office/drawing/2014/main" id="{D036EA86-FD2A-8D4C-B708-25AEF451A03F}"/>
+              </a:ext>
+            </a:extLst>
+          </p:cNvPr>
+          <p:cNvSpPr/>
+          <p:nvPr/>
+        </p:nvSpPr>
+        <p:spPr>
+          <a:xfrm>
+            <a:off x="5093204" y="464076"/>
+            <a:ext cx="2454646" cy="2494433"/>
           </a:xfrm>
           <a:prstGeom prst="arc">
             <a:avLst>
-              <a:gd name="adj1" fmla="val 16011110"/>
-              <a:gd name="adj2" fmla="val 0"/>
+              <a:gd name="adj1" fmla="val 16476661"/>
+              <a:gd name="adj2" fmla="val 21383399"/>
             </a:avLst>
           </a:prstGeom>
           <a:ln w="19050">
-            <a:headEnd type="triangle" w="med" len="med"/>
-            <a:tailEnd type="none" w="med" len="med"/>
+            <a:headEnd type="none" w="med" len="med"/>
+            <a:tailEnd type="triangle" w="med" len="med"/>
           </a:ln>
         </p:spPr>
         <p:style>
@@ -4510,12 +4812,181 @@
           </a:p>
         </p:txBody>
       </p:sp>
+      <p:sp>
+        <p:nvSpPr>
+          <p:cNvPr id="63" name="Oval 62">
+            <a:extLst>
+              <a:ext uri="{FF2B5EF4-FFF2-40B4-BE49-F238E27FC236}">
+                <a16:creationId xmlns:a16="http://schemas.microsoft.com/office/drawing/2014/main" id="{F84548AE-C567-2E46-AFB2-552FEF3EDB1B}"/>
+              </a:ext>
+            </a:extLst>
+          </p:cNvPr>
+          <p:cNvSpPr/>
+          <p:nvPr/>
+        </p:nvSpPr>
+        <p:spPr>
+          <a:xfrm>
+            <a:off x="1090226" y="2247923"/>
+            <a:ext cx="2163967" cy="432881"/>
+          </a:xfrm>
+          <a:prstGeom prst="ellipse">
+            <a:avLst/>
+          </a:prstGeom>
+          <a:solidFill>
+            <a:schemeClr val="accent4">
+              <a:lumMod val="75000"/>
+            </a:schemeClr>
+          </a:solidFill>
+          <a:ln>
+            <a:solidFill>
+              <a:schemeClr val="accent4">
+                <a:lumMod val="50000"/>
+              </a:schemeClr>
+            </a:solidFill>
+          </a:ln>
+        </p:spPr>
+        <p:style>
+          <a:lnRef idx="2">
+            <a:schemeClr val="accent1">
+              <a:shade val="50000"/>
+            </a:schemeClr>
+          </a:lnRef>
+          <a:fillRef idx="1">
+            <a:schemeClr val="accent1"/>
+          </a:fillRef>
+          <a:effectRef idx="0">
+            <a:schemeClr val="accent1"/>
+          </a:effectRef>
+          <a:fontRef idx="minor">
+            <a:schemeClr val="lt1"/>
+          </a:fontRef>
+        </p:style>
+        <p:txBody>
+          <a:bodyPr rtlCol="0" anchor="ctr"/>
+          <a:lstStyle/>
+          <a:p>
+            <a:pPr algn="ctr"/>
+            <a:endParaRPr lang="en-US" sz="1200" dirty="0"/>
+          </a:p>
+          <a:p>
+            <a:pPr algn="ctr"/>
+            <a:r>
+              <a:rPr lang="en-US" sz="1400" dirty="0">
+                <a:solidFill>
+                  <a:schemeClr val="bg1"/>
+                </a:solidFill>
+              </a:rPr>
+              <a:t>EntryRegister.py</a:t>
+            </a:r>
+          </a:p>
+          <a:p>
+            <a:pPr algn="ctr"/>
+            <a:endParaRPr lang="en-US" dirty="0"/>
+          </a:p>
+        </p:txBody>
+      </p:sp>
+      <p:sp>
+        <p:nvSpPr>
+          <p:cNvPr id="64" name="Arc 63">
+            <a:extLst>
+              <a:ext uri="{FF2B5EF4-FFF2-40B4-BE49-F238E27FC236}">
+                <a16:creationId xmlns:a16="http://schemas.microsoft.com/office/drawing/2014/main" id="{54190D2D-6718-F74D-A430-A0F54FD9BD7C}"/>
+              </a:ext>
+            </a:extLst>
+          </p:cNvPr>
+          <p:cNvSpPr/>
+          <p:nvPr/>
+        </p:nvSpPr>
+        <p:spPr>
+          <a:xfrm rot="17275121">
+            <a:off x="3016029" y="2684731"/>
+            <a:ext cx="568728" cy="560131"/>
+          </a:xfrm>
+          <a:prstGeom prst="arc">
+            <a:avLst/>
+          </a:prstGeom>
+          <a:ln w="12700">
+            <a:headEnd type="none" w="med" len="med"/>
+            <a:tailEnd type="triangle" w="med" len="med"/>
+          </a:ln>
+        </p:spPr>
+        <p:style>
+          <a:lnRef idx="1">
+            <a:schemeClr val="accent1"/>
+          </a:lnRef>
+          <a:fillRef idx="0">
+            <a:schemeClr val="accent1"/>
+          </a:fillRef>
+          <a:effectRef idx="0">
+            <a:schemeClr val="accent1"/>
+          </a:effectRef>
+          <a:fontRef idx="minor">
+            <a:schemeClr val="tx1"/>
+          </a:fontRef>
+        </p:style>
+        <p:txBody>
+          <a:bodyPr rtlCol="0" anchor="ctr"/>
+          <a:lstStyle/>
+          <a:p>
+            <a:pPr algn="ctr"/>
+            <a:endParaRPr lang="en-US"/>
+          </a:p>
+        </p:txBody>
+      </p:sp>
+      <p:sp>
+        <p:nvSpPr>
+          <p:cNvPr id="65" name="Arc 64">
+            <a:extLst>
+              <a:ext uri="{FF2B5EF4-FFF2-40B4-BE49-F238E27FC236}">
+                <a16:creationId xmlns:a16="http://schemas.microsoft.com/office/drawing/2014/main" id="{29F67BF9-AE72-794E-AB66-32AE161AFFC2}"/>
+              </a:ext>
+            </a:extLst>
+          </p:cNvPr>
+          <p:cNvSpPr/>
+          <p:nvPr/>
+        </p:nvSpPr>
+        <p:spPr>
+          <a:xfrm rot="17275121">
+            <a:off x="3095897" y="2134169"/>
+            <a:ext cx="568728" cy="560131"/>
+          </a:xfrm>
+          <a:prstGeom prst="arc">
+            <a:avLst/>
+          </a:prstGeom>
+          <a:ln w="12700">
+            <a:headEnd type="none" w="med" len="med"/>
+            <a:tailEnd type="triangle" w="med" len="med"/>
+          </a:ln>
+        </p:spPr>
+        <p:style>
+          <a:lnRef idx="1">
+            <a:schemeClr val="accent1"/>
+          </a:lnRef>
+          <a:fillRef idx="0">
+            <a:schemeClr val="accent1"/>
+          </a:fillRef>
+          <a:effectRef idx="0">
+            <a:schemeClr val="accent1"/>
+          </a:effectRef>
+          <a:fontRef idx="minor">
+            <a:schemeClr val="tx1"/>
+          </a:fontRef>
+        </p:style>
+        <p:txBody>
+          <a:bodyPr rtlCol="0" anchor="ctr"/>
+          <a:lstStyle/>
+          <a:p>
+            <a:pPr algn="ctr"/>
+            <a:endParaRPr lang="en-US"/>
+          </a:p>
+        </p:txBody>
+      </p:sp>
       <p:grpSp>
         <p:nvGrpSpPr>
-          <p:cNvPr id="41" name="Group 40">
-            <a:extLst>
-              <a:ext uri="{FF2B5EF4-FFF2-40B4-BE49-F238E27FC236}">
-                <a16:creationId xmlns:a16="http://schemas.microsoft.com/office/drawing/2014/main" id="{6282DC92-538D-D04F-A772-8AAE3EBE8EC3}"/>
+          <p:cNvPr id="66" name="Group 65">
+            <a:extLst>
+              <a:ext uri="{FF2B5EF4-FFF2-40B4-BE49-F238E27FC236}">
+                <a16:creationId xmlns:a16="http://schemas.microsoft.com/office/drawing/2014/main" id="{A3B48FC0-1E29-4546-8E64-7990E7388A61}"/>
               </a:ext>
             </a:extLst>
           </p:cNvPr>
@@ -4524,7 +4995,7 @@
         </p:nvGrpSpPr>
         <p:grpSpPr>
           <a:xfrm>
-            <a:off x="3481789" y="5016243"/>
+            <a:off x="5051025" y="2315055"/>
             <a:ext cx="1108954" cy="1410510"/>
             <a:chOff x="7091463" y="3258766"/>
             <a:chExt cx="1108954" cy="1410510"/>
@@ -4532,10 +5003,10 @@
         </p:grpSpPr>
         <p:sp>
           <p:nvSpPr>
-            <p:cNvPr id="42" name="Oval 41">
+            <p:cNvPr id="67" name="Oval 66">
               <a:extLst>
                 <a:ext uri="{FF2B5EF4-FFF2-40B4-BE49-F238E27FC236}">
-                  <a16:creationId xmlns:a16="http://schemas.microsoft.com/office/drawing/2014/main" id="{4E0F7318-EED9-7F46-AD87-5A6B67541C81}"/>
+                  <a16:creationId xmlns:a16="http://schemas.microsoft.com/office/drawing/2014/main" id="{874C2BD9-6483-C746-B8EE-809D087F9701}"/>
                 </a:ext>
               </a:extLst>
             </p:cNvPr>
@@ -4551,7 +5022,7 @@
               <a:avLst/>
             </a:prstGeom>
             <a:solidFill>
-              <a:schemeClr val="accent1">
+              <a:schemeClr val="accent2">
                 <a:lumMod val="60000"/>
                 <a:lumOff val="40000"/>
               </a:schemeClr>
@@ -4584,15 +5055,15 @@
         </p:sp>
         <p:cxnSp>
           <p:nvCxnSpPr>
-            <p:cNvPr id="43" name="Straight Connector 42">
+            <p:cNvPr id="68" name="Straight Connector 67">
               <a:extLst>
                 <a:ext uri="{FF2B5EF4-FFF2-40B4-BE49-F238E27FC236}">
-                  <a16:creationId xmlns:a16="http://schemas.microsoft.com/office/drawing/2014/main" id="{E0EA3CC6-127D-CC42-A14C-14ABD5C0D6C3}"/>
+                  <a16:creationId xmlns:a16="http://schemas.microsoft.com/office/drawing/2014/main" id="{64659F4F-3497-9340-A703-C602150A7EDF}"/>
                 </a:ext>
               </a:extLst>
             </p:cNvPr>
             <p:cNvCxnSpPr>
-              <a:stCxn id="42" idx="2"/>
+              <a:stCxn id="67" idx="2"/>
             </p:cNvCxnSpPr>
             <p:nvPr/>
           </p:nvCxnSpPr>
@@ -4623,10 +5094,10 @@
         </p:cxnSp>
         <p:cxnSp>
           <p:nvCxnSpPr>
-            <p:cNvPr id="44" name="Straight Connector 43">
+            <p:cNvPr id="69" name="Straight Connector 68">
               <a:extLst>
                 <a:ext uri="{FF2B5EF4-FFF2-40B4-BE49-F238E27FC236}">
-                  <a16:creationId xmlns:a16="http://schemas.microsoft.com/office/drawing/2014/main" id="{1827E680-AB66-3349-9001-0229CCCBB98E}"/>
+                  <a16:creationId xmlns:a16="http://schemas.microsoft.com/office/drawing/2014/main" id="{193B502D-0B3C-374B-ABA7-60970D47675D}"/>
                 </a:ext>
               </a:extLst>
             </p:cNvPr>
@@ -4660,10 +5131,10 @@
         </p:cxnSp>
         <p:sp>
           <p:nvSpPr>
-            <p:cNvPr id="45" name="Oval 44">
+            <p:cNvPr id="70" name="Oval 69">
               <a:extLst>
                 <a:ext uri="{FF2B5EF4-FFF2-40B4-BE49-F238E27FC236}">
-                  <a16:creationId xmlns:a16="http://schemas.microsoft.com/office/drawing/2014/main" id="{61909512-0A7D-8140-8A2A-500EDD551905}"/>
+                  <a16:creationId xmlns:a16="http://schemas.microsoft.com/office/drawing/2014/main" id="{197095D4-FF58-EF4C-8490-74E6B3A943E3}"/>
                 </a:ext>
               </a:extLst>
             </p:cNvPr>
@@ -4678,6 +5149,11 @@
             <a:prstGeom prst="ellipse">
               <a:avLst/>
             </a:prstGeom>
+            <a:solidFill>
+              <a:schemeClr val="accent2">
+                <a:lumMod val="75000"/>
+              </a:schemeClr>
+            </a:solidFill>
           </p:spPr>
           <p:style>
             <a:lnRef idx="2">
@@ -4707,10 +5183,10 @@
       </p:grpSp>
       <p:sp>
         <p:nvSpPr>
-          <p:cNvPr id="46" name="TextBox 45">
-            <a:extLst>
-              <a:ext uri="{FF2B5EF4-FFF2-40B4-BE49-F238E27FC236}">
-                <a16:creationId xmlns:a16="http://schemas.microsoft.com/office/drawing/2014/main" id="{8CBA6C56-0894-604A-9220-4635A4D2BEFC}"/>
+          <p:cNvPr id="71" name="TextBox 70">
+            <a:extLst>
+              <a:ext uri="{FF2B5EF4-FFF2-40B4-BE49-F238E27FC236}">
+                <a16:creationId xmlns:a16="http://schemas.microsoft.com/office/drawing/2014/main" id="{7AF79CA5-380B-954E-97B0-B7EBCFE6868A}"/>
               </a:ext>
             </a:extLst>
           </p:cNvPr>
@@ -4719,8 +5195,8 @@
         </p:nvSpPr>
         <p:spPr>
           <a:xfrm>
-            <a:off x="3564847" y="5468901"/>
-            <a:ext cx="870751" cy="369332"/>
+            <a:off x="5043839" y="2755391"/>
+            <a:ext cx="1026948" cy="369332"/>
           </a:xfrm>
           <a:prstGeom prst="rect">
             <a:avLst/>
@@ -4734,19 +5210,281 @@
           <a:lstStyle/>
           <a:p>
             <a:r>
-              <a:rPr lang="en-US" dirty="0" err="1"/>
-              <a:t>poolDB</a:t>
-            </a:r>
-            <a:endParaRPr lang="en-US" dirty="0"/>
-          </a:p>
-        </p:txBody>
-      </p:sp>
-      <p:sp>
-        <p:nvSpPr>
-          <p:cNvPr id="47" name="Oval 46">
-            <a:extLst>
-              <a:ext uri="{FF2B5EF4-FFF2-40B4-BE49-F238E27FC236}">
-                <a16:creationId xmlns:a16="http://schemas.microsoft.com/office/drawing/2014/main" id="{402AF684-D769-424F-8D39-D9925185A784}"/>
+              <a:rPr lang="en-US" dirty="0"/>
+              <a:t>teamsDB</a:t>
+            </a:r>
+          </a:p>
+        </p:txBody>
+      </p:sp>
+      <p:sp>
+        <p:nvSpPr>
+          <p:cNvPr id="72" name="TextBox 71">
+            <a:extLst>
+              <a:ext uri="{FF2B5EF4-FFF2-40B4-BE49-F238E27FC236}">
+                <a16:creationId xmlns:a16="http://schemas.microsoft.com/office/drawing/2014/main" id="{B7362B68-67EA-5947-985C-666955371042}"/>
+              </a:ext>
+            </a:extLst>
+          </p:cNvPr>
+          <p:cNvSpPr txBox="1"/>
+          <p:nvPr/>
+        </p:nvSpPr>
+        <p:spPr>
+          <a:xfrm>
+            <a:off x="1776343" y="3745762"/>
+            <a:ext cx="3663028" cy="2062103"/>
+          </a:xfrm>
+          <a:prstGeom prst="rect">
+            <a:avLst/>
+          </a:prstGeom>
+          <a:noFill/>
+        </p:spPr>
+        <p:txBody>
+          <a:bodyPr wrap="square" rtlCol="0">
+            <a:spAutoFit/>
+          </a:bodyPr>
+          <a:lstStyle/>
+          <a:p>
+            <a:r>
+              <a:rPr lang="en-US" sz="1600" i="1" dirty="0">
+                <a:solidFill>
+                  <a:schemeClr val="accent6">
+                    <a:lumMod val="50000"/>
+                  </a:schemeClr>
+                </a:solidFill>
+              </a:rPr>
+              <a:t>teamsDB</a:t>
+            </a:r>
+            <a:r>
+              <a:rPr lang="en-US" sz="1600" dirty="0">
+                <a:solidFill>
+                  <a:schemeClr val="accent6">
+                    <a:lumMod val="50000"/>
+                  </a:schemeClr>
+                </a:solidFill>
+              </a:rPr>
+              <a:t>:</a:t>
+            </a:r>
+          </a:p>
+          <a:p>
+            <a:r>
+              <a:rPr lang="en-US" sz="1400" dirty="0">
+                <a:solidFill>
+                  <a:srgbClr val="FF0000"/>
+                </a:solidFill>
+              </a:rPr>
+              <a:t>team_id: [taken from NHL </a:t>
+            </a:r>
+            <a:r>
+              <a:rPr lang="en-US" sz="1400" dirty="0" err="1">
+                <a:solidFill>
+                  <a:srgbClr val="FF0000"/>
+                </a:solidFill>
+              </a:rPr>
+              <a:t>api</a:t>
+            </a:r>
+            <a:r>
+              <a:rPr lang="en-US" sz="1400" dirty="0">
+                <a:solidFill>
+                  <a:srgbClr val="FF0000"/>
+                </a:solidFill>
+              </a:rPr>
+              <a:t>]</a:t>
+            </a:r>
+          </a:p>
+          <a:p>
+            <a:r>
+              <a:rPr lang="en-US" sz="1400" dirty="0">
+                <a:solidFill>
+                  <a:srgbClr val="FF0000"/>
+                </a:solidFill>
+              </a:rPr>
+              <a:t>team_name: [NHL team name]</a:t>
+            </a:r>
+          </a:p>
+          <a:p>
+            <a:r>
+              <a:rPr lang="en-US" sz="1400" dirty="0">
+                <a:solidFill>
+                  <a:srgbClr val="FF0000"/>
+                </a:solidFill>
+              </a:rPr>
+              <a:t>status_id:  [0 = not qualified; </a:t>
+            </a:r>
+          </a:p>
+          <a:p>
+            <a:r>
+              <a:rPr lang="en-US" sz="1400" dirty="0">
+                <a:solidFill>
+                  <a:srgbClr val="FF0000"/>
+                </a:solidFill>
+              </a:rPr>
+              <a:t>	   1 = eliminated – 1</a:t>
+            </a:r>
+            <a:r>
+              <a:rPr lang="en-US" sz="1400" baseline="30000" dirty="0">
+                <a:solidFill>
+                  <a:srgbClr val="FF0000"/>
+                </a:solidFill>
+              </a:rPr>
+              <a:t>st</a:t>
+            </a:r>
+            <a:r>
+              <a:rPr lang="en-US" sz="1400" dirty="0">
+                <a:solidFill>
+                  <a:srgbClr val="FF0000"/>
+                </a:solidFill>
+              </a:rPr>
+              <a:t> </a:t>
+            </a:r>
+            <a:r>
+              <a:rPr lang="en-US" sz="1400" dirty="0" err="1">
+                <a:solidFill>
+                  <a:srgbClr val="FF0000"/>
+                </a:solidFill>
+              </a:rPr>
+              <a:t>rd</a:t>
+            </a:r>
+            <a:endParaRPr lang="en-US" sz="1400" dirty="0">
+              <a:solidFill>
+                <a:srgbClr val="FF0000"/>
+              </a:solidFill>
+            </a:endParaRPr>
+          </a:p>
+          <a:p>
+            <a:r>
+              <a:rPr lang="en-US" sz="1400" dirty="0">
+                <a:solidFill>
+                  <a:srgbClr val="FF0000"/>
+                </a:solidFill>
+              </a:rPr>
+              <a:t>	   2 = eliminated – 2</a:t>
+            </a:r>
+            <a:r>
+              <a:rPr lang="en-US" sz="1400" baseline="30000" dirty="0">
+                <a:solidFill>
+                  <a:srgbClr val="FF0000"/>
+                </a:solidFill>
+              </a:rPr>
+              <a:t>nd</a:t>
+            </a:r>
+            <a:r>
+              <a:rPr lang="en-US" sz="1400" dirty="0">
+                <a:solidFill>
+                  <a:srgbClr val="FF0000"/>
+                </a:solidFill>
+              </a:rPr>
+              <a:t> </a:t>
+            </a:r>
+            <a:r>
+              <a:rPr lang="en-US" sz="1400" dirty="0" err="1">
+                <a:solidFill>
+                  <a:srgbClr val="FF0000"/>
+                </a:solidFill>
+              </a:rPr>
+              <a:t>rd</a:t>
+            </a:r>
+            <a:endParaRPr lang="en-US" sz="1400" dirty="0">
+              <a:solidFill>
+                <a:srgbClr val="FF0000"/>
+              </a:solidFill>
+            </a:endParaRPr>
+          </a:p>
+          <a:p>
+            <a:r>
+              <a:rPr lang="en-US" sz="1400" dirty="0">
+                <a:solidFill>
+                  <a:srgbClr val="FF0000"/>
+                </a:solidFill>
+              </a:rPr>
+              <a:t>	   3 = eliminated – 3</a:t>
+            </a:r>
+            <a:r>
+              <a:rPr lang="en-US" sz="1400" baseline="30000" dirty="0">
+                <a:solidFill>
+                  <a:srgbClr val="FF0000"/>
+                </a:solidFill>
+              </a:rPr>
+              <a:t>rd</a:t>
+            </a:r>
+            <a:r>
+              <a:rPr lang="en-US" sz="1400" dirty="0">
+                <a:solidFill>
+                  <a:srgbClr val="FF0000"/>
+                </a:solidFill>
+              </a:rPr>
+              <a:t> </a:t>
+            </a:r>
+            <a:r>
+              <a:rPr lang="en-US" sz="1400" dirty="0" err="1">
+                <a:solidFill>
+                  <a:srgbClr val="FF0000"/>
+                </a:solidFill>
+              </a:rPr>
+              <a:t>rd</a:t>
+            </a:r>
+            <a:endParaRPr lang="en-US" sz="1400" dirty="0">
+              <a:solidFill>
+                <a:srgbClr val="FF0000"/>
+              </a:solidFill>
+            </a:endParaRPr>
+          </a:p>
+          <a:p>
+            <a:r>
+              <a:rPr lang="en-US" sz="1400" dirty="0">
+                <a:solidFill>
+                  <a:srgbClr val="FF0000"/>
+                </a:solidFill>
+              </a:rPr>
+              <a:t>	   4 = eliminated – 4</a:t>
+            </a:r>
+            <a:r>
+              <a:rPr lang="en-US" sz="1400" baseline="30000" dirty="0">
+                <a:solidFill>
+                  <a:srgbClr val="FF0000"/>
+                </a:solidFill>
+              </a:rPr>
+              <a:t>th</a:t>
+            </a:r>
+            <a:r>
+              <a:rPr lang="en-US" sz="1400" dirty="0">
+                <a:solidFill>
+                  <a:srgbClr val="FF0000"/>
+                </a:solidFill>
+              </a:rPr>
+              <a:t> </a:t>
+            </a:r>
+            <a:r>
+              <a:rPr lang="en-US" sz="1400" dirty="0" err="1">
+                <a:solidFill>
+                  <a:srgbClr val="FF0000"/>
+                </a:solidFill>
+              </a:rPr>
+              <a:t>rd</a:t>
+            </a:r>
+            <a:endParaRPr lang="en-US" sz="1400" dirty="0">
+              <a:solidFill>
+                <a:srgbClr val="FF0000"/>
+              </a:solidFill>
+            </a:endParaRPr>
+          </a:p>
+          <a:p>
+            <a:r>
+              <a:rPr lang="en-US" sz="1400" dirty="0">
+                <a:solidFill>
+                  <a:srgbClr val="FF0000"/>
+                </a:solidFill>
+              </a:rPr>
+              <a:t>	   5 = active]</a:t>
+            </a:r>
+          </a:p>
+        </p:txBody>
+      </p:sp>
+      <p:sp>
+        <p:nvSpPr>
+          <p:cNvPr id="3" name="Rectangle 2">
+            <a:extLst>
+              <a:ext uri="{FF2B5EF4-FFF2-40B4-BE49-F238E27FC236}">
+                <a16:creationId xmlns:a16="http://schemas.microsoft.com/office/drawing/2014/main" id="{DF026A85-7C08-B14F-AA1C-33DA507D996B}"/>
               </a:ext>
             </a:extLst>
           </p:cNvPr>
@@ -4755,7 +5493,431 @@
         </p:nvSpPr>
         <p:spPr>
           <a:xfrm>
-            <a:off x="4605118" y="4264781"/>
+            <a:off x="6853859" y="3605673"/>
+            <a:ext cx="4837472" cy="2665404"/>
+          </a:xfrm>
+          <a:prstGeom prst="rect">
+            <a:avLst/>
+          </a:prstGeom>
+          <a:noFill/>
+          <a:ln>
+            <a:solidFill>
+              <a:srgbClr val="C00000"/>
+            </a:solidFill>
+          </a:ln>
+        </p:spPr>
+        <p:style>
+          <a:lnRef idx="2">
+            <a:schemeClr val="accent1">
+              <a:shade val="50000"/>
+            </a:schemeClr>
+          </a:lnRef>
+          <a:fillRef idx="1">
+            <a:schemeClr val="accent1"/>
+          </a:fillRef>
+          <a:effectRef idx="0">
+            <a:schemeClr val="accent1"/>
+          </a:effectRef>
+          <a:fontRef idx="minor">
+            <a:schemeClr val="lt1"/>
+          </a:fontRef>
+        </p:style>
+        <p:txBody>
+          <a:bodyPr rtlCol="0" anchor="ctr"/>
+          <a:lstStyle/>
+          <a:p>
+            <a:pPr algn="ctr"/>
+            <a:endParaRPr lang="en-US"/>
+          </a:p>
+        </p:txBody>
+      </p:sp>
+      <p:sp>
+        <p:nvSpPr>
+          <p:cNvPr id="73" name="Rectangle 72">
+            <a:extLst>
+              <a:ext uri="{FF2B5EF4-FFF2-40B4-BE49-F238E27FC236}">
+                <a16:creationId xmlns:a16="http://schemas.microsoft.com/office/drawing/2014/main" id="{060F79C7-89B4-B34D-8E11-F0AD4B078599}"/>
+              </a:ext>
+            </a:extLst>
+          </p:cNvPr>
+          <p:cNvSpPr/>
+          <p:nvPr/>
+        </p:nvSpPr>
+        <p:spPr>
+          <a:xfrm>
+            <a:off x="1594238" y="3763075"/>
+            <a:ext cx="3449601" cy="2077527"/>
+          </a:xfrm>
+          <a:prstGeom prst="rect">
+            <a:avLst/>
+          </a:prstGeom>
+          <a:noFill/>
+          <a:ln>
+            <a:solidFill>
+              <a:srgbClr val="C00000"/>
+            </a:solidFill>
+          </a:ln>
+        </p:spPr>
+        <p:style>
+          <a:lnRef idx="2">
+            <a:schemeClr val="accent1">
+              <a:shade val="50000"/>
+            </a:schemeClr>
+          </a:lnRef>
+          <a:fillRef idx="1">
+            <a:schemeClr val="accent1"/>
+          </a:fillRef>
+          <a:effectRef idx="0">
+            <a:schemeClr val="accent1"/>
+          </a:effectRef>
+          <a:fontRef idx="minor">
+            <a:schemeClr val="lt1"/>
+          </a:fontRef>
+        </p:style>
+        <p:txBody>
+          <a:bodyPr rtlCol="0" anchor="ctr"/>
+          <a:lstStyle/>
+          <a:p>
+            <a:pPr algn="ctr"/>
+            <a:endParaRPr lang="en-US"/>
+          </a:p>
+        </p:txBody>
+      </p:sp>
+      <p:sp>
+        <p:nvSpPr>
+          <p:cNvPr id="75" name="Oval 74">
+            <a:extLst>
+              <a:ext uri="{FF2B5EF4-FFF2-40B4-BE49-F238E27FC236}">
+                <a16:creationId xmlns:a16="http://schemas.microsoft.com/office/drawing/2014/main" id="{50019371-EF4C-B343-8408-B7CFBE4C05AA}"/>
+              </a:ext>
+            </a:extLst>
+          </p:cNvPr>
+          <p:cNvSpPr/>
+          <p:nvPr/>
+        </p:nvSpPr>
+        <p:spPr>
+          <a:xfrm>
+            <a:off x="1994762" y="191593"/>
+            <a:ext cx="2163967" cy="432881"/>
+          </a:xfrm>
+          <a:prstGeom prst="ellipse">
+            <a:avLst/>
+          </a:prstGeom>
+          <a:solidFill>
+            <a:schemeClr val="accent2">
+              <a:lumMod val="60000"/>
+              <a:lumOff val="40000"/>
+            </a:schemeClr>
+          </a:solidFill>
+          <a:ln>
+            <a:solidFill>
+              <a:schemeClr val="accent4">
+                <a:lumMod val="50000"/>
+              </a:schemeClr>
+            </a:solidFill>
+          </a:ln>
+        </p:spPr>
+        <p:style>
+          <a:lnRef idx="2">
+            <a:schemeClr val="accent1">
+              <a:shade val="50000"/>
+            </a:schemeClr>
+          </a:lnRef>
+          <a:fillRef idx="1">
+            <a:schemeClr val="accent1"/>
+          </a:fillRef>
+          <a:effectRef idx="0">
+            <a:schemeClr val="accent1"/>
+          </a:effectRef>
+          <a:fontRef idx="minor">
+            <a:schemeClr val="lt1"/>
+          </a:fontRef>
+        </p:style>
+        <p:txBody>
+          <a:bodyPr rtlCol="0" anchor="ctr"/>
+          <a:lstStyle/>
+          <a:p>
+            <a:pPr algn="ctr"/>
+            <a:endParaRPr lang="en-US" sz="1200" dirty="0"/>
+          </a:p>
+          <a:p>
+            <a:pPr algn="ctr"/>
+            <a:r>
+              <a:rPr lang="en-US" sz="1100" dirty="0">
+                <a:solidFill>
+                  <a:schemeClr val="bg1"/>
+                </a:solidFill>
+              </a:rPr>
+              <a:t>UpdatePayment</a:t>
+            </a:r>
+          </a:p>
+          <a:p>
+            <a:pPr algn="ctr"/>
+            <a:endParaRPr lang="en-US" dirty="0"/>
+          </a:p>
+        </p:txBody>
+      </p:sp>
+      <p:sp>
+        <p:nvSpPr>
+          <p:cNvPr id="76" name="Oval 75">
+            <a:extLst>
+              <a:ext uri="{FF2B5EF4-FFF2-40B4-BE49-F238E27FC236}">
+                <a16:creationId xmlns:a16="http://schemas.microsoft.com/office/drawing/2014/main" id="{A4E1C507-C436-0B47-BF69-408879A76AFE}"/>
+              </a:ext>
+            </a:extLst>
+          </p:cNvPr>
+          <p:cNvSpPr/>
+          <p:nvPr/>
+        </p:nvSpPr>
+        <p:spPr>
+          <a:xfrm>
+            <a:off x="2838036" y="444295"/>
+            <a:ext cx="2278883" cy="432881"/>
+          </a:xfrm>
+          <a:prstGeom prst="ellipse">
+            <a:avLst/>
+          </a:prstGeom>
+          <a:solidFill>
+            <a:schemeClr val="accent2">
+              <a:lumMod val="60000"/>
+              <a:lumOff val="40000"/>
+            </a:schemeClr>
+          </a:solidFill>
+          <a:ln>
+            <a:solidFill>
+              <a:schemeClr val="accent4">
+                <a:lumMod val="50000"/>
+              </a:schemeClr>
+            </a:solidFill>
+          </a:ln>
+        </p:spPr>
+        <p:style>
+          <a:lnRef idx="2">
+            <a:schemeClr val="accent1">
+              <a:shade val="50000"/>
+            </a:schemeClr>
+          </a:lnRef>
+          <a:fillRef idx="1">
+            <a:schemeClr val="accent1"/>
+          </a:fillRef>
+          <a:effectRef idx="0">
+            <a:schemeClr val="accent1"/>
+          </a:effectRef>
+          <a:fontRef idx="minor">
+            <a:schemeClr val="lt1"/>
+          </a:fontRef>
+        </p:style>
+        <p:txBody>
+          <a:bodyPr rtlCol="0" anchor="ctr"/>
+          <a:lstStyle/>
+          <a:p>
+            <a:pPr algn="ctr"/>
+            <a:endParaRPr lang="en-US" sz="1200" dirty="0"/>
+          </a:p>
+          <a:p>
+            <a:pPr algn="ctr"/>
+            <a:r>
+              <a:rPr lang="en-US" sz="1100" dirty="0">
+                <a:solidFill>
+                  <a:schemeClr val="bg1"/>
+                </a:solidFill>
+              </a:rPr>
+              <a:t>TeamsUpdate.py</a:t>
+            </a:r>
+          </a:p>
+          <a:p>
+            <a:pPr algn="ctr"/>
+            <a:endParaRPr lang="en-US" dirty="0"/>
+          </a:p>
+        </p:txBody>
+      </p:sp>
+      <p:sp>
+        <p:nvSpPr>
+          <p:cNvPr id="77" name="Oval 76">
+            <a:extLst>
+              <a:ext uri="{FF2B5EF4-FFF2-40B4-BE49-F238E27FC236}">
+                <a16:creationId xmlns:a16="http://schemas.microsoft.com/office/drawing/2014/main" id="{38631806-EB7A-ED46-92F2-562EA7E3B36D}"/>
+              </a:ext>
+            </a:extLst>
+          </p:cNvPr>
+          <p:cNvSpPr/>
+          <p:nvPr/>
+        </p:nvSpPr>
+        <p:spPr>
+          <a:xfrm>
+            <a:off x="8135159" y="557618"/>
+            <a:ext cx="2163967" cy="432881"/>
+          </a:xfrm>
+          <a:prstGeom prst="ellipse">
+            <a:avLst/>
+          </a:prstGeom>
+          <a:solidFill>
+            <a:schemeClr val="accent4">
+              <a:lumMod val="75000"/>
+            </a:schemeClr>
+          </a:solidFill>
+          <a:ln>
+            <a:solidFill>
+              <a:schemeClr val="accent4">
+                <a:lumMod val="50000"/>
+              </a:schemeClr>
+            </a:solidFill>
+          </a:ln>
+        </p:spPr>
+        <p:style>
+          <a:lnRef idx="2">
+            <a:schemeClr val="accent1">
+              <a:shade val="50000"/>
+            </a:schemeClr>
+          </a:lnRef>
+          <a:fillRef idx="1">
+            <a:schemeClr val="accent1"/>
+          </a:fillRef>
+          <a:effectRef idx="0">
+            <a:schemeClr val="accent1"/>
+          </a:effectRef>
+          <a:fontRef idx="minor">
+            <a:schemeClr val="lt1"/>
+          </a:fontRef>
+        </p:style>
+        <p:txBody>
+          <a:bodyPr rtlCol="0" anchor="ctr"/>
+          <a:lstStyle/>
+          <a:p>
+            <a:pPr algn="ctr"/>
+            <a:endParaRPr lang="en-US" sz="1200" dirty="0"/>
+          </a:p>
+          <a:p>
+            <a:pPr algn="ctr"/>
+            <a:r>
+              <a:rPr lang="en-US" sz="1050" dirty="0">
+                <a:solidFill>
+                  <a:schemeClr val="bg1"/>
+                </a:solidFill>
+              </a:rPr>
+              <a:t>UpdatePlayerStatus.py</a:t>
+            </a:r>
+          </a:p>
+          <a:p>
+            <a:pPr algn="ctr"/>
+            <a:endParaRPr lang="en-US" dirty="0"/>
+          </a:p>
+        </p:txBody>
+      </p:sp>
+      <p:sp>
+        <p:nvSpPr>
+          <p:cNvPr id="24" name="Freeform 23">
+            <a:extLst>
+              <a:ext uri="{FF2B5EF4-FFF2-40B4-BE49-F238E27FC236}">
+                <a16:creationId xmlns:a16="http://schemas.microsoft.com/office/drawing/2014/main" id="{53DE8149-F815-AD45-9C20-3F38E0D2B1C8}"/>
+              </a:ext>
+            </a:extLst>
+          </p:cNvPr>
+          <p:cNvSpPr/>
+          <p:nvPr/>
+        </p:nvSpPr>
+        <p:spPr>
+          <a:xfrm>
+            <a:off x="5979333" y="1030977"/>
+            <a:ext cx="3154816" cy="2438864"/>
+          </a:xfrm>
+          <a:custGeom>
+            <a:avLst/>
+            <a:gdLst>
+              <a:gd name="connsiteX0" fmla="*/ 3203996 w 3203996"/>
+              <a:gd name="connsiteY0" fmla="*/ 0 h 1316576"/>
+              <a:gd name="connsiteX1" fmla="*/ 1896306 w 3203996"/>
+              <a:gd name="connsiteY1" fmla="*/ 1160206 h 1316576"/>
+              <a:gd name="connsiteX2" fmla="*/ 38009 w 3203996"/>
+              <a:gd name="connsiteY2" fmla="*/ 1238864 h 1316576"/>
+              <a:gd name="connsiteX3" fmla="*/ 824590 w 3203996"/>
+              <a:gd name="connsiteY3" fmla="*/ 540774 h 1316576"/>
+            </a:gdLst>
+            <a:ahLst/>
+            <a:cxnLst>
+              <a:cxn ang="0">
+                <a:pos x="connsiteX0" y="connsiteY0"/>
+              </a:cxn>
+              <a:cxn ang="0">
+                <a:pos x="connsiteX1" y="connsiteY1"/>
+              </a:cxn>
+              <a:cxn ang="0">
+                <a:pos x="connsiteX2" y="connsiteY2"/>
+              </a:cxn>
+              <a:cxn ang="0">
+                <a:pos x="connsiteX3" y="connsiteY3"/>
+              </a:cxn>
+            </a:cxnLst>
+            <a:rect l="l" t="t" r="r" b="b"/>
+            <a:pathLst>
+              <a:path w="3203996" h="1316576">
+                <a:moveTo>
+                  <a:pt x="3203996" y="0"/>
+                </a:moveTo>
+                <a:cubicBezTo>
+                  <a:pt x="2813983" y="476864"/>
+                  <a:pt x="2423970" y="953729"/>
+                  <a:pt x="1896306" y="1160206"/>
+                </a:cubicBezTo>
+                <a:cubicBezTo>
+                  <a:pt x="1368642" y="1366683"/>
+                  <a:pt x="216628" y="1342103"/>
+                  <a:pt x="38009" y="1238864"/>
+                </a:cubicBezTo>
+                <a:cubicBezTo>
+                  <a:pt x="-140610" y="1135625"/>
+                  <a:pt x="341990" y="838199"/>
+                  <a:pt x="824590" y="540774"/>
+                </a:cubicBezTo>
+              </a:path>
+            </a:pathLst>
+          </a:custGeom>
+          <a:noFill/>
+          <a:ln>
+            <a:headEnd type="none" w="med" len="med"/>
+            <a:tailEnd type="triangle" w="med" len="med"/>
+          </a:ln>
+        </p:spPr>
+        <p:style>
+          <a:lnRef idx="2">
+            <a:schemeClr val="accent1">
+              <a:shade val="50000"/>
+            </a:schemeClr>
+          </a:lnRef>
+          <a:fillRef idx="1">
+            <a:schemeClr val="accent1"/>
+          </a:fillRef>
+          <a:effectRef idx="0">
+            <a:schemeClr val="accent1"/>
+          </a:effectRef>
+          <a:fontRef idx="minor">
+            <a:schemeClr val="lt1"/>
+          </a:fontRef>
+        </p:style>
+        <p:txBody>
+          <a:bodyPr rtlCol="0" anchor="ctr"/>
+          <a:lstStyle/>
+          <a:p>
+            <a:pPr algn="ctr"/>
+            <a:endParaRPr lang="en-US"/>
+          </a:p>
+        </p:txBody>
+      </p:sp>
+      <p:sp>
+        <p:nvSpPr>
+          <p:cNvPr id="8" name="Oval 7">
+            <a:extLst>
+              <a:ext uri="{FF2B5EF4-FFF2-40B4-BE49-F238E27FC236}">
+                <a16:creationId xmlns:a16="http://schemas.microsoft.com/office/drawing/2014/main" id="{0CF7FAF7-E620-BE47-B41E-1182D2321F4A}"/>
+              </a:ext>
+            </a:extLst>
+          </p:cNvPr>
+          <p:cNvSpPr/>
+          <p:nvPr/>
+        </p:nvSpPr>
+        <p:spPr>
+          <a:xfrm>
+            <a:off x="8146060" y="1108354"/>
             <a:ext cx="2074537" cy="432881"/>
           </a:xfrm>
           <a:prstGeom prst="ellipse">
@@ -4800,10 +5962,15 @@
           <a:p>
             <a:pPr algn="ctr"/>
             <a:r>
-              <a:rPr lang="en-US" sz="1400" dirty="0" err="1"/>
-              <a:t>PoolUpdate.py</a:t>
-            </a:r>
-            <a:endParaRPr lang="en-US" sz="1400" dirty="0"/>
+              <a:rPr lang="en-US" sz="1400" dirty="0">
+                <a:solidFill>
+                  <a:schemeClr val="accent6">
+                    <a:lumMod val="50000"/>
+                  </a:schemeClr>
+                </a:solidFill>
+              </a:rPr>
+              <a:t>PlayersUpdate.py</a:t>
+            </a:r>
           </a:p>
           <a:p>
             <a:pPr algn="ctr"/>
@@ -4813,10 +5980,45 @@
       </p:sp>
       <p:sp>
         <p:nvSpPr>
-          <p:cNvPr id="48" name="Arc 47">
-            <a:extLst>
-              <a:ext uri="{FF2B5EF4-FFF2-40B4-BE49-F238E27FC236}">
-                <a16:creationId xmlns:a16="http://schemas.microsoft.com/office/drawing/2014/main" id="{649504E2-E7A3-CB45-9818-9A98FDB673C0}"/>
+          <p:cNvPr id="28" name="TextBox 27">
+            <a:extLst>
+              <a:ext uri="{FF2B5EF4-FFF2-40B4-BE49-F238E27FC236}">
+                <a16:creationId xmlns:a16="http://schemas.microsoft.com/office/drawing/2014/main" id="{415673DB-B932-0B40-BD99-026601981078}"/>
+              </a:ext>
+            </a:extLst>
+          </p:cNvPr>
+          <p:cNvSpPr txBox="1"/>
+          <p:nvPr/>
+        </p:nvSpPr>
+        <p:spPr>
+          <a:xfrm>
+            <a:off x="8625322" y="254768"/>
+            <a:ext cx="1116011" cy="246221"/>
+          </a:xfrm>
+          <a:prstGeom prst="rect">
+            <a:avLst/>
+          </a:prstGeom>
+          <a:noFill/>
+        </p:spPr>
+        <p:txBody>
+          <a:bodyPr wrap="none" rtlCol="0">
+            <a:spAutoFit/>
+          </a:bodyPr>
+          <a:lstStyle/>
+          <a:p>
+            <a:r>
+              <a:rPr lang="en-US" sz="1000" dirty="0"/>
+              <a:t>maintainPlayerDB</a:t>
+            </a:r>
+          </a:p>
+        </p:txBody>
+      </p:sp>
+      <p:sp>
+        <p:nvSpPr>
+          <p:cNvPr id="30" name="Left Brace 29">
+            <a:extLst>
+              <a:ext uri="{FF2B5EF4-FFF2-40B4-BE49-F238E27FC236}">
+                <a16:creationId xmlns:a16="http://schemas.microsoft.com/office/drawing/2014/main" id="{0EF15CB1-AB21-4C4E-B2FE-635329A4F3C6}"/>
               </a:ext>
             </a:extLst>
           </p:cNvPr>
@@ -4824,17 +6026,14 @@
           <p:nvPr/>
         </p:nvSpPr>
         <p:spPr>
-          <a:xfrm rot="16506388">
-            <a:off x="4024371" y="4555888"/>
-            <a:ext cx="924128" cy="846467"/>
+          <a:xfrm>
+            <a:off x="6755250" y="4050890"/>
+            <a:ext cx="304311" cy="844155"/>
           </a:xfrm>
-          <a:prstGeom prst="arc">
+          <a:prstGeom prst="leftBrace">
             <a:avLst/>
           </a:prstGeom>
-          <a:ln w="12700">
-            <a:headEnd type="triangle" w="med" len="med"/>
-            <a:tailEnd type="none" w="med" len="med"/>
-          </a:ln>
+          <a:ln w="28575"/>
         </p:spPr>
         <p:style>
           <a:lnRef idx="1">
@@ -4861,10 +6060,45 @@
       </p:sp>
       <p:sp>
         <p:nvSpPr>
-          <p:cNvPr id="50" name="Oval 49">
-            <a:extLst>
-              <a:ext uri="{FF2B5EF4-FFF2-40B4-BE49-F238E27FC236}">
-                <a16:creationId xmlns:a16="http://schemas.microsoft.com/office/drawing/2014/main" id="{E1C3C860-92F8-B34C-ADB2-CCAA485C5D01}"/>
+          <p:cNvPr id="31" name="TextBox 30">
+            <a:extLst>
+              <a:ext uri="{FF2B5EF4-FFF2-40B4-BE49-F238E27FC236}">
+                <a16:creationId xmlns:a16="http://schemas.microsoft.com/office/drawing/2014/main" id="{02E31234-BFB0-B144-A5BE-33DE8D19A758}"/>
+              </a:ext>
+            </a:extLst>
+          </p:cNvPr>
+          <p:cNvSpPr txBox="1"/>
+          <p:nvPr/>
+        </p:nvSpPr>
+        <p:spPr>
+          <a:xfrm>
+            <a:off x="5725065" y="4369106"/>
+            <a:ext cx="1079489" cy="230832"/>
+          </a:xfrm>
+          <a:prstGeom prst="rect">
+            <a:avLst/>
+          </a:prstGeom>
+          <a:noFill/>
+        </p:spPr>
+        <p:txBody>
+          <a:bodyPr wrap="square" rtlCol="0">
+            <a:spAutoFit/>
+          </a:bodyPr>
+          <a:lstStyle/>
+          <a:p>
+            <a:r>
+              <a:rPr lang="en-US" sz="900" dirty="0"/>
+              <a:t>PoolTeamRegistry</a:t>
+            </a:r>
+          </a:p>
+        </p:txBody>
+      </p:sp>
+      <p:sp>
+        <p:nvSpPr>
+          <p:cNvPr id="80" name="Left Brace 79">
+            <a:extLst>
+              <a:ext uri="{FF2B5EF4-FFF2-40B4-BE49-F238E27FC236}">
+                <a16:creationId xmlns:a16="http://schemas.microsoft.com/office/drawing/2014/main" id="{F75D39F8-E96C-6842-B0E6-2EBD440FBB42}"/>
               </a:ext>
             </a:extLst>
           </p:cNvPr>
@@ -4873,88 +6107,13 @@
         </p:nvSpPr>
         <p:spPr>
           <a:xfrm>
-            <a:off x="1255945" y="4315694"/>
-            <a:ext cx="2074537" cy="432881"/>
+            <a:off x="6769919" y="5755730"/>
+            <a:ext cx="304311" cy="552094"/>
           </a:xfrm>
-          <a:prstGeom prst="ellipse">
+          <a:prstGeom prst="leftBrace">
             <a:avLst/>
           </a:prstGeom>
-          <a:solidFill>
-            <a:schemeClr val="accent4">
-              <a:lumMod val="75000"/>
-            </a:schemeClr>
-          </a:solidFill>
-          <a:ln>
-            <a:solidFill>
-              <a:schemeClr val="accent4">
-                <a:lumMod val="50000"/>
-              </a:schemeClr>
-            </a:solidFill>
-          </a:ln>
-        </p:spPr>
-        <p:style>
-          <a:lnRef idx="2">
-            <a:schemeClr val="accent1">
-              <a:shade val="50000"/>
-            </a:schemeClr>
-          </a:lnRef>
-          <a:fillRef idx="1">
-            <a:schemeClr val="accent1"/>
-          </a:fillRef>
-          <a:effectRef idx="0">
-            <a:schemeClr val="accent1"/>
-          </a:effectRef>
-          <a:fontRef idx="minor">
-            <a:schemeClr val="lt1"/>
-          </a:fontRef>
-        </p:style>
-        <p:txBody>
-          <a:bodyPr rtlCol="0" anchor="ctr"/>
-          <a:lstStyle/>
-          <a:p>
-            <a:pPr algn="ctr"/>
-            <a:endParaRPr lang="en-US" sz="1200" dirty="0"/>
-          </a:p>
-          <a:p>
-            <a:pPr algn="ctr"/>
-            <a:r>
-              <a:rPr lang="en-US" sz="1400" dirty="0" err="1"/>
-              <a:t>RenderPool.py</a:t>
-            </a:r>
-            <a:endParaRPr lang="en-US" sz="1400" dirty="0"/>
-          </a:p>
-          <a:p>
-            <a:pPr algn="ctr"/>
-            <a:endParaRPr lang="en-US" dirty="0"/>
-          </a:p>
-        </p:txBody>
-      </p:sp>
-      <p:cxnSp>
-        <p:nvCxnSpPr>
-          <p:cNvPr id="51" name="Straight Arrow Connector 50">
-            <a:extLst>
-              <a:ext uri="{FF2B5EF4-FFF2-40B4-BE49-F238E27FC236}">
-                <a16:creationId xmlns:a16="http://schemas.microsoft.com/office/drawing/2014/main" id="{1826B866-6FF1-D941-BEE7-6EE9B76AF29C}"/>
-              </a:ext>
-            </a:extLst>
-          </p:cNvPr>
-          <p:cNvCxnSpPr>
-            <a:cxnSpLocks/>
-          </p:cNvCxnSpPr>
-          <p:nvPr/>
-        </p:nvCxnSpPr>
-        <p:spPr>
-          <a:xfrm>
-            <a:off x="891701" y="4264781"/>
-            <a:ext cx="364244" cy="128891"/>
-          </a:xfrm>
-          <a:prstGeom prst="straightConnector1">
-            <a:avLst/>
-          </a:prstGeom>
-          <a:ln w="12700">
-            <a:headEnd type="triangle"/>
-            <a:tailEnd type="triangle"/>
-          </a:ln>
+          <a:ln w="28575"/>
         </p:spPr>
         <p:style>
           <a:lnRef idx="1">
@@ -4970,110 +6129,31 @@
             <a:schemeClr val="tx1"/>
           </a:fontRef>
         </p:style>
-      </p:cxnSp>
-      <p:sp>
-        <p:nvSpPr>
-          <p:cNvPr id="52" name="Arc 51">
-            <a:extLst>
-              <a:ext uri="{FF2B5EF4-FFF2-40B4-BE49-F238E27FC236}">
-                <a16:creationId xmlns:a16="http://schemas.microsoft.com/office/drawing/2014/main" id="{33DFE93A-BDEF-D940-B1C1-C7E3B4A27EED}"/>
-              </a:ext>
-            </a:extLst>
-          </p:cNvPr>
-          <p:cNvSpPr/>
+        <p:txBody>
+          <a:bodyPr rtlCol="0" anchor="ctr"/>
+          <a:lstStyle/>
+          <a:p>
+            <a:pPr algn="ctr"/>
+            <a:endParaRPr lang="en-US"/>
+          </a:p>
+        </p:txBody>
+      </p:sp>
+      <p:sp>
+        <p:nvSpPr>
+          <p:cNvPr id="81" name="TextBox 80">
+            <a:extLst>
+              <a:ext uri="{FF2B5EF4-FFF2-40B4-BE49-F238E27FC236}">
+                <a16:creationId xmlns:a16="http://schemas.microsoft.com/office/drawing/2014/main" id="{E2FC7433-E22B-AE43-9EA4-F260EDAD1F45}"/>
+              </a:ext>
+            </a:extLst>
+          </p:cNvPr>
+          <p:cNvSpPr txBox="1"/>
           <p:nvPr/>
         </p:nvSpPr>
         <p:spPr>
           <a:xfrm>
-            <a:off x="2805272" y="4542019"/>
-            <a:ext cx="1116139" cy="805122"/>
-          </a:xfrm>
-          <a:prstGeom prst="arc">
-            <a:avLst>
-              <a:gd name="adj1" fmla="val 16011110"/>
-              <a:gd name="adj2" fmla="val 0"/>
-            </a:avLst>
-          </a:prstGeom>
-          <a:ln w="19050">
-            <a:headEnd type="triangle" w="med" len="med"/>
-            <a:tailEnd type="none" w="med" len="med"/>
-          </a:ln>
-        </p:spPr>
-        <p:style>
-          <a:lnRef idx="1">
-            <a:schemeClr val="accent1"/>
-          </a:lnRef>
-          <a:fillRef idx="0">
-            <a:schemeClr val="accent1"/>
-          </a:fillRef>
-          <a:effectRef idx="0">
-            <a:schemeClr val="accent1"/>
-          </a:effectRef>
-          <a:fontRef idx="minor">
-            <a:schemeClr val="tx1"/>
-          </a:fontRef>
-        </p:style>
-        <p:txBody>
-          <a:bodyPr rtlCol="0" anchor="ctr"/>
-          <a:lstStyle/>
-          <a:p>
-            <a:pPr algn="ctr"/>
-            <a:endParaRPr lang="en-US"/>
-          </a:p>
-        </p:txBody>
-      </p:sp>
-      <p:pic>
-        <p:nvPicPr>
-          <p:cNvPr id="53" name="Picture 52" descr="A picture containing lamp, light&#10;&#10;Description automatically generated">
-            <a:extLst>
-              <a:ext uri="{FF2B5EF4-FFF2-40B4-BE49-F238E27FC236}">
-                <a16:creationId xmlns:a16="http://schemas.microsoft.com/office/drawing/2014/main" id="{970CE395-0A67-1F46-9275-85F1604CA04B}"/>
-              </a:ext>
-            </a:extLst>
-          </p:cNvPr>
-          <p:cNvPicPr>
-            <a:picLocks noChangeAspect="1"/>
-          </p:cNvPicPr>
-          <p:nvPr/>
-        </p:nvPicPr>
-        <p:blipFill>
-          <a:blip r:embed="rId2">
-            <a:extLst>
-              <a:ext uri="{28A0092B-C50C-407E-A947-70E740481C1C}">
-                <a14:useLocalDpi xmlns:a14="http://schemas.microsoft.com/office/drawing/2010/main" val="0"/>
-              </a:ext>
-            </a:extLst>
-          </a:blip>
-          <a:stretch>
-            <a:fillRect/>
-          </a:stretch>
-        </p:blipFill>
-        <p:spPr>
-          <a:xfrm>
-            <a:off x="-146050" y="258354"/>
-            <a:ext cx="1205504" cy="1205504"/>
-          </a:xfrm>
-          <a:prstGeom prst="rect">
-            <a:avLst/>
-          </a:prstGeom>
-        </p:spPr>
-      </p:pic>
-      <p:sp>
-        <p:nvSpPr>
-          <p:cNvPr id="54" name="TextBox 53">
-            <a:extLst>
-              <a:ext uri="{FF2B5EF4-FFF2-40B4-BE49-F238E27FC236}">
-                <a16:creationId xmlns:a16="http://schemas.microsoft.com/office/drawing/2014/main" id="{2513FBFE-FCDE-C445-9117-C689CB0B3FB5}"/>
-              </a:ext>
-            </a:extLst>
-          </p:cNvPr>
-          <p:cNvSpPr txBox="1"/>
-          <p:nvPr/>
-        </p:nvSpPr>
-        <p:spPr>
-          <a:xfrm>
-            <a:off x="349620" y="3181946"/>
-            <a:ext cx="1448405" cy="461665"/>
+            <a:off x="5849446" y="5916361"/>
+            <a:ext cx="978358" cy="230832"/>
           </a:xfrm>
           <a:prstGeom prst="rect">
             <a:avLst/>
@@ -5087,453 +6167,8 @@
           <a:lstStyle/>
           <a:p>
             <a:r>
-              <a:rPr lang="en-US" sz="2400" dirty="0"/>
-              <a:t>Option 1</a:t>
-            </a:r>
-          </a:p>
-        </p:txBody>
-      </p:sp>
-      <p:sp>
-        <p:nvSpPr>
-          <p:cNvPr id="55" name="Oval 54">
-            <a:extLst>
-              <a:ext uri="{FF2B5EF4-FFF2-40B4-BE49-F238E27FC236}">
-                <a16:creationId xmlns:a16="http://schemas.microsoft.com/office/drawing/2014/main" id="{183F7428-C8C5-6E44-B265-5D61B06D274D}"/>
-              </a:ext>
-            </a:extLst>
-          </p:cNvPr>
-          <p:cNvSpPr/>
-          <p:nvPr/>
-        </p:nvSpPr>
-        <p:spPr>
-          <a:xfrm>
-            <a:off x="1206815" y="5293559"/>
-            <a:ext cx="2074537" cy="432881"/>
-          </a:xfrm>
-          <a:prstGeom prst="ellipse">
-            <a:avLst/>
-          </a:prstGeom>
-          <a:solidFill>
-            <a:schemeClr val="accent4">
-              <a:lumMod val="75000"/>
-            </a:schemeClr>
-          </a:solidFill>
-          <a:ln>
-            <a:solidFill>
-              <a:schemeClr val="accent4">
-                <a:lumMod val="50000"/>
-              </a:schemeClr>
-            </a:solidFill>
-          </a:ln>
-        </p:spPr>
-        <p:style>
-          <a:lnRef idx="2">
-            <a:schemeClr val="accent1">
-              <a:shade val="50000"/>
-            </a:schemeClr>
-          </a:lnRef>
-          <a:fillRef idx="1">
-            <a:schemeClr val="accent1"/>
-          </a:fillRef>
-          <a:effectRef idx="0">
-            <a:schemeClr val="accent1"/>
-          </a:effectRef>
-          <a:fontRef idx="minor">
-            <a:schemeClr val="lt1"/>
-          </a:fontRef>
-        </p:style>
-        <p:txBody>
-          <a:bodyPr rtlCol="0" anchor="ctr"/>
-          <a:lstStyle/>
-          <a:p>
-            <a:pPr algn="ctr"/>
-            <a:endParaRPr lang="en-US" sz="1200" dirty="0"/>
-          </a:p>
-          <a:p>
-            <a:pPr algn="ctr"/>
-            <a:r>
-              <a:rPr lang="en-US" sz="1400" dirty="0" err="1"/>
-              <a:t>PoolEntry.py</a:t>
-            </a:r>
-            <a:endParaRPr lang="en-US" sz="1400" dirty="0"/>
-          </a:p>
-          <a:p>
-            <a:pPr algn="ctr"/>
-            <a:endParaRPr lang="en-US" dirty="0"/>
-          </a:p>
-        </p:txBody>
-      </p:sp>
-      <p:sp>
-        <p:nvSpPr>
-          <p:cNvPr id="56" name="Arc 55">
-            <a:extLst>
-              <a:ext uri="{FF2B5EF4-FFF2-40B4-BE49-F238E27FC236}">
-                <a16:creationId xmlns:a16="http://schemas.microsoft.com/office/drawing/2014/main" id="{2DD921C6-1BE0-434F-A53B-E0B9368FF196}"/>
-              </a:ext>
-            </a:extLst>
-          </p:cNvPr>
-          <p:cNvSpPr/>
-          <p:nvPr/>
-        </p:nvSpPr>
-        <p:spPr>
-          <a:xfrm rot="17275121">
-            <a:off x="2976527" y="5067510"/>
-            <a:ext cx="568728" cy="560131"/>
-          </a:xfrm>
-          <a:prstGeom prst="arc">
-            <a:avLst/>
-          </a:prstGeom>
-          <a:ln w="12700">
-            <a:headEnd type="none" w="med" len="med"/>
-            <a:tailEnd type="triangle" w="med" len="med"/>
-          </a:ln>
-        </p:spPr>
-        <p:style>
-          <a:lnRef idx="1">
-            <a:schemeClr val="accent1"/>
-          </a:lnRef>
-          <a:fillRef idx="0">
-            <a:schemeClr val="accent1"/>
-          </a:fillRef>
-          <a:effectRef idx="0">
-            <a:schemeClr val="accent1"/>
-          </a:effectRef>
-          <a:fontRef idx="minor">
-            <a:schemeClr val="tx1"/>
-          </a:fontRef>
-        </p:style>
-        <p:txBody>
-          <a:bodyPr rtlCol="0" anchor="ctr"/>
-          <a:lstStyle/>
-          <a:p>
-            <a:pPr algn="ctr"/>
-            <a:endParaRPr lang="en-US"/>
-          </a:p>
-        </p:txBody>
-      </p:sp>
-      <p:sp>
-        <p:nvSpPr>
-          <p:cNvPr id="57" name="Oval 56">
-            <a:extLst>
-              <a:ext uri="{FF2B5EF4-FFF2-40B4-BE49-F238E27FC236}">
-                <a16:creationId xmlns:a16="http://schemas.microsoft.com/office/drawing/2014/main" id="{601AE9CA-21EF-A149-8798-F16BBFDC9B61}"/>
-              </a:ext>
-            </a:extLst>
-          </p:cNvPr>
-          <p:cNvSpPr/>
-          <p:nvPr/>
-        </p:nvSpPr>
-        <p:spPr>
-          <a:xfrm>
-            <a:off x="1242453" y="2020872"/>
-            <a:ext cx="2074537" cy="432881"/>
-          </a:xfrm>
-          <a:prstGeom prst="ellipse">
-            <a:avLst/>
-          </a:prstGeom>
-          <a:solidFill>
-            <a:schemeClr val="accent4">
-              <a:lumMod val="75000"/>
-            </a:schemeClr>
-          </a:solidFill>
-          <a:ln>
-            <a:solidFill>
-              <a:schemeClr val="accent4">
-                <a:lumMod val="50000"/>
-              </a:schemeClr>
-            </a:solidFill>
-          </a:ln>
-        </p:spPr>
-        <p:style>
-          <a:lnRef idx="2">
-            <a:schemeClr val="accent1">
-              <a:shade val="50000"/>
-            </a:schemeClr>
-          </a:lnRef>
-          <a:fillRef idx="1">
-            <a:schemeClr val="accent1"/>
-          </a:fillRef>
-          <a:effectRef idx="0">
-            <a:schemeClr val="accent1"/>
-          </a:effectRef>
-          <a:fontRef idx="minor">
-            <a:schemeClr val="lt1"/>
-          </a:fontRef>
-        </p:style>
-        <p:txBody>
-          <a:bodyPr rtlCol="0" anchor="ctr"/>
-          <a:lstStyle/>
-          <a:p>
-            <a:pPr algn="ctr"/>
-            <a:endParaRPr lang="en-US" sz="1200" dirty="0"/>
-          </a:p>
-          <a:p>
-            <a:pPr algn="ctr"/>
-            <a:r>
-              <a:rPr lang="en-US" sz="1400" dirty="0" err="1"/>
-              <a:t>PoolEntry.py</a:t>
-            </a:r>
-            <a:endParaRPr lang="en-US" sz="1400" dirty="0"/>
-          </a:p>
-          <a:p>
-            <a:pPr algn="ctr"/>
-            <a:endParaRPr lang="en-US" dirty="0"/>
-          </a:p>
-        </p:txBody>
-      </p:sp>
-      <p:sp>
-        <p:nvSpPr>
-          <p:cNvPr id="58" name="Arc 57">
-            <a:extLst>
-              <a:ext uri="{FF2B5EF4-FFF2-40B4-BE49-F238E27FC236}">
-                <a16:creationId xmlns:a16="http://schemas.microsoft.com/office/drawing/2014/main" id="{A41F773A-BEC8-DA44-8439-0617EC8465A3}"/>
-              </a:ext>
-            </a:extLst>
-          </p:cNvPr>
-          <p:cNvSpPr/>
-          <p:nvPr/>
-        </p:nvSpPr>
-        <p:spPr>
-          <a:xfrm rot="17275121">
-            <a:off x="3012165" y="1794823"/>
-            <a:ext cx="568728" cy="560131"/>
-          </a:xfrm>
-          <a:prstGeom prst="arc">
-            <a:avLst/>
-          </a:prstGeom>
-          <a:ln w="12700">
-            <a:headEnd type="none" w="med" len="med"/>
-            <a:tailEnd type="triangle" w="med" len="med"/>
-          </a:ln>
-        </p:spPr>
-        <p:style>
-          <a:lnRef idx="1">
-            <a:schemeClr val="accent1"/>
-          </a:lnRef>
-          <a:fillRef idx="0">
-            <a:schemeClr val="accent1"/>
-          </a:fillRef>
-          <a:effectRef idx="0">
-            <a:schemeClr val="accent1"/>
-          </a:effectRef>
-          <a:fontRef idx="minor">
-            <a:schemeClr val="tx1"/>
-          </a:fontRef>
-        </p:style>
-        <p:txBody>
-          <a:bodyPr rtlCol="0" anchor="ctr"/>
-          <a:lstStyle/>
-          <a:p>
-            <a:pPr algn="ctr"/>
-            <a:endParaRPr lang="en-US"/>
-          </a:p>
-        </p:txBody>
-      </p:sp>
-      <p:sp>
-        <p:nvSpPr>
-          <p:cNvPr id="60" name="TextBox 59">
-            <a:extLst>
-              <a:ext uri="{FF2B5EF4-FFF2-40B4-BE49-F238E27FC236}">
-                <a16:creationId xmlns:a16="http://schemas.microsoft.com/office/drawing/2014/main" id="{6E2E68D4-6739-E445-A5A7-9C77EB14D0C1}"/>
-              </a:ext>
-            </a:extLst>
-          </p:cNvPr>
-          <p:cNvSpPr txBox="1"/>
-          <p:nvPr/>
-        </p:nvSpPr>
-        <p:spPr>
-          <a:xfrm>
-            <a:off x="8225094" y="3767595"/>
-            <a:ext cx="4036982" cy="3139321"/>
-          </a:xfrm>
-          <a:prstGeom prst="rect">
-            <a:avLst/>
-          </a:prstGeom>
-          <a:noFill/>
-        </p:spPr>
-        <p:txBody>
-          <a:bodyPr wrap="square" rtlCol="0">
-            <a:spAutoFit/>
-          </a:bodyPr>
-          <a:lstStyle/>
-          <a:p>
-            <a:r>
-              <a:rPr lang="en-US" i="1" dirty="0" err="1">
-                <a:solidFill>
-                  <a:srgbClr val="FF0000"/>
-                </a:solidFill>
-              </a:rPr>
-              <a:t>PoolTeams</a:t>
-            </a:r>
-            <a:r>
-              <a:rPr lang="en-US" dirty="0">
-                <a:solidFill>
-                  <a:srgbClr val="FF0000"/>
-                </a:solidFill>
-              </a:rPr>
-              <a:t>:</a:t>
-            </a:r>
-          </a:p>
-          <a:p>
-            <a:r>
-              <a:rPr lang="en-US" dirty="0" err="1">
-                <a:solidFill>
-                  <a:srgbClr val="FF0000"/>
-                </a:solidFill>
-              </a:rPr>
-              <a:t>PoolTeamName</a:t>
-            </a:r>
-            <a:r>
-              <a:rPr lang="en-US" dirty="0">
-                <a:solidFill>
-                  <a:srgbClr val="FF0000"/>
-                </a:solidFill>
-              </a:rPr>
-              <a:t>: [</a:t>
-            </a:r>
-            <a:r>
-              <a:rPr lang="en-US" dirty="0" err="1">
-                <a:solidFill>
-                  <a:srgbClr val="FF0000"/>
-                </a:solidFill>
-              </a:rPr>
-              <a:t>QuadSquad</a:t>
-            </a:r>
-            <a:r>
-              <a:rPr lang="en-US" dirty="0">
-                <a:solidFill>
-                  <a:srgbClr val="FF0000"/>
-                </a:solidFill>
-              </a:rPr>
-              <a:t>]</a:t>
-            </a:r>
-          </a:p>
-          <a:p>
-            <a:r>
-              <a:rPr lang="en-US" dirty="0">
-                <a:solidFill>
-                  <a:srgbClr val="FF0000"/>
-                </a:solidFill>
-              </a:rPr>
-              <a:t>GM: [GM Name]</a:t>
-            </a:r>
-          </a:p>
-          <a:p>
-            <a:r>
-              <a:rPr lang="en-US" dirty="0">
-                <a:solidFill>
-                  <a:srgbClr val="FF0000"/>
-                </a:solidFill>
-              </a:rPr>
-              <a:t>Email:</a:t>
-            </a:r>
-          </a:p>
-          <a:p>
-            <a:r>
-              <a:rPr lang="en-US" dirty="0">
-                <a:solidFill>
-                  <a:srgbClr val="FF0000"/>
-                </a:solidFill>
-              </a:rPr>
-              <a:t>Pay Status: [</a:t>
-            </a:r>
-            <a:r>
-              <a:rPr lang="en-US" dirty="0" err="1">
-                <a:solidFill>
-                  <a:srgbClr val="FF0000"/>
-                </a:solidFill>
-              </a:rPr>
-              <a:t>NotPaid</a:t>
-            </a:r>
-            <a:r>
-              <a:rPr lang="en-US" dirty="0">
-                <a:solidFill>
-                  <a:srgbClr val="FF0000"/>
-                </a:solidFill>
-              </a:rPr>
-              <a:t>, PayPal, Cheque, Cash, Coupon]</a:t>
-            </a:r>
-          </a:p>
-          <a:p>
-            <a:r>
-              <a:rPr lang="en-US" dirty="0">
-                <a:solidFill>
-                  <a:srgbClr val="FF0000"/>
-                </a:solidFill>
-              </a:rPr>
-              <a:t>Pay Amount: </a:t>
-            </a:r>
-          </a:p>
-          <a:p>
-            <a:r>
-              <a:rPr lang="en-US" dirty="0">
-                <a:solidFill>
-                  <a:srgbClr val="FF0000"/>
-                </a:solidFill>
-              </a:rPr>
-              <a:t>Status:  [Incomplete, complete]  </a:t>
-            </a:r>
-          </a:p>
-          <a:p>
-            <a:endParaRPr lang="en-US" dirty="0">
-              <a:solidFill>
-                <a:srgbClr val="FF0000"/>
-              </a:solidFill>
-            </a:endParaRPr>
-          </a:p>
-          <a:p>
-            <a:r>
-              <a:rPr lang="en-US" dirty="0">
-                <a:solidFill>
-                  <a:srgbClr val="FF0000"/>
-                </a:solidFill>
-              </a:rPr>
-              <a:t>25* </a:t>
-            </a:r>
-          </a:p>
-          <a:p>
-            <a:r>
-              <a:rPr lang="en-US" dirty="0">
-                <a:solidFill>
-                  <a:srgbClr val="FF0000"/>
-                </a:solidFill>
-              </a:rPr>
-              <a:t>ID, Name, Team, G, A, W, SO, Pts, State</a:t>
-            </a:r>
-          </a:p>
-        </p:txBody>
-      </p:sp>
-      <p:sp>
-        <p:nvSpPr>
-          <p:cNvPr id="61" name="TextBox 60">
-            <a:extLst>
-              <a:ext uri="{FF2B5EF4-FFF2-40B4-BE49-F238E27FC236}">
-                <a16:creationId xmlns:a16="http://schemas.microsoft.com/office/drawing/2014/main" id="{6269E819-363C-0F47-9F95-53DF3E3E3E09}"/>
-              </a:ext>
-            </a:extLst>
-          </p:cNvPr>
-          <p:cNvSpPr txBox="1"/>
-          <p:nvPr/>
-        </p:nvSpPr>
-        <p:spPr>
-          <a:xfrm>
-            <a:off x="456702" y="6252446"/>
-            <a:ext cx="1448405" cy="461665"/>
-          </a:xfrm>
-          <a:prstGeom prst="rect">
-            <a:avLst/>
-          </a:prstGeom>
-          <a:noFill/>
-        </p:spPr>
-        <p:txBody>
-          <a:bodyPr wrap="square" rtlCol="0">
-            <a:spAutoFit/>
-          </a:bodyPr>
-          <a:lstStyle/>
-          <a:p>
-            <a:r>
-              <a:rPr lang="en-US" sz="2400" dirty="0"/>
-              <a:t>Option 2</a:t>
+              <a:rPr lang="en-US" sz="900" dirty="0"/>
+              <a:t>PlayerSelection</a:t>
             </a:r>
           </a:p>
         </p:txBody>

</xml_diff>

<commit_message>
Updated the Design Document
</commit_message>
<xml_diff>
--- a/JHP_Design.pptx
+++ b/JHP_Design.pptx
@@ -6,8 +6,8 @@
   </p:sldMasterIdLst>
   <p:sldIdLst>
     <p:sldId id="257" r:id="rId2"/>
-    <p:sldId id="258" r:id="rId3"/>
-    <p:sldId id="259" r:id="rId4"/>
+    <p:sldId id="259" r:id="rId3"/>
+    <p:sldId id="258" r:id="rId4"/>
   </p:sldIdLst>
   <p:sldSz cx="12192000" cy="6858000"/>
   <p:notesSz cx="6858000" cy="9144000"/>
@@ -261,7 +261,7 @@
           <a:p>
             <a:fld id="{65F3756F-6BA0-BE41-9226-AD7D2B2262FF}" type="datetimeFigureOut">
               <a:rPr lang="en-US" smtClean="0"/>
-              <a:t>7/22/20</a:t>
+              <a:t>7/23/20</a:t>
             </a:fld>
             <a:endParaRPr lang="en-US"/>
           </a:p>
@@ -459,7 +459,7 @@
           <a:p>
             <a:fld id="{65F3756F-6BA0-BE41-9226-AD7D2B2262FF}" type="datetimeFigureOut">
               <a:rPr lang="en-US" smtClean="0"/>
-              <a:t>7/22/20</a:t>
+              <a:t>7/23/20</a:t>
             </a:fld>
             <a:endParaRPr lang="en-US"/>
           </a:p>
@@ -667,7 +667,7 @@
           <a:p>
             <a:fld id="{65F3756F-6BA0-BE41-9226-AD7D2B2262FF}" type="datetimeFigureOut">
               <a:rPr lang="en-US" smtClean="0"/>
-              <a:t>7/22/20</a:t>
+              <a:t>7/23/20</a:t>
             </a:fld>
             <a:endParaRPr lang="en-US"/>
           </a:p>
@@ -865,7 +865,7 @@
           <a:p>
             <a:fld id="{65F3756F-6BA0-BE41-9226-AD7D2B2262FF}" type="datetimeFigureOut">
               <a:rPr lang="en-US" smtClean="0"/>
-              <a:t>7/22/20</a:t>
+              <a:t>7/23/20</a:t>
             </a:fld>
             <a:endParaRPr lang="en-US"/>
           </a:p>
@@ -1140,7 +1140,7 @@
           <a:p>
             <a:fld id="{65F3756F-6BA0-BE41-9226-AD7D2B2262FF}" type="datetimeFigureOut">
               <a:rPr lang="en-US" smtClean="0"/>
-              <a:t>7/22/20</a:t>
+              <a:t>7/23/20</a:t>
             </a:fld>
             <a:endParaRPr lang="en-US"/>
           </a:p>
@@ -1405,7 +1405,7 @@
           <a:p>
             <a:fld id="{65F3756F-6BA0-BE41-9226-AD7D2B2262FF}" type="datetimeFigureOut">
               <a:rPr lang="en-US" smtClean="0"/>
-              <a:t>7/22/20</a:t>
+              <a:t>7/23/20</a:t>
             </a:fld>
             <a:endParaRPr lang="en-US"/>
           </a:p>
@@ -1817,7 +1817,7 @@
           <a:p>
             <a:fld id="{65F3756F-6BA0-BE41-9226-AD7D2B2262FF}" type="datetimeFigureOut">
               <a:rPr lang="en-US" smtClean="0"/>
-              <a:t>7/22/20</a:t>
+              <a:t>7/23/20</a:t>
             </a:fld>
             <a:endParaRPr lang="en-US"/>
           </a:p>
@@ -1958,7 +1958,7 @@
           <a:p>
             <a:fld id="{65F3756F-6BA0-BE41-9226-AD7D2B2262FF}" type="datetimeFigureOut">
               <a:rPr lang="en-US" smtClean="0"/>
-              <a:t>7/22/20</a:t>
+              <a:t>7/23/20</a:t>
             </a:fld>
             <a:endParaRPr lang="en-US"/>
           </a:p>
@@ -2071,7 +2071,7 @@
           <a:p>
             <a:fld id="{65F3756F-6BA0-BE41-9226-AD7D2B2262FF}" type="datetimeFigureOut">
               <a:rPr lang="en-US" smtClean="0"/>
-              <a:t>7/22/20</a:t>
+              <a:t>7/23/20</a:t>
             </a:fld>
             <a:endParaRPr lang="en-US"/>
           </a:p>
@@ -2382,7 +2382,7 @@
           <a:p>
             <a:fld id="{65F3756F-6BA0-BE41-9226-AD7D2B2262FF}" type="datetimeFigureOut">
               <a:rPr lang="en-US" smtClean="0"/>
-              <a:t>7/22/20</a:t>
+              <a:t>7/23/20</a:t>
             </a:fld>
             <a:endParaRPr lang="en-US"/>
           </a:p>
@@ -2670,7 +2670,7 @@
           <a:p>
             <a:fld id="{65F3756F-6BA0-BE41-9226-AD7D2B2262FF}" type="datetimeFigureOut">
               <a:rPr lang="en-US" smtClean="0"/>
-              <a:t>7/22/20</a:t>
+              <a:t>7/23/20</a:t>
             </a:fld>
             <a:endParaRPr lang="en-US"/>
           </a:p>
@@ -2911,7 +2911,7 @@
           <a:p>
             <a:fld id="{65F3756F-6BA0-BE41-9226-AD7D2B2262FF}" type="datetimeFigureOut">
               <a:rPr lang="en-US" smtClean="0"/>
-              <a:t>7/22/20</a:t>
+              <a:t>7/23/20</a:t>
             </a:fld>
             <a:endParaRPr lang="en-US"/>
           </a:p>
@@ -3429,7 +3429,7 @@
         </p:nvSpPr>
         <p:spPr>
           <a:xfrm>
-            <a:off x="909984" y="1619821"/>
+            <a:off x="102264" y="1619821"/>
             <a:ext cx="2516650" cy="2093204"/>
           </a:xfrm>
           <a:prstGeom prst="ellipse">
@@ -3480,7 +3480,7 @@
         </p:nvSpPr>
         <p:spPr>
           <a:xfrm>
-            <a:off x="1590125" y="1742972"/>
+            <a:off x="782405" y="1742972"/>
             <a:ext cx="1396536" cy="246221"/>
           </a:xfrm>
           <a:prstGeom prst="rect">
@@ -3812,7 +3812,7 @@
         <p:spPr>
           <a:xfrm>
             <a:off x="6636802" y="2171862"/>
-            <a:ext cx="1116139" cy="369332"/>
+            <a:ext cx="1073499" cy="461665"/>
           </a:xfrm>
           <a:prstGeom prst="rect">
             <a:avLst/>
@@ -3825,9 +3825,17 @@
           </a:bodyPr>
           <a:lstStyle/>
           <a:p>
-            <a:r>
-              <a:rPr lang="en-US" dirty="0"/>
-              <a:t>playersDB</a:t>
+            <a:pPr algn="ctr"/>
+            <a:r>
+              <a:rPr lang="en-US" sz="1200" dirty="0"/>
+              <a:t>active_players</a:t>
+            </a:r>
+          </a:p>
+          <a:p>
+            <a:pPr algn="ctr"/>
+            <a:r>
+              <a:rPr lang="en-US" sz="1200" dirty="0"/>
+              <a:t>table</a:t>
             </a:r>
           </a:p>
         </p:txBody>
@@ -4143,8 +4151,8 @@
         </p:nvSpPr>
         <p:spPr>
           <a:xfrm>
-            <a:off x="3529180" y="2184184"/>
-            <a:ext cx="870751" cy="369332"/>
+            <a:off x="3535316" y="2251983"/>
+            <a:ext cx="884345" cy="461665"/>
           </a:xfrm>
           <a:prstGeom prst="rect">
             <a:avLst/>
@@ -4157,9 +4165,17 @@
           </a:bodyPr>
           <a:lstStyle/>
           <a:p>
-            <a:r>
-              <a:rPr lang="en-US" dirty="0"/>
-              <a:t>poolDB</a:t>
+            <a:pPr algn="ctr"/>
+            <a:r>
+              <a:rPr lang="en-US" sz="1200" dirty="0"/>
+              <a:t>entry_stats</a:t>
+            </a:r>
+          </a:p>
+          <a:p>
+            <a:pPr algn="ctr"/>
+            <a:r>
+              <a:rPr lang="en-US" sz="1200" dirty="0"/>
+              <a:t>table</a:t>
             </a:r>
           </a:p>
         </p:txBody>
@@ -4178,8 +4194,8 @@
         </p:nvSpPr>
         <p:spPr>
           <a:xfrm>
-            <a:off x="4569451" y="980064"/>
-            <a:ext cx="2313559" cy="541959"/>
+            <a:off x="7801685" y="1575927"/>
+            <a:ext cx="2408715" cy="541959"/>
           </a:xfrm>
           <a:prstGeom prst="ellipse">
             <a:avLst/>
@@ -4225,9 +4241,7 @@
             <a:r>
               <a:rPr lang="en-US" sz="1000" dirty="0">
                 <a:solidFill>
-                  <a:schemeClr val="accent6">
-                    <a:lumMod val="50000"/>
-                  </a:schemeClr>
+                  <a:schemeClr val="bg1"/>
                 </a:solidFill>
               </a:rPr>
               <a:t>PoolUpdate.py</a:t>
@@ -4246,7 +4260,27 @@
                   </a:schemeClr>
                 </a:solidFill>
               </a:rPr>
-              <a:t>Update 200 entry tables</a:t>
+              <a:t>Update </a:t>
+            </a:r>
+            <a:r>
+              <a:rPr lang="en-US" sz="1000" dirty="0" err="1">
+                <a:solidFill>
+                  <a:schemeClr val="accent6">
+                    <a:lumMod val="50000"/>
+                  </a:schemeClr>
+                </a:solidFill>
+              </a:rPr>
+              <a:t>entry_stats</a:t>
+            </a:r>
+            <a:r>
+              <a:rPr lang="en-US" sz="1000" dirty="0">
+                <a:solidFill>
+                  <a:schemeClr val="accent6">
+                    <a:lumMod val="50000"/>
+                  </a:schemeClr>
+                </a:solidFill>
+              </a:rPr>
+              <a:t>_ table</a:t>
             </a:r>
           </a:p>
           <a:p>
@@ -4504,7 +4538,7 @@
         </p:nvSpPr>
         <p:spPr>
           <a:xfrm>
-            <a:off x="1104634" y="2852065"/>
+            <a:off x="296914" y="2852065"/>
             <a:ext cx="2188571" cy="432881"/>
           </a:xfrm>
           <a:prstGeom prst="ellipse">
@@ -4877,7 +4911,7 @@
         </p:nvSpPr>
         <p:spPr>
           <a:xfrm>
-            <a:off x="1090226" y="2247923"/>
+            <a:off x="282506" y="2247923"/>
             <a:ext cx="2163967" cy="432881"/>
           </a:xfrm>
           <a:prstGeom prst="ellipse">
@@ -4922,113 +4956,22 @@
           <a:p>
             <a:pPr algn="ctr"/>
             <a:r>
-              <a:rPr lang="en-US" sz="1400" dirty="0">
+              <a:rPr lang="en-US" sz="1400" dirty="0" err="1">
                 <a:solidFill>
                   <a:schemeClr val="bg1"/>
                 </a:solidFill>
               </a:rPr>
-              <a:t>EntryRegister.py</a:t>
-            </a:r>
+              <a:t>entryRegister.py</a:t>
+            </a:r>
+            <a:endParaRPr lang="en-US" sz="1400" dirty="0">
+              <a:solidFill>
+                <a:schemeClr val="bg1"/>
+              </a:solidFill>
+            </a:endParaRPr>
           </a:p>
           <a:p>
             <a:pPr algn="ctr"/>
             <a:endParaRPr lang="en-US" dirty="0"/>
-          </a:p>
-        </p:txBody>
-      </p:sp>
-      <p:sp>
-        <p:nvSpPr>
-          <p:cNvPr id="64" name="Arc 63">
-            <a:extLst>
-              <a:ext uri="{FF2B5EF4-FFF2-40B4-BE49-F238E27FC236}">
-                <a16:creationId xmlns:a16="http://schemas.microsoft.com/office/drawing/2014/main" id="{54190D2D-6718-F74D-A430-A0F54FD9BD7C}"/>
-              </a:ext>
-            </a:extLst>
-          </p:cNvPr>
-          <p:cNvSpPr/>
-          <p:nvPr/>
-        </p:nvSpPr>
-        <p:spPr>
-          <a:xfrm rot="17275121">
-            <a:off x="3016029" y="2684731"/>
-            <a:ext cx="568728" cy="560131"/>
-          </a:xfrm>
-          <a:prstGeom prst="arc">
-            <a:avLst/>
-          </a:prstGeom>
-          <a:ln w="12700">
-            <a:headEnd type="none" w="med" len="med"/>
-            <a:tailEnd type="triangle" w="med" len="med"/>
-          </a:ln>
-        </p:spPr>
-        <p:style>
-          <a:lnRef idx="1">
-            <a:schemeClr val="accent1"/>
-          </a:lnRef>
-          <a:fillRef idx="0">
-            <a:schemeClr val="accent1"/>
-          </a:fillRef>
-          <a:effectRef idx="0">
-            <a:schemeClr val="accent1"/>
-          </a:effectRef>
-          <a:fontRef idx="minor">
-            <a:schemeClr val="tx1"/>
-          </a:fontRef>
-        </p:style>
-        <p:txBody>
-          <a:bodyPr rtlCol="0" anchor="ctr"/>
-          <a:lstStyle/>
-          <a:p>
-            <a:pPr algn="ctr"/>
-            <a:endParaRPr lang="en-US"/>
-          </a:p>
-        </p:txBody>
-      </p:sp>
-      <p:sp>
-        <p:nvSpPr>
-          <p:cNvPr id="65" name="Arc 64">
-            <a:extLst>
-              <a:ext uri="{FF2B5EF4-FFF2-40B4-BE49-F238E27FC236}">
-                <a16:creationId xmlns:a16="http://schemas.microsoft.com/office/drawing/2014/main" id="{29F67BF9-AE72-794E-AB66-32AE161AFFC2}"/>
-              </a:ext>
-            </a:extLst>
-          </p:cNvPr>
-          <p:cNvSpPr/>
-          <p:nvPr/>
-        </p:nvSpPr>
-        <p:spPr>
-          <a:xfrm rot="17275121">
-            <a:off x="3095897" y="2134169"/>
-            <a:ext cx="568728" cy="560131"/>
-          </a:xfrm>
-          <a:prstGeom prst="arc">
-            <a:avLst/>
-          </a:prstGeom>
-          <a:ln w="12700">
-            <a:headEnd type="none" w="med" len="med"/>
-            <a:tailEnd type="triangle" w="med" len="med"/>
-          </a:ln>
-        </p:spPr>
-        <p:style>
-          <a:lnRef idx="1">
-            <a:schemeClr val="accent1"/>
-          </a:lnRef>
-          <a:fillRef idx="0">
-            <a:schemeClr val="accent1"/>
-          </a:fillRef>
-          <a:effectRef idx="0">
-            <a:schemeClr val="accent1"/>
-          </a:effectRef>
-          <a:fontRef idx="minor">
-            <a:schemeClr val="tx1"/>
-          </a:fontRef>
-        </p:style>
-        <p:txBody>
-          <a:bodyPr rtlCol="0" anchor="ctr"/>
-          <a:lstStyle/>
-          <a:p>
-            <a:pPr algn="ctr"/>
-            <a:endParaRPr lang="en-US"/>
           </a:p>
         </p:txBody>
       </p:sp>
@@ -6226,6 +6169,865 @@
           </a:p>
         </p:txBody>
       </p:sp>
+      <p:sp>
+        <p:nvSpPr>
+          <p:cNvPr id="23" name="Snip and Round Single Corner Rectangle 22">
+            <a:extLst>
+              <a:ext uri="{FF2B5EF4-FFF2-40B4-BE49-F238E27FC236}">
+                <a16:creationId xmlns:a16="http://schemas.microsoft.com/office/drawing/2014/main" id="{AFFC5995-CA2F-7549-B1C7-191C994CC3E7}"/>
+              </a:ext>
+            </a:extLst>
+          </p:cNvPr>
+          <p:cNvSpPr/>
+          <p:nvPr/>
+        </p:nvSpPr>
+        <p:spPr>
+          <a:xfrm>
+            <a:off x="2712719" y="2247923"/>
+            <a:ext cx="606709" cy="531755"/>
+          </a:xfrm>
+          <a:prstGeom prst="snipRoundRect">
+            <a:avLst/>
+          </a:prstGeom>
+        </p:spPr>
+        <p:style>
+          <a:lnRef idx="2">
+            <a:schemeClr val="accent1">
+              <a:shade val="50000"/>
+            </a:schemeClr>
+          </a:lnRef>
+          <a:fillRef idx="1">
+            <a:schemeClr val="accent1"/>
+          </a:fillRef>
+          <a:effectRef idx="0">
+            <a:schemeClr val="accent1"/>
+          </a:effectRef>
+          <a:fontRef idx="minor">
+            <a:schemeClr val="lt1"/>
+          </a:fontRef>
+        </p:style>
+        <p:txBody>
+          <a:bodyPr rtlCol="0" anchor="ctr"/>
+          <a:lstStyle/>
+          <a:p>
+            <a:pPr algn="ctr"/>
+            <a:r>
+              <a:rPr lang="en-US" sz="800" dirty="0"/>
+              <a:t>Pool_</a:t>
+            </a:r>
+          </a:p>
+          <a:p>
+            <a:pPr algn="ctr"/>
+            <a:r>
+              <a:rPr lang="en-US" sz="800" dirty="0"/>
+              <a:t>entry</a:t>
+            </a:r>
+          </a:p>
+        </p:txBody>
+      </p:sp>
+      <p:sp>
+        <p:nvSpPr>
+          <p:cNvPr id="55" name="Snip and Round Single Corner Rectangle 54">
+            <a:extLst>
+              <a:ext uri="{FF2B5EF4-FFF2-40B4-BE49-F238E27FC236}">
+                <a16:creationId xmlns:a16="http://schemas.microsoft.com/office/drawing/2014/main" id="{4F78ECCA-9F78-5443-B9B8-7E83853A61F4}"/>
+              </a:ext>
+            </a:extLst>
+          </p:cNvPr>
+          <p:cNvSpPr/>
+          <p:nvPr/>
+        </p:nvSpPr>
+        <p:spPr>
+          <a:xfrm>
+            <a:off x="2711359" y="2894477"/>
+            <a:ext cx="583451" cy="531755"/>
+          </a:xfrm>
+          <a:prstGeom prst="snipRoundRect">
+            <a:avLst/>
+          </a:prstGeom>
+        </p:spPr>
+        <p:style>
+          <a:lnRef idx="2">
+            <a:schemeClr val="accent1">
+              <a:shade val="50000"/>
+            </a:schemeClr>
+          </a:lnRef>
+          <a:fillRef idx="1">
+            <a:schemeClr val="accent1"/>
+          </a:fillRef>
+          <a:effectRef idx="0">
+            <a:schemeClr val="accent1"/>
+          </a:effectRef>
+          <a:fontRef idx="minor">
+            <a:schemeClr val="lt1"/>
+          </a:fontRef>
+        </p:style>
+        <p:txBody>
+          <a:bodyPr rtlCol="0" anchor="ctr"/>
+          <a:lstStyle/>
+          <a:p>
+            <a:pPr algn="ctr"/>
+            <a:r>
+              <a:rPr lang="en-US" sz="800" dirty="0"/>
+              <a:t>entry_</a:t>
+            </a:r>
+          </a:p>
+          <a:p>
+            <a:pPr algn="ctr"/>
+            <a:r>
+              <a:rPr lang="en-US" sz="800" dirty="0"/>
+              <a:t>players</a:t>
+            </a:r>
+          </a:p>
+        </p:txBody>
+      </p:sp>
+      <p:cxnSp>
+        <p:nvCxnSpPr>
+          <p:cNvPr id="29" name="Straight Arrow Connector 28">
+            <a:extLst>
+              <a:ext uri="{FF2B5EF4-FFF2-40B4-BE49-F238E27FC236}">
+                <a16:creationId xmlns:a16="http://schemas.microsoft.com/office/drawing/2014/main" id="{E5B9E9D2-47FC-DE45-8542-11AACD72336B}"/>
+              </a:ext>
+            </a:extLst>
+          </p:cNvPr>
+          <p:cNvCxnSpPr>
+            <a:stCxn id="63" idx="6"/>
+            <a:endCxn id="23" idx="2"/>
+          </p:cNvCxnSpPr>
+          <p:nvPr/>
+        </p:nvCxnSpPr>
+        <p:spPr>
+          <a:xfrm>
+            <a:off x="2446473" y="2464364"/>
+            <a:ext cx="266246" cy="49437"/>
+          </a:xfrm>
+          <a:prstGeom prst="straightConnector1">
+            <a:avLst/>
+          </a:prstGeom>
+          <a:ln>
+            <a:tailEnd type="triangle"/>
+          </a:ln>
+        </p:spPr>
+        <p:style>
+          <a:lnRef idx="1">
+            <a:schemeClr val="accent1"/>
+          </a:lnRef>
+          <a:fillRef idx="0">
+            <a:schemeClr val="accent1"/>
+          </a:fillRef>
+          <a:effectRef idx="0">
+            <a:schemeClr val="accent1"/>
+          </a:effectRef>
+          <a:fontRef idx="minor">
+            <a:schemeClr val="tx1"/>
+          </a:fontRef>
+        </p:style>
+      </p:cxnSp>
+      <p:cxnSp>
+        <p:nvCxnSpPr>
+          <p:cNvPr id="58" name="Straight Arrow Connector 57">
+            <a:extLst>
+              <a:ext uri="{FF2B5EF4-FFF2-40B4-BE49-F238E27FC236}">
+                <a16:creationId xmlns:a16="http://schemas.microsoft.com/office/drawing/2014/main" id="{B4EE315F-FF7D-1D4D-8472-CDF085706015}"/>
+              </a:ext>
+            </a:extLst>
+          </p:cNvPr>
+          <p:cNvCxnSpPr/>
+          <p:nvPr/>
+        </p:nvCxnSpPr>
+        <p:spPr>
+          <a:xfrm>
+            <a:off x="2461549" y="3117317"/>
+            <a:ext cx="266246" cy="49437"/>
+          </a:xfrm>
+          <a:prstGeom prst="straightConnector1">
+            <a:avLst/>
+          </a:prstGeom>
+          <a:ln>
+            <a:tailEnd type="triangle"/>
+          </a:ln>
+        </p:spPr>
+        <p:style>
+          <a:lnRef idx="1">
+            <a:schemeClr val="accent1"/>
+          </a:lnRef>
+          <a:fillRef idx="0">
+            <a:schemeClr val="accent1"/>
+          </a:fillRef>
+          <a:effectRef idx="0">
+            <a:schemeClr val="accent1"/>
+          </a:effectRef>
+          <a:fontRef idx="minor">
+            <a:schemeClr val="tx1"/>
+          </a:fontRef>
+        </p:style>
+      </p:cxnSp>
+      <p:sp>
+        <p:nvSpPr>
+          <p:cNvPr id="32" name="TextBox 31">
+            <a:extLst>
+              <a:ext uri="{FF2B5EF4-FFF2-40B4-BE49-F238E27FC236}">
+                <a16:creationId xmlns:a16="http://schemas.microsoft.com/office/drawing/2014/main" id="{D6E2B5DF-6B41-0140-936E-838350CF863F}"/>
+              </a:ext>
+            </a:extLst>
+          </p:cNvPr>
+          <p:cNvSpPr txBox="1"/>
+          <p:nvPr/>
+        </p:nvSpPr>
+        <p:spPr>
+          <a:xfrm>
+            <a:off x="3465996" y="2040314"/>
+            <a:ext cx="1249680" cy="276999"/>
+          </a:xfrm>
+          <a:prstGeom prst="rect">
+            <a:avLst/>
+          </a:prstGeom>
+          <a:noFill/>
+        </p:spPr>
+        <p:txBody>
+          <a:bodyPr wrap="square" rtlCol="0">
+            <a:spAutoFit/>
+          </a:bodyPr>
+          <a:lstStyle/>
+          <a:p>
+            <a:r>
+              <a:rPr lang="en-US" sz="1200" dirty="0">
+                <a:solidFill>
+                  <a:schemeClr val="accent1"/>
+                </a:solidFill>
+              </a:rPr>
+              <a:t>active, updating</a:t>
+            </a:r>
+          </a:p>
+        </p:txBody>
+      </p:sp>
+      <p:sp>
+        <p:nvSpPr>
+          <p:cNvPr id="33" name="Freeform 32">
+            <a:extLst>
+              <a:ext uri="{FF2B5EF4-FFF2-40B4-BE49-F238E27FC236}">
+                <a16:creationId xmlns:a16="http://schemas.microsoft.com/office/drawing/2014/main" id="{FF541FEE-4F11-5A4A-9B01-D0A0BE662AEB}"/>
+              </a:ext>
+            </a:extLst>
+          </p:cNvPr>
+          <p:cNvSpPr/>
+          <p:nvPr/>
+        </p:nvSpPr>
+        <p:spPr>
+          <a:xfrm>
+            <a:off x="4274820" y="1414807"/>
+            <a:ext cx="3832860" cy="1419833"/>
+          </a:xfrm>
+          <a:custGeom>
+            <a:avLst/>
+            <a:gdLst>
+              <a:gd name="connsiteX0" fmla="*/ 3832860 w 3832860"/>
+              <a:gd name="connsiteY0" fmla="*/ 581633 h 1419833"/>
+              <a:gd name="connsiteX1" fmla="*/ 3695700 w 3832860"/>
+              <a:gd name="connsiteY1" fmla="*/ 513053 h 1419833"/>
+              <a:gd name="connsiteX2" fmla="*/ 3649980 w 3832860"/>
+              <a:gd name="connsiteY2" fmla="*/ 497813 h 1419833"/>
+              <a:gd name="connsiteX3" fmla="*/ 3589020 w 3832860"/>
+              <a:gd name="connsiteY3" fmla="*/ 467333 h 1419833"/>
+              <a:gd name="connsiteX4" fmla="*/ 3093720 w 3832860"/>
+              <a:gd name="connsiteY4" fmla="*/ 307313 h 1419833"/>
+              <a:gd name="connsiteX5" fmla="*/ 2895600 w 3832860"/>
+              <a:gd name="connsiteY5" fmla="*/ 238733 h 1419833"/>
+              <a:gd name="connsiteX6" fmla="*/ 2674620 w 3832860"/>
+              <a:gd name="connsiteY6" fmla="*/ 154913 h 1419833"/>
+              <a:gd name="connsiteX7" fmla="*/ 2613660 w 3832860"/>
+              <a:gd name="connsiteY7" fmla="*/ 132053 h 1419833"/>
+              <a:gd name="connsiteX8" fmla="*/ 2476500 w 3832860"/>
+              <a:gd name="connsiteY8" fmla="*/ 78713 h 1419833"/>
+              <a:gd name="connsiteX9" fmla="*/ 2385060 w 3832860"/>
+              <a:gd name="connsiteY9" fmla="*/ 55853 h 1419833"/>
+              <a:gd name="connsiteX10" fmla="*/ 2240280 w 3832860"/>
+              <a:gd name="connsiteY10" fmla="*/ 25373 h 1419833"/>
+              <a:gd name="connsiteX11" fmla="*/ 1973580 w 3832860"/>
+              <a:gd name="connsiteY11" fmla="*/ 10133 h 1419833"/>
+              <a:gd name="connsiteX12" fmla="*/ 1722120 w 3832860"/>
+              <a:gd name="connsiteY12" fmla="*/ 25373 h 1419833"/>
+              <a:gd name="connsiteX13" fmla="*/ 1699260 w 3832860"/>
+              <a:gd name="connsiteY13" fmla="*/ 40613 h 1419833"/>
+              <a:gd name="connsiteX14" fmla="*/ 1630680 w 3832860"/>
+              <a:gd name="connsiteY14" fmla="*/ 71093 h 1419833"/>
+              <a:gd name="connsiteX15" fmla="*/ 1539240 w 3832860"/>
+              <a:gd name="connsiteY15" fmla="*/ 124433 h 1419833"/>
+              <a:gd name="connsiteX16" fmla="*/ 1516380 w 3832860"/>
+              <a:gd name="connsiteY16" fmla="*/ 132053 h 1419833"/>
+              <a:gd name="connsiteX17" fmla="*/ 1455420 w 3832860"/>
+              <a:gd name="connsiteY17" fmla="*/ 162533 h 1419833"/>
+              <a:gd name="connsiteX18" fmla="*/ 1409700 w 3832860"/>
+              <a:gd name="connsiteY18" fmla="*/ 177773 h 1419833"/>
+              <a:gd name="connsiteX19" fmla="*/ 1363980 w 3832860"/>
+              <a:gd name="connsiteY19" fmla="*/ 208253 h 1419833"/>
+              <a:gd name="connsiteX20" fmla="*/ 1303020 w 3832860"/>
+              <a:gd name="connsiteY20" fmla="*/ 253973 h 1419833"/>
+              <a:gd name="connsiteX21" fmla="*/ 1249680 w 3832860"/>
+              <a:gd name="connsiteY21" fmla="*/ 299693 h 1419833"/>
+              <a:gd name="connsiteX22" fmla="*/ 1226820 w 3832860"/>
+              <a:gd name="connsiteY22" fmla="*/ 322553 h 1419833"/>
+              <a:gd name="connsiteX23" fmla="*/ 1120140 w 3832860"/>
+              <a:gd name="connsiteY23" fmla="*/ 391133 h 1419833"/>
+              <a:gd name="connsiteX24" fmla="*/ 1074420 w 3832860"/>
+              <a:gd name="connsiteY24" fmla="*/ 429233 h 1419833"/>
+              <a:gd name="connsiteX25" fmla="*/ 1051560 w 3832860"/>
+              <a:gd name="connsiteY25" fmla="*/ 452093 h 1419833"/>
+              <a:gd name="connsiteX26" fmla="*/ 990600 w 3832860"/>
+              <a:gd name="connsiteY26" fmla="*/ 505433 h 1419833"/>
+              <a:gd name="connsiteX27" fmla="*/ 960120 w 3832860"/>
+              <a:gd name="connsiteY27" fmla="*/ 551153 h 1419833"/>
+              <a:gd name="connsiteX28" fmla="*/ 944880 w 3832860"/>
+              <a:gd name="connsiteY28" fmla="*/ 574013 h 1419833"/>
+              <a:gd name="connsiteX29" fmla="*/ 929640 w 3832860"/>
+              <a:gd name="connsiteY29" fmla="*/ 596873 h 1419833"/>
+              <a:gd name="connsiteX30" fmla="*/ 914400 w 3832860"/>
+              <a:gd name="connsiteY30" fmla="*/ 619733 h 1419833"/>
+              <a:gd name="connsiteX31" fmla="*/ 868680 w 3832860"/>
+              <a:gd name="connsiteY31" fmla="*/ 680693 h 1419833"/>
+              <a:gd name="connsiteX32" fmla="*/ 845820 w 3832860"/>
+              <a:gd name="connsiteY32" fmla="*/ 703553 h 1419833"/>
+              <a:gd name="connsiteX33" fmla="*/ 815340 w 3832860"/>
+              <a:gd name="connsiteY33" fmla="*/ 749273 h 1419833"/>
+              <a:gd name="connsiteX34" fmla="*/ 784860 w 3832860"/>
+              <a:gd name="connsiteY34" fmla="*/ 794993 h 1419833"/>
+              <a:gd name="connsiteX35" fmla="*/ 739140 w 3832860"/>
+              <a:gd name="connsiteY35" fmla="*/ 840713 h 1419833"/>
+              <a:gd name="connsiteX36" fmla="*/ 723900 w 3832860"/>
+              <a:gd name="connsiteY36" fmla="*/ 863573 h 1419833"/>
+              <a:gd name="connsiteX37" fmla="*/ 655320 w 3832860"/>
+              <a:gd name="connsiteY37" fmla="*/ 909293 h 1419833"/>
+              <a:gd name="connsiteX38" fmla="*/ 579120 w 3832860"/>
+              <a:gd name="connsiteY38" fmla="*/ 962633 h 1419833"/>
+              <a:gd name="connsiteX39" fmla="*/ 556260 w 3832860"/>
+              <a:gd name="connsiteY39" fmla="*/ 970253 h 1419833"/>
+              <a:gd name="connsiteX40" fmla="*/ 533400 w 3832860"/>
+              <a:gd name="connsiteY40" fmla="*/ 955013 h 1419833"/>
+              <a:gd name="connsiteX41" fmla="*/ 381000 w 3832860"/>
+              <a:gd name="connsiteY41" fmla="*/ 955013 h 1419833"/>
+              <a:gd name="connsiteX42" fmla="*/ 365760 w 3832860"/>
+              <a:gd name="connsiteY42" fmla="*/ 977873 h 1419833"/>
+              <a:gd name="connsiteX43" fmla="*/ 342900 w 3832860"/>
+              <a:gd name="connsiteY43" fmla="*/ 993113 h 1419833"/>
+              <a:gd name="connsiteX44" fmla="*/ 327660 w 3832860"/>
+              <a:gd name="connsiteY44" fmla="*/ 1031213 h 1419833"/>
+              <a:gd name="connsiteX45" fmla="*/ 304800 w 3832860"/>
+              <a:gd name="connsiteY45" fmla="*/ 1069313 h 1419833"/>
+              <a:gd name="connsiteX46" fmla="*/ 274320 w 3832860"/>
+              <a:gd name="connsiteY46" fmla="*/ 1099793 h 1419833"/>
+              <a:gd name="connsiteX47" fmla="*/ 243840 w 3832860"/>
+              <a:gd name="connsiteY47" fmla="*/ 1145513 h 1419833"/>
+              <a:gd name="connsiteX48" fmla="*/ 182880 w 3832860"/>
+              <a:gd name="connsiteY48" fmla="*/ 1221713 h 1419833"/>
+              <a:gd name="connsiteX49" fmla="*/ 152400 w 3832860"/>
+              <a:gd name="connsiteY49" fmla="*/ 1252193 h 1419833"/>
+              <a:gd name="connsiteX50" fmla="*/ 129540 w 3832860"/>
+              <a:gd name="connsiteY50" fmla="*/ 1282673 h 1419833"/>
+              <a:gd name="connsiteX51" fmla="*/ 106680 w 3832860"/>
+              <a:gd name="connsiteY51" fmla="*/ 1305533 h 1419833"/>
+              <a:gd name="connsiteX52" fmla="*/ 83820 w 3832860"/>
+              <a:gd name="connsiteY52" fmla="*/ 1336013 h 1419833"/>
+              <a:gd name="connsiteX53" fmla="*/ 68580 w 3832860"/>
+              <a:gd name="connsiteY53" fmla="*/ 1358873 h 1419833"/>
+              <a:gd name="connsiteX54" fmla="*/ 0 w 3832860"/>
+              <a:gd name="connsiteY54" fmla="*/ 1419833 h 1419833"/>
+              <a:gd name="connsiteX55" fmla="*/ 7620 w 3832860"/>
+              <a:gd name="connsiteY55" fmla="*/ 1374113 h 1419833"/>
+              <a:gd name="connsiteX56" fmla="*/ 15240 w 3832860"/>
+              <a:gd name="connsiteY56" fmla="*/ 1351253 h 1419833"/>
+              <a:gd name="connsiteX57" fmla="*/ 7620 w 3832860"/>
+              <a:gd name="connsiteY57" fmla="*/ 1320773 h 1419833"/>
+            </a:gdLst>
+            <a:ahLst/>
+            <a:cxnLst>
+              <a:cxn ang="0">
+                <a:pos x="connsiteX0" y="connsiteY0"/>
+              </a:cxn>
+              <a:cxn ang="0">
+                <a:pos x="connsiteX1" y="connsiteY1"/>
+              </a:cxn>
+              <a:cxn ang="0">
+                <a:pos x="connsiteX2" y="connsiteY2"/>
+              </a:cxn>
+              <a:cxn ang="0">
+                <a:pos x="connsiteX3" y="connsiteY3"/>
+              </a:cxn>
+              <a:cxn ang="0">
+                <a:pos x="connsiteX4" y="connsiteY4"/>
+              </a:cxn>
+              <a:cxn ang="0">
+                <a:pos x="connsiteX5" y="connsiteY5"/>
+              </a:cxn>
+              <a:cxn ang="0">
+                <a:pos x="connsiteX6" y="connsiteY6"/>
+              </a:cxn>
+              <a:cxn ang="0">
+                <a:pos x="connsiteX7" y="connsiteY7"/>
+              </a:cxn>
+              <a:cxn ang="0">
+                <a:pos x="connsiteX8" y="connsiteY8"/>
+              </a:cxn>
+              <a:cxn ang="0">
+                <a:pos x="connsiteX9" y="connsiteY9"/>
+              </a:cxn>
+              <a:cxn ang="0">
+                <a:pos x="connsiteX10" y="connsiteY10"/>
+              </a:cxn>
+              <a:cxn ang="0">
+                <a:pos x="connsiteX11" y="connsiteY11"/>
+              </a:cxn>
+              <a:cxn ang="0">
+                <a:pos x="connsiteX12" y="connsiteY12"/>
+              </a:cxn>
+              <a:cxn ang="0">
+                <a:pos x="connsiteX13" y="connsiteY13"/>
+              </a:cxn>
+              <a:cxn ang="0">
+                <a:pos x="connsiteX14" y="connsiteY14"/>
+              </a:cxn>
+              <a:cxn ang="0">
+                <a:pos x="connsiteX15" y="connsiteY15"/>
+              </a:cxn>
+              <a:cxn ang="0">
+                <a:pos x="connsiteX16" y="connsiteY16"/>
+              </a:cxn>
+              <a:cxn ang="0">
+                <a:pos x="connsiteX17" y="connsiteY17"/>
+              </a:cxn>
+              <a:cxn ang="0">
+                <a:pos x="connsiteX18" y="connsiteY18"/>
+              </a:cxn>
+              <a:cxn ang="0">
+                <a:pos x="connsiteX19" y="connsiteY19"/>
+              </a:cxn>
+              <a:cxn ang="0">
+                <a:pos x="connsiteX20" y="connsiteY20"/>
+              </a:cxn>
+              <a:cxn ang="0">
+                <a:pos x="connsiteX21" y="connsiteY21"/>
+              </a:cxn>
+              <a:cxn ang="0">
+                <a:pos x="connsiteX22" y="connsiteY22"/>
+              </a:cxn>
+              <a:cxn ang="0">
+                <a:pos x="connsiteX23" y="connsiteY23"/>
+              </a:cxn>
+              <a:cxn ang="0">
+                <a:pos x="connsiteX24" y="connsiteY24"/>
+              </a:cxn>
+              <a:cxn ang="0">
+                <a:pos x="connsiteX25" y="connsiteY25"/>
+              </a:cxn>
+              <a:cxn ang="0">
+                <a:pos x="connsiteX26" y="connsiteY26"/>
+              </a:cxn>
+              <a:cxn ang="0">
+                <a:pos x="connsiteX27" y="connsiteY27"/>
+              </a:cxn>
+              <a:cxn ang="0">
+                <a:pos x="connsiteX28" y="connsiteY28"/>
+              </a:cxn>
+              <a:cxn ang="0">
+                <a:pos x="connsiteX29" y="connsiteY29"/>
+              </a:cxn>
+              <a:cxn ang="0">
+                <a:pos x="connsiteX30" y="connsiteY30"/>
+              </a:cxn>
+              <a:cxn ang="0">
+                <a:pos x="connsiteX31" y="connsiteY31"/>
+              </a:cxn>
+              <a:cxn ang="0">
+                <a:pos x="connsiteX32" y="connsiteY32"/>
+              </a:cxn>
+              <a:cxn ang="0">
+                <a:pos x="connsiteX33" y="connsiteY33"/>
+              </a:cxn>
+              <a:cxn ang="0">
+                <a:pos x="connsiteX34" y="connsiteY34"/>
+              </a:cxn>
+              <a:cxn ang="0">
+                <a:pos x="connsiteX35" y="connsiteY35"/>
+              </a:cxn>
+              <a:cxn ang="0">
+                <a:pos x="connsiteX36" y="connsiteY36"/>
+              </a:cxn>
+              <a:cxn ang="0">
+                <a:pos x="connsiteX37" y="connsiteY37"/>
+              </a:cxn>
+              <a:cxn ang="0">
+                <a:pos x="connsiteX38" y="connsiteY38"/>
+              </a:cxn>
+              <a:cxn ang="0">
+                <a:pos x="connsiteX39" y="connsiteY39"/>
+              </a:cxn>
+              <a:cxn ang="0">
+                <a:pos x="connsiteX40" y="connsiteY40"/>
+              </a:cxn>
+              <a:cxn ang="0">
+                <a:pos x="connsiteX41" y="connsiteY41"/>
+              </a:cxn>
+              <a:cxn ang="0">
+                <a:pos x="connsiteX42" y="connsiteY42"/>
+              </a:cxn>
+              <a:cxn ang="0">
+                <a:pos x="connsiteX43" y="connsiteY43"/>
+              </a:cxn>
+              <a:cxn ang="0">
+                <a:pos x="connsiteX44" y="connsiteY44"/>
+              </a:cxn>
+              <a:cxn ang="0">
+                <a:pos x="connsiteX45" y="connsiteY45"/>
+              </a:cxn>
+              <a:cxn ang="0">
+                <a:pos x="connsiteX46" y="connsiteY46"/>
+              </a:cxn>
+              <a:cxn ang="0">
+                <a:pos x="connsiteX47" y="connsiteY47"/>
+              </a:cxn>
+              <a:cxn ang="0">
+                <a:pos x="connsiteX48" y="connsiteY48"/>
+              </a:cxn>
+              <a:cxn ang="0">
+                <a:pos x="connsiteX49" y="connsiteY49"/>
+              </a:cxn>
+              <a:cxn ang="0">
+                <a:pos x="connsiteX50" y="connsiteY50"/>
+              </a:cxn>
+              <a:cxn ang="0">
+                <a:pos x="connsiteX51" y="connsiteY51"/>
+              </a:cxn>
+              <a:cxn ang="0">
+                <a:pos x="connsiteX52" y="connsiteY52"/>
+              </a:cxn>
+              <a:cxn ang="0">
+                <a:pos x="connsiteX53" y="connsiteY53"/>
+              </a:cxn>
+              <a:cxn ang="0">
+                <a:pos x="connsiteX54" y="connsiteY54"/>
+              </a:cxn>
+              <a:cxn ang="0">
+                <a:pos x="connsiteX55" y="connsiteY55"/>
+              </a:cxn>
+              <a:cxn ang="0">
+                <a:pos x="connsiteX56" y="connsiteY56"/>
+              </a:cxn>
+              <a:cxn ang="0">
+                <a:pos x="connsiteX57" y="connsiteY57"/>
+              </a:cxn>
+            </a:cxnLst>
+            <a:rect l="l" t="t" r="r" b="b"/>
+            <a:pathLst>
+              <a:path w="3832860" h="1419833">
+                <a:moveTo>
+                  <a:pt x="3832860" y="581633"/>
+                </a:moveTo>
+                <a:cubicBezTo>
+                  <a:pt x="3614312" y="494214"/>
+                  <a:pt x="3885056" y="607731"/>
+                  <a:pt x="3695700" y="513053"/>
+                </a:cubicBezTo>
+                <a:cubicBezTo>
+                  <a:pt x="3681332" y="505869"/>
+                  <a:pt x="3664745" y="504141"/>
+                  <a:pt x="3649980" y="497813"/>
+                </a:cubicBezTo>
+                <a:cubicBezTo>
+                  <a:pt x="3629098" y="488864"/>
+                  <a:pt x="3610513" y="474694"/>
+                  <a:pt x="3589020" y="467333"/>
+                </a:cubicBezTo>
+                <a:cubicBezTo>
+                  <a:pt x="3424876" y="411119"/>
+                  <a:pt x="3254813" y="371750"/>
+                  <a:pt x="3093720" y="307313"/>
+                </a:cubicBezTo>
+                <a:cubicBezTo>
+                  <a:pt x="2885849" y="224164"/>
+                  <a:pt x="3187037" y="342355"/>
+                  <a:pt x="2895600" y="238733"/>
+                </a:cubicBezTo>
+                <a:cubicBezTo>
+                  <a:pt x="2821371" y="212341"/>
+                  <a:pt x="2748303" y="182793"/>
+                  <a:pt x="2674620" y="154913"/>
+                </a:cubicBezTo>
+                <a:cubicBezTo>
+                  <a:pt x="2654323" y="147233"/>
+                  <a:pt x="2634248" y="138916"/>
+                  <a:pt x="2613660" y="132053"/>
+                </a:cubicBezTo>
+                <a:cubicBezTo>
+                  <a:pt x="2510764" y="97754"/>
+                  <a:pt x="2635903" y="140703"/>
+                  <a:pt x="2476500" y="78713"/>
+                </a:cubicBezTo>
+                <a:cubicBezTo>
+                  <a:pt x="2422584" y="57746"/>
+                  <a:pt x="2440411" y="66923"/>
+                  <a:pt x="2385060" y="55853"/>
+                </a:cubicBezTo>
+                <a:cubicBezTo>
+                  <a:pt x="2336700" y="46181"/>
+                  <a:pt x="2289296" y="30819"/>
+                  <a:pt x="2240280" y="25373"/>
+                </a:cubicBezTo>
+                <a:cubicBezTo>
+                  <a:pt x="2151780" y="15540"/>
+                  <a:pt x="1973580" y="10133"/>
+                  <a:pt x="1973580" y="10133"/>
+                </a:cubicBezTo>
+                <a:cubicBezTo>
+                  <a:pt x="1864984" y="-5381"/>
+                  <a:pt x="1899017" y="-5126"/>
+                  <a:pt x="1722120" y="25373"/>
+                </a:cubicBezTo>
+                <a:cubicBezTo>
+                  <a:pt x="1713095" y="26929"/>
+                  <a:pt x="1707451" y="36517"/>
+                  <a:pt x="1699260" y="40613"/>
+                </a:cubicBezTo>
+                <a:cubicBezTo>
+                  <a:pt x="1676885" y="51801"/>
+                  <a:pt x="1652840" y="59485"/>
+                  <a:pt x="1630680" y="71093"/>
+                </a:cubicBezTo>
+                <a:cubicBezTo>
+                  <a:pt x="1599422" y="87466"/>
+                  <a:pt x="1572716" y="113274"/>
+                  <a:pt x="1539240" y="124433"/>
+                </a:cubicBezTo>
+                <a:cubicBezTo>
+                  <a:pt x="1531620" y="126973"/>
+                  <a:pt x="1523692" y="128729"/>
+                  <a:pt x="1516380" y="132053"/>
+                </a:cubicBezTo>
+                <a:cubicBezTo>
+                  <a:pt x="1495698" y="141454"/>
+                  <a:pt x="1476302" y="153584"/>
+                  <a:pt x="1455420" y="162533"/>
+                </a:cubicBezTo>
+                <a:cubicBezTo>
+                  <a:pt x="1440655" y="168861"/>
+                  <a:pt x="1409700" y="177773"/>
+                  <a:pt x="1409700" y="177773"/>
+                </a:cubicBezTo>
+                <a:cubicBezTo>
+                  <a:pt x="1344172" y="243301"/>
+                  <a:pt x="1424633" y="169656"/>
+                  <a:pt x="1363980" y="208253"/>
+                </a:cubicBezTo>
+                <a:cubicBezTo>
+                  <a:pt x="1342551" y="221890"/>
+                  <a:pt x="1322854" y="238106"/>
+                  <a:pt x="1303020" y="253973"/>
+                </a:cubicBezTo>
+                <a:cubicBezTo>
+                  <a:pt x="1284734" y="268602"/>
+                  <a:pt x="1267086" y="284027"/>
+                  <a:pt x="1249680" y="299693"/>
+                </a:cubicBezTo>
+                <a:cubicBezTo>
+                  <a:pt x="1241670" y="306902"/>
+                  <a:pt x="1235624" y="316338"/>
+                  <a:pt x="1226820" y="322553"/>
+                </a:cubicBezTo>
+                <a:cubicBezTo>
+                  <a:pt x="1192283" y="346932"/>
+                  <a:pt x="1150032" y="361241"/>
+                  <a:pt x="1120140" y="391133"/>
+                </a:cubicBezTo>
+                <a:cubicBezTo>
+                  <a:pt x="1053354" y="457919"/>
+                  <a:pt x="1138073" y="376189"/>
+                  <a:pt x="1074420" y="429233"/>
+                </a:cubicBezTo>
+                <a:cubicBezTo>
+                  <a:pt x="1066141" y="436132"/>
+                  <a:pt x="1059534" y="444844"/>
+                  <a:pt x="1051560" y="452093"/>
+                </a:cubicBezTo>
+                <a:cubicBezTo>
+                  <a:pt x="1031581" y="470256"/>
+                  <a:pt x="1008914" y="485593"/>
+                  <a:pt x="990600" y="505433"/>
+                </a:cubicBezTo>
+                <a:cubicBezTo>
+                  <a:pt x="978176" y="518892"/>
+                  <a:pt x="970280" y="535913"/>
+                  <a:pt x="960120" y="551153"/>
+                </a:cubicBezTo>
+                <a:lnTo>
+                  <a:pt x="944880" y="574013"/>
+                </a:lnTo>
+                <a:lnTo>
+                  <a:pt x="929640" y="596873"/>
+                </a:lnTo>
+                <a:cubicBezTo>
+                  <a:pt x="924560" y="604493"/>
+                  <a:pt x="919895" y="612407"/>
+                  <a:pt x="914400" y="619733"/>
+                </a:cubicBezTo>
+                <a:cubicBezTo>
+                  <a:pt x="899160" y="640053"/>
+                  <a:pt x="886641" y="662732"/>
+                  <a:pt x="868680" y="680693"/>
+                </a:cubicBezTo>
+                <a:lnTo>
+                  <a:pt x="845820" y="703553"/>
+                </a:lnTo>
+                <a:cubicBezTo>
+                  <a:pt x="831247" y="747272"/>
+                  <a:pt x="848636" y="706464"/>
+                  <a:pt x="815340" y="749273"/>
+                </a:cubicBezTo>
+                <a:cubicBezTo>
+                  <a:pt x="804095" y="763731"/>
+                  <a:pt x="797812" y="782041"/>
+                  <a:pt x="784860" y="794993"/>
+                </a:cubicBezTo>
+                <a:cubicBezTo>
+                  <a:pt x="769620" y="810233"/>
+                  <a:pt x="751095" y="822780"/>
+                  <a:pt x="739140" y="840713"/>
+                </a:cubicBezTo>
+                <a:cubicBezTo>
+                  <a:pt x="734060" y="848333"/>
+                  <a:pt x="730792" y="857542"/>
+                  <a:pt x="723900" y="863573"/>
+                </a:cubicBezTo>
+                <a:cubicBezTo>
+                  <a:pt x="708660" y="876908"/>
+                  <a:pt x="674370" y="895006"/>
+                  <a:pt x="655320" y="909293"/>
+                </a:cubicBezTo>
+                <a:cubicBezTo>
+                  <a:pt x="641409" y="919726"/>
+                  <a:pt x="590377" y="958881"/>
+                  <a:pt x="579120" y="962633"/>
+                </a:cubicBezTo>
+                <a:lnTo>
+                  <a:pt x="556260" y="970253"/>
+                </a:lnTo>
+                <a:cubicBezTo>
+                  <a:pt x="548640" y="965173"/>
+                  <a:pt x="542172" y="957645"/>
+                  <a:pt x="533400" y="955013"/>
+                </a:cubicBezTo>
+                <a:cubicBezTo>
+                  <a:pt x="483182" y="939947"/>
+                  <a:pt x="431760" y="951108"/>
+                  <a:pt x="381000" y="955013"/>
+                </a:cubicBezTo>
+                <a:cubicBezTo>
+                  <a:pt x="375920" y="962633"/>
+                  <a:pt x="372236" y="971397"/>
+                  <a:pt x="365760" y="977873"/>
+                </a:cubicBezTo>
+                <a:cubicBezTo>
+                  <a:pt x="359284" y="984349"/>
+                  <a:pt x="348223" y="985661"/>
+                  <a:pt x="342900" y="993113"/>
+                </a:cubicBezTo>
+                <a:cubicBezTo>
+                  <a:pt x="334950" y="1004244"/>
+                  <a:pt x="333777" y="1018979"/>
+                  <a:pt x="327660" y="1031213"/>
+                </a:cubicBezTo>
+                <a:cubicBezTo>
+                  <a:pt x="321036" y="1044460"/>
+                  <a:pt x="313893" y="1057622"/>
+                  <a:pt x="304800" y="1069313"/>
+                </a:cubicBezTo>
+                <a:cubicBezTo>
+                  <a:pt x="295979" y="1080655"/>
+                  <a:pt x="283296" y="1088573"/>
+                  <a:pt x="274320" y="1099793"/>
+                </a:cubicBezTo>
+                <a:cubicBezTo>
+                  <a:pt x="262878" y="1114096"/>
+                  <a:pt x="255282" y="1131210"/>
+                  <a:pt x="243840" y="1145513"/>
+                </a:cubicBezTo>
+                <a:cubicBezTo>
+                  <a:pt x="223520" y="1170913"/>
+                  <a:pt x="205881" y="1198712"/>
+                  <a:pt x="182880" y="1221713"/>
+                </a:cubicBezTo>
+                <a:cubicBezTo>
+                  <a:pt x="172720" y="1231873"/>
+                  <a:pt x="161862" y="1241380"/>
+                  <a:pt x="152400" y="1252193"/>
+                </a:cubicBezTo>
+                <a:cubicBezTo>
+                  <a:pt x="144037" y="1261751"/>
+                  <a:pt x="137805" y="1273030"/>
+                  <a:pt x="129540" y="1282673"/>
+                </a:cubicBezTo>
+                <a:cubicBezTo>
+                  <a:pt x="122527" y="1290855"/>
+                  <a:pt x="113693" y="1297351"/>
+                  <a:pt x="106680" y="1305533"/>
+                </a:cubicBezTo>
+                <a:cubicBezTo>
+                  <a:pt x="98415" y="1315176"/>
+                  <a:pt x="91202" y="1325679"/>
+                  <a:pt x="83820" y="1336013"/>
+                </a:cubicBezTo>
+                <a:cubicBezTo>
+                  <a:pt x="78497" y="1343465"/>
+                  <a:pt x="74664" y="1352028"/>
+                  <a:pt x="68580" y="1358873"/>
+                </a:cubicBezTo>
+                <a:cubicBezTo>
+                  <a:pt x="30619" y="1401579"/>
+                  <a:pt x="34744" y="1396670"/>
+                  <a:pt x="0" y="1419833"/>
+                </a:cubicBezTo>
+                <a:cubicBezTo>
+                  <a:pt x="2540" y="1404593"/>
+                  <a:pt x="4268" y="1389195"/>
+                  <a:pt x="7620" y="1374113"/>
+                </a:cubicBezTo>
+                <a:cubicBezTo>
+                  <a:pt x="9362" y="1366272"/>
+                  <a:pt x="15240" y="1359285"/>
+                  <a:pt x="15240" y="1351253"/>
+                </a:cubicBezTo>
+                <a:cubicBezTo>
+                  <a:pt x="15240" y="1340780"/>
+                  <a:pt x="7620" y="1320773"/>
+                  <a:pt x="7620" y="1320773"/>
+                </a:cubicBezTo>
+              </a:path>
+            </a:pathLst>
+          </a:custGeom>
+          <a:noFill/>
+        </p:spPr>
+        <p:style>
+          <a:lnRef idx="2">
+            <a:schemeClr val="accent1">
+              <a:shade val="50000"/>
+            </a:schemeClr>
+          </a:lnRef>
+          <a:fillRef idx="1">
+            <a:schemeClr val="accent1"/>
+          </a:fillRef>
+          <a:effectRef idx="0">
+            <a:schemeClr val="accent1"/>
+          </a:effectRef>
+          <a:fontRef idx="minor">
+            <a:schemeClr val="lt1"/>
+          </a:fontRef>
+        </p:style>
+        <p:txBody>
+          <a:bodyPr rtlCol="0" anchor="ctr"/>
+          <a:lstStyle/>
+          <a:p>
+            <a:pPr algn="ctr"/>
+            <a:endParaRPr lang="en-US"/>
+          </a:p>
+        </p:txBody>
+      </p:sp>
     </p:spTree>
     <p:extLst>
       <p:ext uri="{BB962C8B-B14F-4D97-AF65-F5344CB8AC3E}">
@@ -6261,7 +7063,7 @@
           <p:cNvPr id="2" name="TextBox 1">
             <a:extLst>
               <a:ext uri="{FF2B5EF4-FFF2-40B4-BE49-F238E27FC236}">
-                <a16:creationId xmlns:a16="http://schemas.microsoft.com/office/drawing/2014/main" id="{766198B4-E8EC-4B4E-AB00-FCB1580E4824}"/>
+                <a16:creationId xmlns:a16="http://schemas.microsoft.com/office/drawing/2014/main" id="{2589C3A5-A5ED-C346-97D9-9ED1C7A54DC8}"/>
               </a:ext>
             </a:extLst>
           </p:cNvPr>
@@ -6270,8 +7072,8 @@
         </p:nvSpPr>
         <p:spPr>
           <a:xfrm>
-            <a:off x="1071716" y="983226"/>
-            <a:ext cx="10815484" cy="4247317"/>
+            <a:off x="1465375" y="506602"/>
+            <a:ext cx="4239088" cy="4862870"/>
           </a:xfrm>
           <a:prstGeom prst="rect">
             <a:avLst/>
@@ -6285,135 +7087,901 @@
           <a:lstStyle/>
           <a:p>
             <a:r>
-              <a:rPr lang="en-US" dirty="0" err="1"/>
-              <a:t>JHP_Design.pptx</a:t>
-            </a:r>
-            <a:r>
-              <a:rPr lang="en-US" dirty="0"/>
-              <a:t> -   Design doc</a:t>
-            </a:r>
-          </a:p>
-          <a:p>
-            <a:r>
-              <a:rPr lang="en-US" dirty="0" err="1"/>
-              <a:t>jhp.py</a:t>
-            </a:r>
-            <a:r>
-              <a:rPr lang="en-US" dirty="0"/>
-              <a:t> – Database modification functions</a:t>
-            </a:r>
-          </a:p>
-          <a:p>
-            <a:r>
-              <a:rPr lang="en-US" dirty="0"/>
-              <a:t>players-</a:t>
-            </a:r>
-            <a:r>
-              <a:rPr lang="en-US" dirty="0" err="1"/>
-              <a:t>update.py</a:t>
-            </a:r>
-            <a:r>
-              <a:rPr lang="en-US" dirty="0"/>
-              <a:t> -  modifies playersDB (two tables: </a:t>
-            </a:r>
-            <a:r>
-              <a:rPr lang="en-US" dirty="0" err="1"/>
-              <a:t>active_players</a:t>
-            </a:r>
-            <a:r>
-              <a:rPr lang="en-US" dirty="0"/>
+              <a:rPr lang="en-US" sz="1000" i="1" dirty="0" err="1">
+                <a:solidFill>
+                  <a:srgbClr val="00B050"/>
+                </a:solidFill>
+              </a:rPr>
+              <a:t>pool_entry</a:t>
+            </a:r>
+            <a:r>
+              <a:rPr lang="en-US" sz="1000" i="1" dirty="0">
+                <a:solidFill>
+                  <a:srgbClr val="00B050"/>
+                </a:solidFill>
+              </a:rPr>
+              <a:t> table;</a:t>
+            </a:r>
+            <a:endParaRPr lang="en-US" sz="1000" dirty="0">
+              <a:solidFill>
+                <a:srgbClr val="00B050"/>
+              </a:solidFill>
+            </a:endParaRPr>
+          </a:p>
+          <a:p>
+            <a:r>
+              <a:rPr lang="en-US" sz="1000" dirty="0" err="1">
+                <a:solidFill>
+                  <a:srgbClr val="FF0000"/>
+                </a:solidFill>
+              </a:rPr>
+              <a:t>poolTeamName</a:t>
+            </a:r>
+            <a:r>
+              <a:rPr lang="en-US" sz="1000" dirty="0">
+                <a:solidFill>
+                  <a:srgbClr val="FF0000"/>
+                </a:solidFill>
+              </a:rPr>
+              <a:t>: [QuadSquad]</a:t>
+            </a:r>
+          </a:p>
+          <a:p>
+            <a:r>
+              <a:rPr lang="en-US" sz="1000" dirty="0" err="1">
+                <a:solidFill>
+                  <a:srgbClr val="FF0000"/>
+                </a:solidFill>
+              </a:rPr>
+              <a:t>poolTeamID</a:t>
+            </a:r>
+            <a:r>
+              <a:rPr lang="en-US" sz="1000" dirty="0">
+                <a:solidFill>
+                  <a:srgbClr val="FF0000"/>
+                </a:solidFill>
+              </a:rPr>
+              <a:t>:</a:t>
+            </a:r>
+          </a:p>
+          <a:p>
+            <a:r>
+              <a:rPr lang="en-US" sz="1000" dirty="0">
+                <a:solidFill>
+                  <a:srgbClr val="FF0000"/>
+                </a:solidFill>
+              </a:rPr>
+              <a:t>GM: [GM Name]</a:t>
+            </a:r>
+          </a:p>
+          <a:p>
+            <a:r>
+              <a:rPr lang="en-US" sz="1000" dirty="0">
+                <a:solidFill>
+                  <a:srgbClr val="FF0000"/>
+                </a:solidFill>
+              </a:rPr>
+              <a:t>email:</a:t>
+            </a:r>
+          </a:p>
+          <a:p>
+            <a:r>
+              <a:rPr lang="en-US" sz="1000" dirty="0">
+                <a:solidFill>
+                  <a:srgbClr val="FF0000"/>
+                </a:solidFill>
+              </a:rPr>
+              <a:t>hometown:</a:t>
+            </a:r>
+          </a:p>
+          <a:p>
+            <a:r>
+              <a:rPr lang="en-US" sz="1000" dirty="0">
+                <a:solidFill>
+                  <a:srgbClr val="FF0000"/>
+                </a:solidFill>
+              </a:rPr>
+              <a:t>country:</a:t>
+            </a:r>
+          </a:p>
+          <a:p>
+            <a:r>
+              <a:rPr lang="en-US" sz="1000" dirty="0">
+                <a:solidFill>
+                  <a:srgbClr val="FF0000"/>
+                </a:solidFill>
+              </a:rPr>
+              <a:t>pay Status: [NotPaid, PayPal, Cheque, Cash, Coupon]</a:t>
+            </a:r>
+          </a:p>
+          <a:p>
+            <a:r>
+              <a:rPr lang="en-US" sz="1000" dirty="0">
+                <a:solidFill>
+                  <a:srgbClr val="FF0000"/>
+                </a:solidFill>
+              </a:rPr>
+              <a:t>pay Amount: </a:t>
+            </a:r>
+          </a:p>
+          <a:p>
+            <a:r>
+              <a:rPr lang="en-US" sz="1000" dirty="0">
+                <a:solidFill>
+                  <a:srgbClr val="FF0000"/>
+                </a:solidFill>
+              </a:rPr>
+              <a:t>status:  [Incomplete, complete]</a:t>
+            </a:r>
+          </a:p>
+          <a:p>
+            <a:endParaRPr lang="en-US" sz="1000" dirty="0">
+              <a:solidFill>
+                <a:srgbClr val="FF0000"/>
+              </a:solidFill>
+            </a:endParaRPr>
+          </a:p>
+          <a:p>
+            <a:r>
+              <a:rPr lang="en-US" sz="1000" dirty="0" err="1">
+                <a:solidFill>
+                  <a:srgbClr val="00B050"/>
+                </a:solidFill>
+              </a:rPr>
+              <a:t>entry_stats_blue</a:t>
+            </a:r>
+            <a:r>
+              <a:rPr lang="en-US" sz="1000" dirty="0">
+                <a:solidFill>
+                  <a:srgbClr val="00B050"/>
+                </a:solidFill>
+              </a:rPr>
+              <a:t> table;   </a:t>
+            </a:r>
+            <a:r>
+              <a:rPr lang="en-US" sz="1000" dirty="0" err="1">
+                <a:solidFill>
+                  <a:srgbClr val="00B050"/>
+                </a:solidFill>
+              </a:rPr>
+              <a:t>entry_stats_green</a:t>
+            </a:r>
+            <a:r>
+              <a:rPr lang="en-US" sz="1000" dirty="0">
+                <a:solidFill>
+                  <a:srgbClr val="00B050"/>
+                </a:solidFill>
+              </a:rPr>
+              <a:t> table</a:t>
+            </a:r>
+          </a:p>
+          <a:p>
+            <a:r>
+              <a:rPr lang="en-US" sz="1000" dirty="0" err="1">
+                <a:solidFill>
+                  <a:srgbClr val="FF0000"/>
+                </a:solidFill>
+              </a:rPr>
+              <a:t>poolTeamID</a:t>
+            </a:r>
+            <a:endParaRPr lang="en-US" sz="1000" dirty="0">
+              <a:solidFill>
+                <a:srgbClr val="FF0000"/>
+              </a:solidFill>
+            </a:endParaRPr>
+          </a:p>
+          <a:p>
+            <a:r>
+              <a:rPr lang="en-US" sz="1000" dirty="0" err="1">
+                <a:solidFill>
+                  <a:srgbClr val="FF0000"/>
+                </a:solidFill>
+              </a:rPr>
+              <a:t>poolTeamName</a:t>
+            </a:r>
+            <a:endParaRPr lang="en-US" sz="1000" dirty="0">
+              <a:solidFill>
+                <a:srgbClr val="FF0000"/>
+              </a:solidFill>
+            </a:endParaRPr>
+          </a:p>
+          <a:p>
+            <a:r>
+              <a:rPr lang="en-US" sz="1000" dirty="0" err="1">
+                <a:solidFill>
+                  <a:srgbClr val="FF0000"/>
+                </a:solidFill>
+              </a:rPr>
+              <a:t>currentPoints</a:t>
+            </a:r>
+            <a:endParaRPr lang="en-US" sz="1000" dirty="0">
+              <a:solidFill>
+                <a:srgbClr val="FF0000"/>
+              </a:solidFill>
+            </a:endParaRPr>
+          </a:p>
+          <a:p>
+            <a:r>
+              <a:rPr lang="en-US" sz="1000" dirty="0" err="1">
+                <a:solidFill>
+                  <a:srgbClr val="FF0000"/>
+                </a:solidFill>
+              </a:rPr>
+              <a:t>currentRank</a:t>
+            </a:r>
+            <a:endParaRPr lang="en-US" sz="1000" dirty="0">
+              <a:solidFill>
+                <a:srgbClr val="FF0000"/>
+              </a:solidFill>
+            </a:endParaRPr>
+          </a:p>
+          <a:p>
+            <a:r>
+              <a:rPr lang="en-US" sz="1000" dirty="0" err="1">
+                <a:solidFill>
+                  <a:srgbClr val="FF0000"/>
+                </a:solidFill>
+              </a:rPr>
+              <a:t>morningRank</a:t>
+            </a:r>
+            <a:endParaRPr lang="en-US" sz="1000" dirty="0">
+              <a:solidFill>
+                <a:srgbClr val="FF0000"/>
+              </a:solidFill>
+            </a:endParaRPr>
+          </a:p>
+          <a:p>
+            <a:r>
+              <a:rPr lang="en-US" sz="1000" dirty="0" err="1">
+                <a:solidFill>
+                  <a:srgbClr val="FF0000"/>
+                </a:solidFill>
+              </a:rPr>
+              <a:t>morningPoints</a:t>
+            </a:r>
+            <a:endParaRPr lang="en-US" sz="1000" dirty="0">
+              <a:solidFill>
+                <a:srgbClr val="FF0000"/>
+              </a:solidFill>
+            </a:endParaRPr>
+          </a:p>
+          <a:p>
+            <a:r>
+              <a:rPr lang="en-US" sz="1000" dirty="0">
+                <a:solidFill>
+                  <a:srgbClr val="FF0000"/>
+                </a:solidFill>
+              </a:rPr>
+              <a:t>active</a:t>
+            </a:r>
+          </a:p>
+          <a:p>
+            <a:r>
+              <a:rPr lang="en-US" sz="1000" dirty="0">
+                <a:solidFill>
+                  <a:srgbClr val="FF0000"/>
+                </a:solidFill>
+              </a:rPr>
+              <a:t>duds</a:t>
+            </a:r>
+          </a:p>
+          <a:p>
+            <a:r>
+              <a:rPr lang="en-US" sz="1000" dirty="0">
+                <a:solidFill>
+                  <a:srgbClr val="FF0000"/>
+                </a:solidFill>
+              </a:rPr>
+              <a:t>rookie</a:t>
+            </a:r>
+          </a:p>
+          <a:p>
+            <a:r>
+              <a:rPr lang="en-US" sz="1000" dirty="0">
+                <a:solidFill>
+                  <a:srgbClr val="FF0000"/>
+                </a:solidFill>
+              </a:rPr>
+              <a:t>prize </a:t>
+            </a:r>
+          </a:p>
+          <a:p>
+            <a:endParaRPr lang="en-US" sz="1000" dirty="0">
+              <a:solidFill>
+                <a:srgbClr val="FF0000"/>
+              </a:solidFill>
+            </a:endParaRPr>
+          </a:p>
+          <a:p>
+            <a:r>
+              <a:rPr lang="en-US" sz="1000" dirty="0" err="1">
+                <a:solidFill>
+                  <a:srgbClr val="00B050"/>
+                </a:solidFill>
+              </a:rPr>
+              <a:t>entry_players</a:t>
+            </a:r>
+            <a:r>
+              <a:rPr lang="en-US" sz="1000" dirty="0">
+                <a:solidFill>
+                  <a:srgbClr val="00B050"/>
+                </a:solidFill>
+              </a:rPr>
+              <a:t> table;</a:t>
+            </a:r>
+          </a:p>
+          <a:p>
+            <a:r>
+              <a:rPr lang="en-US" sz="1000" dirty="0">
+                <a:solidFill>
+                  <a:srgbClr val="FF0000"/>
+                </a:solidFill>
+              </a:rPr>
+              <a:t>25* </a:t>
+            </a:r>
+            <a:r>
+              <a:rPr lang="en-US" sz="1000" dirty="0" err="1">
+                <a:solidFill>
+                  <a:srgbClr val="FF0000"/>
+                </a:solidFill>
+              </a:rPr>
+              <a:t>playerID</a:t>
+            </a:r>
+            <a:r>
+              <a:rPr lang="en-US" sz="1000" dirty="0">
+                <a:solidFill>
+                  <a:srgbClr val="FF0000"/>
+                </a:solidFill>
+              </a:rPr>
+              <a:t>.</a:t>
+            </a:r>
+          </a:p>
+          <a:p>
+            <a:r>
+              <a:rPr lang="en-US" sz="1000" dirty="0">
+                <a:solidFill>
+                  <a:srgbClr val="FF0000"/>
+                </a:solidFill>
+              </a:rPr>
+              <a:t>25* </a:t>
+            </a:r>
+            <a:r>
+              <a:rPr lang="en-US" sz="1000" dirty="0" err="1">
+                <a:solidFill>
+                  <a:srgbClr val="FF0000"/>
+                </a:solidFill>
+              </a:rPr>
+              <a:t>playerName</a:t>
+            </a:r>
+            <a:endParaRPr lang="en-US" sz="1000" dirty="0">
+              <a:solidFill>
+                <a:srgbClr val="FF0000"/>
+              </a:solidFill>
+            </a:endParaRPr>
+          </a:p>
+          <a:p>
+            <a:endParaRPr lang="en-US" sz="1000" dirty="0">
+              <a:solidFill>
+                <a:srgbClr val="FF0000"/>
+              </a:solidFill>
+            </a:endParaRPr>
+          </a:p>
+          <a:p>
+            <a:r>
+              <a:rPr lang="en-US" sz="1000" dirty="0" err="1">
+                <a:solidFill>
+                  <a:srgbClr val="00B050"/>
+                </a:solidFill>
+              </a:rPr>
+              <a:t>activePlayers</a:t>
+            </a:r>
+            <a:r>
+              <a:rPr lang="en-US" sz="1000" dirty="0">
+                <a:solidFill>
+                  <a:srgbClr val="00B050"/>
+                </a:solidFill>
+              </a:rPr>
+              <a:t> table;</a:t>
+            </a:r>
+          </a:p>
+          <a:p>
+            <a:r>
+              <a:rPr lang="en-US" sz="1000" dirty="0" err="1">
+                <a:solidFill>
+                  <a:srgbClr val="FF0000"/>
+                </a:solidFill>
+              </a:rPr>
+              <a:t>Player_id</a:t>
+            </a:r>
+            <a:r>
+              <a:rPr lang="en-US" sz="1000" dirty="0">
+                <a:solidFill>
+                  <a:srgbClr val="FF0000"/>
+                </a:solidFill>
+              </a:rPr>
               <a:t>, </a:t>
             </a:r>
             <a:r>
-              <a:rPr lang="en-US" dirty="0" err="1"/>
-              <a:t>all_players</a:t>
-            </a:r>
-            <a:r>
-              <a:rPr lang="en-US" dirty="0"/>
-              <a:t>     - also gets data from teamsDB</a:t>
-            </a:r>
-          </a:p>
-          <a:p>
-            <a:r>
-              <a:rPr lang="en-US" dirty="0"/>
-              <a:t>pool-</a:t>
-            </a:r>
-            <a:r>
-              <a:rPr lang="en-US" dirty="0" err="1"/>
-              <a:t>entry.py</a:t>
-            </a:r>
-            <a:r>
-              <a:rPr lang="en-US" dirty="0"/>
-              <a:t> – routines for Pool table registration and player selection</a:t>
-            </a:r>
-          </a:p>
-          <a:p>
-            <a:r>
-              <a:rPr lang="en-US" dirty="0"/>
-              <a:t>teams-</a:t>
-            </a:r>
-            <a:r>
-              <a:rPr lang="en-US" dirty="0" err="1"/>
-              <a:t>update.py</a:t>
-            </a:r>
-            <a:r>
-              <a:rPr lang="en-US" dirty="0"/>
-              <a:t> -  initiates teamsDB and teams table.   Records which team is active, etc.</a:t>
-            </a:r>
-          </a:p>
-          <a:p>
-            <a:endParaRPr lang="en-US" dirty="0"/>
-          </a:p>
-          <a:p>
-            <a:endParaRPr lang="en-US" dirty="0"/>
-          </a:p>
-          <a:p>
-            <a:endParaRPr lang="en-US" dirty="0"/>
-          </a:p>
-          <a:p>
-            <a:endParaRPr lang="en-US" dirty="0"/>
-          </a:p>
-          <a:p>
-            <a:r>
-              <a:rPr lang="en-US" dirty="0"/>
-              <a:t>PoolDB</a:t>
-            </a:r>
-          </a:p>
-          <a:p>
-            <a:endParaRPr lang="en-US" dirty="0"/>
-          </a:p>
-          <a:p>
-            <a:r>
-              <a:rPr lang="en-US" dirty="0"/>
-              <a:t>Pool has table</a:t>
-            </a:r>
-          </a:p>
-          <a:p>
-            <a:r>
-              <a:rPr lang="en-US" dirty="0"/>
-              <a:t>Each </a:t>
-            </a:r>
-            <a:r>
-              <a:rPr lang="en-US" dirty="0" err="1"/>
-              <a:t>poolEntry</a:t>
-            </a:r>
-            <a:r>
-              <a:rPr lang="en-US" dirty="0"/>
-              <a:t> has a table.</a:t>
-            </a:r>
-          </a:p>
-          <a:p>
-            <a:endParaRPr lang="en-US" dirty="0"/>
-          </a:p>
-          <a:p>
-            <a:endParaRPr lang="en-US" dirty="0"/>
+              <a:rPr lang="en-US" sz="1000" dirty="0" err="1">
+                <a:solidFill>
+                  <a:srgbClr val="FF0000"/>
+                </a:solidFill>
+              </a:rPr>
+              <a:t>player_name</a:t>
+            </a:r>
+            <a:r>
+              <a:rPr lang="en-US" sz="1000" dirty="0">
+                <a:solidFill>
+                  <a:srgbClr val="FF0000"/>
+                </a:solidFill>
+              </a:rPr>
+              <a:t>, team_id, team_name, </a:t>
+            </a:r>
+            <a:r>
+              <a:rPr lang="en-US" sz="1000" dirty="0" err="1">
+                <a:solidFill>
+                  <a:srgbClr val="FF0000"/>
+                </a:solidFill>
+              </a:rPr>
+              <a:t>player_type</a:t>
+            </a:r>
+            <a:r>
+              <a:rPr lang="en-US" sz="1000" dirty="0">
+                <a:solidFill>
+                  <a:srgbClr val="FF0000"/>
+                </a:solidFill>
+              </a:rPr>
+              <a:t>, goals, assists, wins, shutouts, </a:t>
+            </a:r>
+            <a:r>
+              <a:rPr lang="en-US" sz="1000" dirty="0" err="1">
+                <a:solidFill>
+                  <a:srgbClr val="FF0000"/>
+                </a:solidFill>
+              </a:rPr>
+              <a:t>c_points</a:t>
+            </a:r>
+            <a:r>
+              <a:rPr lang="en-US" sz="1000" dirty="0">
+                <a:solidFill>
+                  <a:srgbClr val="FF0000"/>
+                </a:solidFill>
+              </a:rPr>
+              <a:t>, </a:t>
+            </a:r>
+            <a:r>
+              <a:rPr lang="en-US" sz="1000" dirty="0" err="1">
+                <a:solidFill>
+                  <a:srgbClr val="FF0000"/>
+                </a:solidFill>
+              </a:rPr>
+              <a:t>p_points</a:t>
+            </a:r>
+            <a:r>
+              <a:rPr lang="en-US" sz="1000" dirty="0">
+                <a:solidFill>
+                  <a:srgbClr val="FF0000"/>
+                </a:solidFill>
+              </a:rPr>
+              <a:t> (previous), status_id (0-5), selected,</a:t>
+            </a:r>
+          </a:p>
+          <a:p>
+            <a:endParaRPr lang="en-US" sz="1000" dirty="0">
+              <a:solidFill>
+                <a:srgbClr val="FF0000"/>
+              </a:solidFill>
+            </a:endParaRPr>
+          </a:p>
+        </p:txBody>
+      </p:sp>
+      <p:sp>
+        <p:nvSpPr>
+          <p:cNvPr id="3" name="Left Brace 2">
+            <a:extLst>
+              <a:ext uri="{FF2B5EF4-FFF2-40B4-BE49-F238E27FC236}">
+                <a16:creationId xmlns:a16="http://schemas.microsoft.com/office/drawing/2014/main" id="{D6692E7C-7ACB-C949-B6A3-5EA295ACD06D}"/>
+              </a:ext>
+            </a:extLst>
+          </p:cNvPr>
+          <p:cNvSpPr/>
+          <p:nvPr/>
+        </p:nvSpPr>
+        <p:spPr>
+          <a:xfrm>
+            <a:off x="1366543" y="721309"/>
+            <a:ext cx="91269" cy="1399285"/>
+          </a:xfrm>
+          <a:prstGeom prst="leftBrace">
+            <a:avLst/>
+          </a:prstGeom>
+        </p:spPr>
+        <p:style>
+          <a:lnRef idx="1">
+            <a:schemeClr val="accent1"/>
+          </a:lnRef>
+          <a:fillRef idx="0">
+            <a:schemeClr val="accent1"/>
+          </a:fillRef>
+          <a:effectRef idx="0">
+            <a:schemeClr val="accent1"/>
+          </a:effectRef>
+          <a:fontRef idx="minor">
+            <a:schemeClr val="tx1"/>
+          </a:fontRef>
+        </p:style>
+        <p:txBody>
+          <a:bodyPr rtlCol="0" anchor="ctr"/>
+          <a:lstStyle/>
+          <a:p>
+            <a:pPr algn="ctr"/>
+            <a:endParaRPr lang="en-US"/>
+          </a:p>
+        </p:txBody>
+      </p:sp>
+      <p:sp>
+        <p:nvSpPr>
+          <p:cNvPr id="4" name="Left Brace 3">
+            <a:extLst>
+              <a:ext uri="{FF2B5EF4-FFF2-40B4-BE49-F238E27FC236}">
+                <a16:creationId xmlns:a16="http://schemas.microsoft.com/office/drawing/2014/main" id="{80F950EA-92E3-8244-B65B-C7B8AC7E7D2A}"/>
+              </a:ext>
+            </a:extLst>
+          </p:cNvPr>
+          <p:cNvSpPr/>
+          <p:nvPr/>
+        </p:nvSpPr>
+        <p:spPr>
+          <a:xfrm>
+            <a:off x="1366542" y="2218740"/>
+            <a:ext cx="160725" cy="1690320"/>
+          </a:xfrm>
+          <a:prstGeom prst="leftBrace">
+            <a:avLst/>
+          </a:prstGeom>
+        </p:spPr>
+        <p:style>
+          <a:lnRef idx="1">
+            <a:schemeClr val="accent1"/>
+          </a:lnRef>
+          <a:fillRef idx="0">
+            <a:schemeClr val="accent1"/>
+          </a:fillRef>
+          <a:effectRef idx="0">
+            <a:schemeClr val="accent1"/>
+          </a:effectRef>
+          <a:fontRef idx="minor">
+            <a:schemeClr val="tx1"/>
+          </a:fontRef>
+        </p:style>
+        <p:txBody>
+          <a:bodyPr rtlCol="0" anchor="ctr"/>
+          <a:lstStyle/>
+          <a:p>
+            <a:pPr algn="ctr"/>
+            <a:endParaRPr lang="en-US"/>
+          </a:p>
+        </p:txBody>
+      </p:sp>
+      <p:sp>
+        <p:nvSpPr>
+          <p:cNvPr id="5" name="TextBox 4">
+            <a:extLst>
+              <a:ext uri="{FF2B5EF4-FFF2-40B4-BE49-F238E27FC236}">
+                <a16:creationId xmlns:a16="http://schemas.microsoft.com/office/drawing/2014/main" id="{F21926C9-7BE1-4E42-BD9E-6808FBDFE44E}"/>
+              </a:ext>
+            </a:extLst>
+          </p:cNvPr>
+          <p:cNvSpPr txBox="1"/>
+          <p:nvPr/>
+        </p:nvSpPr>
+        <p:spPr>
+          <a:xfrm>
+            <a:off x="431820" y="1297840"/>
+            <a:ext cx="976586" cy="246221"/>
+          </a:xfrm>
+          <a:prstGeom prst="rect">
+            <a:avLst/>
+          </a:prstGeom>
+          <a:noFill/>
+        </p:spPr>
+        <p:txBody>
+          <a:bodyPr wrap="square" rtlCol="0">
+            <a:spAutoFit/>
+          </a:bodyPr>
+          <a:lstStyle/>
+          <a:p>
+            <a:r>
+              <a:rPr lang="en-US" sz="1000" dirty="0" err="1"/>
+              <a:t>entryRegister</a:t>
+            </a:r>
+            <a:r>
+              <a:rPr lang="en-US" sz="1000" dirty="0"/>
+              <a:t>()</a:t>
+            </a:r>
+          </a:p>
+        </p:txBody>
+      </p:sp>
+      <p:sp>
+        <p:nvSpPr>
+          <p:cNvPr id="6" name="TextBox 5">
+            <a:extLst>
+              <a:ext uri="{FF2B5EF4-FFF2-40B4-BE49-F238E27FC236}">
+                <a16:creationId xmlns:a16="http://schemas.microsoft.com/office/drawing/2014/main" id="{1E9FFABC-5C42-2C4C-BCC1-7F4E13F168F3}"/>
+              </a:ext>
+            </a:extLst>
+          </p:cNvPr>
+          <p:cNvSpPr txBox="1"/>
+          <p:nvPr/>
+        </p:nvSpPr>
+        <p:spPr>
+          <a:xfrm>
+            <a:off x="431820" y="2918457"/>
+            <a:ext cx="1033555" cy="246221"/>
+          </a:xfrm>
+          <a:prstGeom prst="rect">
+            <a:avLst/>
+          </a:prstGeom>
+          <a:noFill/>
+        </p:spPr>
+        <p:txBody>
+          <a:bodyPr wrap="square" rtlCol="0">
+            <a:spAutoFit/>
+          </a:bodyPr>
+          <a:lstStyle/>
+          <a:p>
+            <a:r>
+              <a:rPr lang="en-US" sz="1000" dirty="0" err="1"/>
+              <a:t>poolUpdate</a:t>
+            </a:r>
+            <a:r>
+              <a:rPr lang="en-US" sz="1000" dirty="0"/>
+              <a:t>()</a:t>
+            </a:r>
+          </a:p>
+        </p:txBody>
+      </p:sp>
+      <p:sp>
+        <p:nvSpPr>
+          <p:cNvPr id="7" name="Left Brace 6">
+            <a:extLst>
+              <a:ext uri="{FF2B5EF4-FFF2-40B4-BE49-F238E27FC236}">
+                <a16:creationId xmlns:a16="http://schemas.microsoft.com/office/drawing/2014/main" id="{D221C478-887E-7D4A-97C3-68F7D04194EF}"/>
+              </a:ext>
+            </a:extLst>
+          </p:cNvPr>
+          <p:cNvSpPr/>
+          <p:nvPr/>
+        </p:nvSpPr>
+        <p:spPr>
+          <a:xfrm>
+            <a:off x="1347631" y="4122396"/>
+            <a:ext cx="197665" cy="375765"/>
+          </a:xfrm>
+          <a:prstGeom prst="leftBrace">
+            <a:avLst>
+              <a:gd name="adj1" fmla="val 8333"/>
+              <a:gd name="adj2" fmla="val 47457"/>
+            </a:avLst>
+          </a:prstGeom>
+        </p:spPr>
+        <p:style>
+          <a:lnRef idx="1">
+            <a:schemeClr val="accent1"/>
+          </a:lnRef>
+          <a:fillRef idx="0">
+            <a:schemeClr val="accent1"/>
+          </a:fillRef>
+          <a:effectRef idx="0">
+            <a:schemeClr val="accent1"/>
+          </a:effectRef>
+          <a:fontRef idx="minor">
+            <a:schemeClr val="tx1"/>
+          </a:fontRef>
+        </p:style>
+        <p:txBody>
+          <a:bodyPr rtlCol="0" anchor="ctr"/>
+          <a:lstStyle/>
+          <a:p>
+            <a:pPr algn="ctr"/>
+            <a:endParaRPr lang="en-US"/>
+          </a:p>
+        </p:txBody>
+      </p:sp>
+      <p:sp>
+        <p:nvSpPr>
+          <p:cNvPr id="8" name="TextBox 7">
+            <a:extLst>
+              <a:ext uri="{FF2B5EF4-FFF2-40B4-BE49-F238E27FC236}">
+                <a16:creationId xmlns:a16="http://schemas.microsoft.com/office/drawing/2014/main" id="{08ED3E21-8C22-FC4B-9FC4-ECC5B1CEF74D}"/>
+              </a:ext>
+            </a:extLst>
+          </p:cNvPr>
+          <p:cNvSpPr txBox="1"/>
+          <p:nvPr/>
+        </p:nvSpPr>
+        <p:spPr>
+          <a:xfrm>
+            <a:off x="330053" y="4112560"/>
+            <a:ext cx="1108711" cy="246221"/>
+          </a:xfrm>
+          <a:prstGeom prst="rect">
+            <a:avLst/>
+          </a:prstGeom>
+          <a:noFill/>
+        </p:spPr>
+        <p:txBody>
+          <a:bodyPr wrap="square" rtlCol="0">
+            <a:spAutoFit/>
+          </a:bodyPr>
+          <a:lstStyle/>
+          <a:p>
+            <a:r>
+              <a:rPr lang="en-US" sz="1000" dirty="0" err="1"/>
+              <a:t>playerSelection</a:t>
+            </a:r>
+            <a:r>
+              <a:rPr lang="en-US" sz="1000" dirty="0"/>
+              <a:t>()</a:t>
+            </a:r>
+          </a:p>
+        </p:txBody>
+      </p:sp>
+      <p:sp>
+        <p:nvSpPr>
+          <p:cNvPr id="9" name="Oval 8">
+            <a:extLst>
+              <a:ext uri="{FF2B5EF4-FFF2-40B4-BE49-F238E27FC236}">
+                <a16:creationId xmlns:a16="http://schemas.microsoft.com/office/drawing/2014/main" id="{26DD986B-9C1C-A345-AB35-C94D8A1A101C}"/>
+              </a:ext>
+            </a:extLst>
+          </p:cNvPr>
+          <p:cNvSpPr/>
+          <p:nvPr/>
+        </p:nvSpPr>
+        <p:spPr>
+          <a:xfrm>
+            <a:off x="6563360" y="1005840"/>
+            <a:ext cx="2692400" cy="1574800"/>
+          </a:xfrm>
+          <a:prstGeom prst="ellipse">
+            <a:avLst/>
+          </a:prstGeom>
+        </p:spPr>
+        <p:style>
+          <a:lnRef idx="2">
+            <a:schemeClr val="accent1">
+              <a:shade val="50000"/>
+            </a:schemeClr>
+          </a:lnRef>
+          <a:fillRef idx="1">
+            <a:schemeClr val="accent1"/>
+          </a:fillRef>
+          <a:effectRef idx="0">
+            <a:schemeClr val="accent1"/>
+          </a:effectRef>
+          <a:fontRef idx="minor">
+            <a:schemeClr val="lt1"/>
+          </a:fontRef>
+        </p:style>
+        <p:txBody>
+          <a:bodyPr rtlCol="0" anchor="ctr"/>
+          <a:lstStyle/>
+          <a:p>
+            <a:pPr algn="ctr"/>
+            <a:endParaRPr lang="en-US"/>
+          </a:p>
+        </p:txBody>
+      </p:sp>
+      <p:sp>
+        <p:nvSpPr>
+          <p:cNvPr id="11" name="TextBox 10">
+            <a:extLst>
+              <a:ext uri="{FF2B5EF4-FFF2-40B4-BE49-F238E27FC236}">
+                <a16:creationId xmlns:a16="http://schemas.microsoft.com/office/drawing/2014/main" id="{1CEE7FF1-B5B9-E442-AA02-41A53B56C5AB}"/>
+              </a:ext>
+            </a:extLst>
+          </p:cNvPr>
+          <p:cNvSpPr txBox="1"/>
+          <p:nvPr/>
+        </p:nvSpPr>
+        <p:spPr>
+          <a:xfrm>
+            <a:off x="2824500" y="1051619"/>
+            <a:ext cx="1033555" cy="246221"/>
+          </a:xfrm>
+          <a:prstGeom prst="rect">
+            <a:avLst/>
+          </a:prstGeom>
+          <a:noFill/>
+        </p:spPr>
+        <p:txBody>
+          <a:bodyPr wrap="square" rtlCol="0">
+            <a:spAutoFit/>
+          </a:bodyPr>
+          <a:lstStyle/>
+          <a:p>
+            <a:r>
+              <a:rPr lang="en-US" sz="1000" dirty="0"/>
+              <a:t>200*9</a:t>
+            </a:r>
+          </a:p>
+        </p:txBody>
+      </p:sp>
+      <p:sp>
+        <p:nvSpPr>
+          <p:cNvPr id="13" name="TextBox 12">
+            <a:extLst>
+              <a:ext uri="{FF2B5EF4-FFF2-40B4-BE49-F238E27FC236}">
+                <a16:creationId xmlns:a16="http://schemas.microsoft.com/office/drawing/2014/main" id="{4EC7E3E0-8E0B-F04D-AFFF-EC765549243D}"/>
+              </a:ext>
+            </a:extLst>
+          </p:cNvPr>
+          <p:cNvSpPr txBox="1"/>
+          <p:nvPr/>
+        </p:nvSpPr>
+        <p:spPr>
+          <a:xfrm>
+            <a:off x="2641620" y="4251940"/>
+            <a:ext cx="1099800" cy="246221"/>
+          </a:xfrm>
+          <a:prstGeom prst="rect">
+            <a:avLst/>
+          </a:prstGeom>
+          <a:noFill/>
+        </p:spPr>
+        <p:txBody>
+          <a:bodyPr wrap="square" rtlCol="0">
+            <a:spAutoFit/>
+          </a:bodyPr>
+          <a:lstStyle/>
+          <a:p>
+            <a:r>
+              <a:rPr lang="en-US" sz="1000" dirty="0"/>
+              <a:t>25 * 2 (columns)</a:t>
+            </a:r>
+          </a:p>
+        </p:txBody>
+      </p:sp>
+      <p:sp>
+        <p:nvSpPr>
+          <p:cNvPr id="14" name="TextBox 13">
+            <a:extLst>
+              <a:ext uri="{FF2B5EF4-FFF2-40B4-BE49-F238E27FC236}">
+                <a16:creationId xmlns:a16="http://schemas.microsoft.com/office/drawing/2014/main" id="{3DA993EC-E531-BF44-B8E3-82FCEE20306C}"/>
+              </a:ext>
+            </a:extLst>
+          </p:cNvPr>
+          <p:cNvSpPr txBox="1"/>
+          <p:nvPr/>
+        </p:nvSpPr>
+        <p:spPr>
+          <a:xfrm>
+            <a:off x="2923560" y="2947746"/>
+            <a:ext cx="1033555" cy="246221"/>
+          </a:xfrm>
+          <a:prstGeom prst="rect">
+            <a:avLst/>
+          </a:prstGeom>
+          <a:noFill/>
+        </p:spPr>
+        <p:txBody>
+          <a:bodyPr wrap="square" rtlCol="0">
+            <a:spAutoFit/>
+          </a:bodyPr>
+          <a:lstStyle/>
+          <a:p>
+            <a:r>
+              <a:rPr lang="en-US" sz="1000" dirty="0"/>
+              <a:t>200*10</a:t>
+            </a:r>
           </a:p>
         </p:txBody>
       </p:sp>
     </p:spTree>
     <p:extLst>
       <p:ext uri="{BB962C8B-B14F-4D97-AF65-F5344CB8AC3E}">
-        <p14:creationId xmlns:p14="http://schemas.microsoft.com/office/powerpoint/2010/main" val="4016732218"/>
+        <p14:creationId xmlns:p14="http://schemas.microsoft.com/office/powerpoint/2010/main" val="515734174"/>
       </p:ext>
     </p:extLst>
   </p:cSld>
@@ -6445,7 +8013,7 @@
           <p:cNvPr id="2" name="TextBox 1">
             <a:extLst>
               <a:ext uri="{FF2B5EF4-FFF2-40B4-BE49-F238E27FC236}">
-                <a16:creationId xmlns:a16="http://schemas.microsoft.com/office/drawing/2014/main" id="{2589C3A5-A5ED-C346-97D9-9ED1C7A54DC8}"/>
+                <a16:creationId xmlns:a16="http://schemas.microsoft.com/office/drawing/2014/main" id="{766198B4-E8EC-4B4E-AB00-FCB1580E4824}"/>
               </a:ext>
             </a:extLst>
           </p:cNvPr>
@@ -6454,8 +8022,8 @@
         </p:nvSpPr>
         <p:spPr>
           <a:xfrm>
-            <a:off x="1465375" y="506602"/>
-            <a:ext cx="4239088" cy="4401205"/>
+            <a:off x="1071716" y="983226"/>
+            <a:ext cx="10815484" cy="4247317"/>
           </a:xfrm>
           <a:prstGeom prst="rect">
             <a:avLst/>
@@ -6469,658 +8037,135 @@
           <a:lstStyle/>
           <a:p>
             <a:r>
-              <a:rPr lang="en-US" sz="1000" i="1" dirty="0" err="1">
-                <a:solidFill>
-                  <a:srgbClr val="00B050"/>
-                </a:solidFill>
-              </a:rPr>
-              <a:t>pool_entry</a:t>
-            </a:r>
-            <a:r>
-              <a:rPr lang="en-US" sz="1000" i="1" dirty="0">
-                <a:solidFill>
-                  <a:srgbClr val="00B050"/>
-                </a:solidFill>
-              </a:rPr>
-              <a:t> table;</a:t>
-            </a:r>
-            <a:endParaRPr lang="en-US" sz="1000" dirty="0">
-              <a:solidFill>
-                <a:srgbClr val="00B050"/>
-              </a:solidFill>
-            </a:endParaRPr>
-          </a:p>
-          <a:p>
-            <a:r>
-              <a:rPr lang="en-US" sz="1000" dirty="0">
-                <a:solidFill>
-                  <a:srgbClr val="FF0000"/>
-                </a:solidFill>
-              </a:rPr>
-              <a:t>PoolTeamName: [QuadSquad]</a:t>
-            </a:r>
-          </a:p>
-          <a:p>
-            <a:r>
-              <a:rPr lang="en-US" sz="1000" dirty="0">
-                <a:solidFill>
-                  <a:srgbClr val="FF0000"/>
-                </a:solidFill>
-              </a:rPr>
-              <a:t>GM: [GM Name]</a:t>
-            </a:r>
-          </a:p>
-          <a:p>
-            <a:r>
-              <a:rPr lang="en-US" sz="1000" dirty="0">
-                <a:solidFill>
-                  <a:srgbClr val="FF0000"/>
-                </a:solidFill>
-              </a:rPr>
-              <a:t>Email:</a:t>
-            </a:r>
-          </a:p>
-          <a:p>
-            <a:r>
-              <a:rPr lang="en-US" sz="1000" dirty="0">
-                <a:solidFill>
-                  <a:srgbClr val="FF0000"/>
-                </a:solidFill>
-              </a:rPr>
-              <a:t>Hometown:</a:t>
-            </a:r>
-          </a:p>
-          <a:p>
-            <a:r>
-              <a:rPr lang="en-US" sz="1000" dirty="0">
-                <a:solidFill>
-                  <a:srgbClr val="FF0000"/>
-                </a:solidFill>
-              </a:rPr>
-              <a:t>Country:</a:t>
-            </a:r>
-          </a:p>
-          <a:p>
-            <a:r>
-              <a:rPr lang="en-US" sz="1000" dirty="0">
-                <a:solidFill>
-                  <a:srgbClr val="FF0000"/>
-                </a:solidFill>
-              </a:rPr>
-              <a:t>Pay Status: [NotPaid, PayPal, Cheque, Cash, Coupon]</a:t>
-            </a:r>
-          </a:p>
-          <a:p>
-            <a:r>
-              <a:rPr lang="en-US" sz="1000" dirty="0">
-                <a:solidFill>
-                  <a:srgbClr val="FF0000"/>
-                </a:solidFill>
-              </a:rPr>
-              <a:t>Pay Amount: </a:t>
-            </a:r>
-          </a:p>
-          <a:p>
-            <a:r>
-              <a:rPr lang="en-US" sz="1000" dirty="0">
-                <a:solidFill>
-                  <a:srgbClr val="FF0000"/>
-                </a:solidFill>
-              </a:rPr>
-              <a:t>Status:  [Incomplete, complete]</a:t>
-            </a:r>
-          </a:p>
-          <a:p>
-            <a:endParaRPr lang="en-US" sz="1000" dirty="0">
-              <a:solidFill>
-                <a:srgbClr val="FF0000"/>
-              </a:solidFill>
-            </a:endParaRPr>
-          </a:p>
-          <a:p>
-            <a:r>
-              <a:rPr lang="en-US" sz="1000" dirty="0" err="1">
-                <a:solidFill>
-                  <a:srgbClr val="00B050"/>
-                </a:solidFill>
-              </a:rPr>
-              <a:t>entry_stats</a:t>
-            </a:r>
-            <a:r>
-              <a:rPr lang="en-US" sz="1000" dirty="0">
-                <a:solidFill>
-                  <a:srgbClr val="00B050"/>
-                </a:solidFill>
-              </a:rPr>
-              <a:t> table;</a:t>
-            </a:r>
-          </a:p>
-          <a:p>
-            <a:r>
-              <a:rPr lang="en-US" sz="1000" dirty="0" err="1">
-                <a:solidFill>
-                  <a:srgbClr val="FF0000"/>
-                </a:solidFill>
-              </a:rPr>
-              <a:t>currentPoints</a:t>
-            </a:r>
-            <a:endParaRPr lang="en-US" sz="1000" dirty="0">
-              <a:solidFill>
-                <a:srgbClr val="FF0000"/>
-              </a:solidFill>
-            </a:endParaRPr>
-          </a:p>
-          <a:p>
-            <a:r>
-              <a:rPr lang="en-US" sz="1000" dirty="0" err="1">
-                <a:solidFill>
-                  <a:srgbClr val="FF0000"/>
-                </a:solidFill>
-              </a:rPr>
-              <a:t>currentRank</a:t>
-            </a:r>
-            <a:endParaRPr lang="en-US" sz="1000" dirty="0">
-              <a:solidFill>
-                <a:srgbClr val="FF0000"/>
-              </a:solidFill>
-            </a:endParaRPr>
-          </a:p>
-          <a:p>
-            <a:r>
-              <a:rPr lang="en-US" sz="1000" dirty="0" err="1">
-                <a:solidFill>
-                  <a:srgbClr val="FF0000"/>
-                </a:solidFill>
-              </a:rPr>
-              <a:t>morningRank</a:t>
-            </a:r>
-            <a:endParaRPr lang="en-US" sz="1000" dirty="0">
-              <a:solidFill>
-                <a:srgbClr val="FF0000"/>
-              </a:solidFill>
-            </a:endParaRPr>
-          </a:p>
-          <a:p>
-            <a:r>
-              <a:rPr lang="en-US" sz="1000" dirty="0" err="1">
-                <a:solidFill>
-                  <a:srgbClr val="FF0000"/>
-                </a:solidFill>
-              </a:rPr>
-              <a:t>morningPoints</a:t>
-            </a:r>
-            <a:endParaRPr lang="en-US" sz="1000" dirty="0">
-              <a:solidFill>
-                <a:srgbClr val="FF0000"/>
-              </a:solidFill>
-            </a:endParaRPr>
-          </a:p>
-          <a:p>
-            <a:r>
-              <a:rPr lang="en-US" sz="1000" dirty="0">
-                <a:solidFill>
-                  <a:srgbClr val="FF0000"/>
-                </a:solidFill>
-              </a:rPr>
-              <a:t>active</a:t>
-            </a:r>
-          </a:p>
-          <a:p>
-            <a:r>
-              <a:rPr lang="en-US" sz="1000" dirty="0">
-                <a:solidFill>
-                  <a:srgbClr val="FF0000"/>
-                </a:solidFill>
-              </a:rPr>
-              <a:t>duds</a:t>
-            </a:r>
-          </a:p>
-          <a:p>
-            <a:r>
-              <a:rPr lang="en-US" sz="1000" dirty="0">
-                <a:solidFill>
-                  <a:srgbClr val="FF0000"/>
-                </a:solidFill>
-              </a:rPr>
-              <a:t>rookie</a:t>
-            </a:r>
-          </a:p>
-          <a:p>
-            <a:r>
-              <a:rPr lang="en-US" sz="1000" dirty="0">
-                <a:solidFill>
-                  <a:srgbClr val="FF0000"/>
-                </a:solidFill>
-              </a:rPr>
-              <a:t>prize </a:t>
-            </a:r>
-          </a:p>
-          <a:p>
-            <a:endParaRPr lang="en-US" sz="1000" dirty="0">
-              <a:solidFill>
-                <a:srgbClr val="FF0000"/>
-              </a:solidFill>
-            </a:endParaRPr>
-          </a:p>
-          <a:p>
-            <a:r>
-              <a:rPr lang="en-US" sz="1000" dirty="0" err="1">
-                <a:solidFill>
-                  <a:srgbClr val="00B050"/>
-                </a:solidFill>
-              </a:rPr>
-              <a:t>entry_players</a:t>
-            </a:r>
-            <a:r>
-              <a:rPr lang="en-US" sz="1000" dirty="0">
-                <a:solidFill>
-                  <a:srgbClr val="00B050"/>
-                </a:solidFill>
-              </a:rPr>
-              <a:t> table;</a:t>
-            </a:r>
-          </a:p>
-          <a:p>
-            <a:r>
-              <a:rPr lang="en-US" sz="1000" dirty="0">
-                <a:solidFill>
-                  <a:srgbClr val="FF0000"/>
-                </a:solidFill>
-              </a:rPr>
-              <a:t>25* </a:t>
-            </a:r>
-            <a:r>
-              <a:rPr lang="en-US" sz="1000" dirty="0" err="1">
-                <a:solidFill>
-                  <a:srgbClr val="FF0000"/>
-                </a:solidFill>
-              </a:rPr>
-              <a:t>playerID</a:t>
-            </a:r>
-            <a:r>
-              <a:rPr lang="en-US" sz="1000" dirty="0">
-                <a:solidFill>
-                  <a:srgbClr val="FF0000"/>
-                </a:solidFill>
-              </a:rPr>
-              <a:t>.</a:t>
-            </a:r>
-          </a:p>
-          <a:p>
-            <a:endParaRPr lang="en-US" sz="1000" dirty="0">
-              <a:solidFill>
-                <a:srgbClr val="FF0000"/>
-              </a:solidFill>
-            </a:endParaRPr>
-          </a:p>
-          <a:p>
-            <a:endParaRPr lang="en-US" sz="1000" dirty="0">
-              <a:solidFill>
-                <a:srgbClr val="FF0000"/>
-              </a:solidFill>
-            </a:endParaRPr>
-          </a:p>
-          <a:p>
-            <a:r>
-              <a:rPr lang="en-US" sz="1000" dirty="0" err="1">
-                <a:solidFill>
-                  <a:srgbClr val="00B050"/>
-                </a:solidFill>
-              </a:rPr>
-              <a:t>activePlayers</a:t>
-            </a:r>
-            <a:r>
-              <a:rPr lang="en-US" sz="1000" dirty="0">
-                <a:solidFill>
-                  <a:srgbClr val="00B050"/>
-                </a:solidFill>
-              </a:rPr>
-              <a:t> table;</a:t>
-            </a:r>
-          </a:p>
-          <a:p>
-            <a:r>
-              <a:rPr lang="en-US" sz="1000" dirty="0" err="1">
-                <a:solidFill>
-                  <a:srgbClr val="FF0000"/>
-                </a:solidFill>
-              </a:rPr>
-              <a:t>Player_id</a:t>
-            </a:r>
-            <a:r>
-              <a:rPr lang="en-US" sz="1000" dirty="0">
-                <a:solidFill>
-                  <a:srgbClr val="FF0000"/>
-                </a:solidFill>
-              </a:rPr>
+              <a:rPr lang="en-US" dirty="0" err="1"/>
+              <a:t>JHP_Design.pptx</a:t>
+            </a:r>
+            <a:r>
+              <a:rPr lang="en-US" dirty="0"/>
+              <a:t> -   Design doc</a:t>
+            </a:r>
+          </a:p>
+          <a:p>
+            <a:r>
+              <a:rPr lang="en-US" dirty="0" err="1"/>
+              <a:t>jhp.py</a:t>
+            </a:r>
+            <a:r>
+              <a:rPr lang="en-US" dirty="0"/>
+              <a:t> – Database modification functions</a:t>
+            </a:r>
+          </a:p>
+          <a:p>
+            <a:r>
+              <a:rPr lang="en-US" dirty="0"/>
+              <a:t>players-</a:t>
+            </a:r>
+            <a:r>
+              <a:rPr lang="en-US" dirty="0" err="1"/>
+              <a:t>update.py</a:t>
+            </a:r>
+            <a:r>
+              <a:rPr lang="en-US" dirty="0"/>
+              <a:t> -  modifies playersDB (two tables: </a:t>
+            </a:r>
+            <a:r>
+              <a:rPr lang="en-US" dirty="0" err="1"/>
+              <a:t>active_players</a:t>
+            </a:r>
+            <a:r>
+              <a:rPr lang="en-US" dirty="0"/>
               <a:t>, </a:t>
             </a:r>
             <a:r>
-              <a:rPr lang="en-US" sz="1000" dirty="0" err="1">
-                <a:solidFill>
-                  <a:srgbClr val="FF0000"/>
-                </a:solidFill>
-              </a:rPr>
-              <a:t>player_name</a:t>
-            </a:r>
-            <a:r>
-              <a:rPr lang="en-US" sz="1000" dirty="0">
-                <a:solidFill>
-                  <a:srgbClr val="FF0000"/>
-                </a:solidFill>
-              </a:rPr>
-              <a:t>, team_id, team_name, </a:t>
-            </a:r>
-            <a:r>
-              <a:rPr lang="en-US" sz="1000" dirty="0" err="1">
-                <a:solidFill>
-                  <a:srgbClr val="FF0000"/>
-                </a:solidFill>
-              </a:rPr>
-              <a:t>player_type</a:t>
-            </a:r>
-            <a:r>
-              <a:rPr lang="en-US" sz="1000" dirty="0">
-                <a:solidFill>
-                  <a:srgbClr val="FF0000"/>
-                </a:solidFill>
-              </a:rPr>
-              <a:t>, goals, assists, wins, shutouts, </a:t>
-            </a:r>
-            <a:r>
-              <a:rPr lang="en-US" sz="1000" dirty="0" err="1">
-                <a:solidFill>
-                  <a:srgbClr val="FF0000"/>
-                </a:solidFill>
-              </a:rPr>
-              <a:t>c_points</a:t>
-            </a:r>
-            <a:r>
-              <a:rPr lang="en-US" sz="1000" dirty="0">
-                <a:solidFill>
-                  <a:srgbClr val="FF0000"/>
-                </a:solidFill>
-              </a:rPr>
-              <a:t>, </a:t>
-            </a:r>
-            <a:r>
-              <a:rPr lang="en-US" sz="1000" dirty="0" err="1">
-                <a:solidFill>
-                  <a:srgbClr val="FF0000"/>
-                </a:solidFill>
-              </a:rPr>
-              <a:t>p_points</a:t>
-            </a:r>
-            <a:r>
-              <a:rPr lang="en-US" sz="1000" dirty="0">
-                <a:solidFill>
-                  <a:srgbClr val="FF0000"/>
-                </a:solidFill>
-              </a:rPr>
-              <a:t> (previous), status_id (0-5), selected,</a:t>
-            </a:r>
-          </a:p>
-          <a:p>
-            <a:endParaRPr lang="en-US" sz="1000" dirty="0">
-              <a:solidFill>
-                <a:srgbClr val="FF0000"/>
-              </a:solidFill>
-            </a:endParaRPr>
-          </a:p>
-        </p:txBody>
-      </p:sp>
-      <p:sp>
-        <p:nvSpPr>
-          <p:cNvPr id="3" name="Left Brace 2">
-            <a:extLst>
-              <a:ext uri="{FF2B5EF4-FFF2-40B4-BE49-F238E27FC236}">
-                <a16:creationId xmlns:a16="http://schemas.microsoft.com/office/drawing/2014/main" id="{D6692E7C-7ACB-C949-B6A3-5EA295ACD06D}"/>
-              </a:ext>
-            </a:extLst>
-          </p:cNvPr>
-          <p:cNvSpPr/>
-          <p:nvPr/>
-        </p:nvSpPr>
-        <p:spPr>
-          <a:xfrm>
-            <a:off x="1355719" y="721310"/>
-            <a:ext cx="102094" cy="1216240"/>
-          </a:xfrm>
-          <a:prstGeom prst="leftBrace">
-            <a:avLst/>
-          </a:prstGeom>
-        </p:spPr>
-        <p:style>
-          <a:lnRef idx="1">
-            <a:schemeClr val="accent1"/>
-          </a:lnRef>
-          <a:fillRef idx="0">
-            <a:schemeClr val="accent1"/>
-          </a:fillRef>
-          <a:effectRef idx="0">
-            <a:schemeClr val="accent1"/>
-          </a:effectRef>
-          <a:fontRef idx="minor">
-            <a:schemeClr val="tx1"/>
-          </a:fontRef>
-        </p:style>
-        <p:txBody>
-          <a:bodyPr rtlCol="0" anchor="ctr"/>
-          <a:lstStyle/>
-          <a:p>
-            <a:pPr algn="ctr"/>
-            <a:endParaRPr lang="en-US"/>
-          </a:p>
-        </p:txBody>
-      </p:sp>
-      <p:sp>
-        <p:nvSpPr>
-          <p:cNvPr id="4" name="Left Brace 3">
-            <a:extLst>
-              <a:ext uri="{FF2B5EF4-FFF2-40B4-BE49-F238E27FC236}">
-                <a16:creationId xmlns:a16="http://schemas.microsoft.com/office/drawing/2014/main" id="{80F950EA-92E3-8244-B65B-C7B8AC7E7D2A}"/>
-              </a:ext>
-            </a:extLst>
-          </p:cNvPr>
-          <p:cNvSpPr/>
-          <p:nvPr/>
-        </p:nvSpPr>
-        <p:spPr>
-          <a:xfrm>
-            <a:off x="1363280" y="2060661"/>
-            <a:ext cx="146105" cy="1216240"/>
-          </a:xfrm>
-          <a:prstGeom prst="leftBrace">
-            <a:avLst/>
-          </a:prstGeom>
-        </p:spPr>
-        <p:style>
-          <a:lnRef idx="1">
-            <a:schemeClr val="accent1"/>
-          </a:lnRef>
-          <a:fillRef idx="0">
-            <a:schemeClr val="accent1"/>
-          </a:fillRef>
-          <a:effectRef idx="0">
-            <a:schemeClr val="accent1"/>
-          </a:effectRef>
-          <a:fontRef idx="minor">
-            <a:schemeClr val="tx1"/>
-          </a:fontRef>
-        </p:style>
-        <p:txBody>
-          <a:bodyPr rtlCol="0" anchor="ctr"/>
-          <a:lstStyle/>
-          <a:p>
-            <a:pPr algn="ctr"/>
-            <a:endParaRPr lang="en-US"/>
-          </a:p>
-        </p:txBody>
-      </p:sp>
-      <p:sp>
-        <p:nvSpPr>
-          <p:cNvPr id="5" name="TextBox 4">
-            <a:extLst>
-              <a:ext uri="{FF2B5EF4-FFF2-40B4-BE49-F238E27FC236}">
-                <a16:creationId xmlns:a16="http://schemas.microsoft.com/office/drawing/2014/main" id="{F21926C9-7BE1-4E42-BD9E-6808FBDFE44E}"/>
-              </a:ext>
-            </a:extLst>
-          </p:cNvPr>
-          <p:cNvSpPr txBox="1"/>
-          <p:nvPr/>
-        </p:nvSpPr>
-        <p:spPr>
-          <a:xfrm>
-            <a:off x="413098" y="1206319"/>
-            <a:ext cx="942622" cy="246221"/>
-          </a:xfrm>
-          <a:prstGeom prst="rect">
-            <a:avLst/>
-          </a:prstGeom>
-          <a:noFill/>
-        </p:spPr>
-        <p:txBody>
-          <a:bodyPr wrap="square" rtlCol="0">
-            <a:spAutoFit/>
-          </a:bodyPr>
-          <a:lstStyle/>
-          <a:p>
-            <a:r>
-              <a:rPr lang="en-US" sz="1000" dirty="0"/>
-              <a:t>registration()</a:t>
-            </a:r>
-          </a:p>
-        </p:txBody>
-      </p:sp>
-      <p:sp>
-        <p:nvSpPr>
-          <p:cNvPr id="6" name="TextBox 5">
-            <a:extLst>
-              <a:ext uri="{FF2B5EF4-FFF2-40B4-BE49-F238E27FC236}">
-                <a16:creationId xmlns:a16="http://schemas.microsoft.com/office/drawing/2014/main" id="{1E9FFABC-5C42-2C4C-BCC1-7F4E13F168F3}"/>
-              </a:ext>
-            </a:extLst>
-          </p:cNvPr>
-          <p:cNvSpPr txBox="1"/>
-          <p:nvPr/>
-        </p:nvSpPr>
-        <p:spPr>
-          <a:xfrm>
-            <a:off x="519830" y="2453194"/>
-            <a:ext cx="1033555" cy="246221"/>
-          </a:xfrm>
-          <a:prstGeom prst="rect">
-            <a:avLst/>
-          </a:prstGeom>
-          <a:noFill/>
-        </p:spPr>
-        <p:txBody>
-          <a:bodyPr wrap="square" rtlCol="0">
-            <a:spAutoFit/>
-          </a:bodyPr>
-          <a:lstStyle/>
-          <a:p>
-            <a:r>
-              <a:rPr lang="en-US" sz="1000" dirty="0" err="1"/>
-              <a:t>poolUpdate</a:t>
-            </a:r>
-            <a:r>
-              <a:rPr lang="en-US" sz="1000" dirty="0"/>
-              <a:t>()</a:t>
-            </a:r>
-          </a:p>
-        </p:txBody>
-      </p:sp>
-      <p:sp>
-        <p:nvSpPr>
-          <p:cNvPr id="7" name="Left Brace 6">
-            <a:extLst>
-              <a:ext uri="{FF2B5EF4-FFF2-40B4-BE49-F238E27FC236}">
-                <a16:creationId xmlns:a16="http://schemas.microsoft.com/office/drawing/2014/main" id="{D221C478-887E-7D4A-97C3-68F7D04194EF}"/>
-              </a:ext>
-            </a:extLst>
-          </p:cNvPr>
-          <p:cNvSpPr/>
-          <p:nvPr/>
-        </p:nvSpPr>
-        <p:spPr>
-          <a:xfrm>
-            <a:off x="1355719" y="3641738"/>
-            <a:ext cx="197665" cy="246221"/>
-          </a:xfrm>
-          <a:prstGeom prst="leftBrace">
-            <a:avLst>
-              <a:gd name="adj1" fmla="val 8333"/>
-              <a:gd name="adj2" fmla="val 47457"/>
-            </a:avLst>
-          </a:prstGeom>
-        </p:spPr>
-        <p:style>
-          <a:lnRef idx="1">
-            <a:schemeClr val="accent1"/>
-          </a:lnRef>
-          <a:fillRef idx="0">
-            <a:schemeClr val="accent1"/>
-          </a:fillRef>
-          <a:effectRef idx="0">
-            <a:schemeClr val="accent1"/>
-          </a:effectRef>
-          <a:fontRef idx="minor">
-            <a:schemeClr val="tx1"/>
-          </a:fontRef>
-        </p:style>
-        <p:txBody>
-          <a:bodyPr rtlCol="0" anchor="ctr"/>
-          <a:lstStyle/>
-          <a:p>
-            <a:pPr algn="ctr"/>
-            <a:endParaRPr lang="en-US"/>
-          </a:p>
-        </p:txBody>
-      </p:sp>
-      <p:sp>
-        <p:nvSpPr>
-          <p:cNvPr id="8" name="TextBox 7">
-            <a:extLst>
-              <a:ext uri="{FF2B5EF4-FFF2-40B4-BE49-F238E27FC236}">
-                <a16:creationId xmlns:a16="http://schemas.microsoft.com/office/drawing/2014/main" id="{08ED3E21-8C22-FC4B-9FC4-ECC5B1CEF74D}"/>
-              </a:ext>
-            </a:extLst>
-          </p:cNvPr>
-          <p:cNvSpPr txBox="1"/>
-          <p:nvPr/>
-        </p:nvSpPr>
-        <p:spPr>
-          <a:xfrm>
-            <a:off x="345840" y="3629882"/>
-            <a:ext cx="1108711" cy="246221"/>
-          </a:xfrm>
-          <a:prstGeom prst="rect">
-            <a:avLst/>
-          </a:prstGeom>
-          <a:noFill/>
-        </p:spPr>
-        <p:txBody>
-          <a:bodyPr wrap="square" rtlCol="0">
-            <a:spAutoFit/>
-          </a:bodyPr>
-          <a:lstStyle/>
-          <a:p>
-            <a:r>
-              <a:rPr lang="en-US" sz="1000" dirty="0" err="1"/>
-              <a:t>playerSelection</a:t>
-            </a:r>
-            <a:r>
-              <a:rPr lang="en-US" sz="1000" dirty="0"/>
-              <a:t>()</a:t>
-            </a:r>
+              <a:rPr lang="en-US" dirty="0" err="1"/>
+              <a:t>all_players</a:t>
+            </a:r>
+            <a:r>
+              <a:rPr lang="en-US" dirty="0"/>
+              <a:t>     - also gets data from teamsDB</a:t>
+            </a:r>
+          </a:p>
+          <a:p>
+            <a:r>
+              <a:rPr lang="en-US" dirty="0"/>
+              <a:t>pool-</a:t>
+            </a:r>
+            <a:r>
+              <a:rPr lang="en-US" dirty="0" err="1"/>
+              <a:t>entry.py</a:t>
+            </a:r>
+            <a:r>
+              <a:rPr lang="en-US" dirty="0"/>
+              <a:t> – routines for Pool table registration and player selection</a:t>
+            </a:r>
+          </a:p>
+          <a:p>
+            <a:r>
+              <a:rPr lang="en-US" dirty="0"/>
+              <a:t>teams-</a:t>
+            </a:r>
+            <a:r>
+              <a:rPr lang="en-US" dirty="0" err="1"/>
+              <a:t>update.py</a:t>
+            </a:r>
+            <a:r>
+              <a:rPr lang="en-US" dirty="0"/>
+              <a:t> -  initiates teamsDB and teams table.   Records which team is active, etc.</a:t>
+            </a:r>
+          </a:p>
+          <a:p>
+            <a:endParaRPr lang="en-US" dirty="0"/>
+          </a:p>
+          <a:p>
+            <a:endParaRPr lang="en-US" dirty="0"/>
+          </a:p>
+          <a:p>
+            <a:endParaRPr lang="en-US" dirty="0"/>
+          </a:p>
+          <a:p>
+            <a:endParaRPr lang="en-US" dirty="0"/>
+          </a:p>
+          <a:p>
+            <a:r>
+              <a:rPr lang="en-US" dirty="0"/>
+              <a:t>PoolDB</a:t>
+            </a:r>
+          </a:p>
+          <a:p>
+            <a:endParaRPr lang="en-US" dirty="0"/>
+          </a:p>
+          <a:p>
+            <a:r>
+              <a:rPr lang="en-US" dirty="0"/>
+              <a:t>Pool has table</a:t>
+            </a:r>
+          </a:p>
+          <a:p>
+            <a:r>
+              <a:rPr lang="en-US" dirty="0"/>
+              <a:t>Each </a:t>
+            </a:r>
+            <a:r>
+              <a:rPr lang="en-US" dirty="0" err="1"/>
+              <a:t>poolEntry</a:t>
+            </a:r>
+            <a:r>
+              <a:rPr lang="en-US" dirty="0"/>
+              <a:t> has a table.</a:t>
+            </a:r>
+          </a:p>
+          <a:p>
+            <a:endParaRPr lang="en-US" dirty="0"/>
+          </a:p>
+          <a:p>
+            <a:endParaRPr lang="en-US" dirty="0"/>
           </a:p>
         </p:txBody>
       </p:sp>
     </p:spTree>
     <p:extLst>
       <p:ext uri="{BB962C8B-B14F-4D97-AF65-F5344CB8AC3E}">
-        <p14:creationId xmlns:p14="http://schemas.microsoft.com/office/powerpoint/2010/main" val="515734174"/>
+        <p14:creationId xmlns:p14="http://schemas.microsoft.com/office/powerpoint/2010/main" val="4016732218"/>
       </p:ext>
     </p:extLst>
   </p:cSld>

</xml_diff>

<commit_message>
Haven't updated in a while
</commit_message>
<xml_diff>
--- a/JHP_Design.pptx
+++ b/JHP_Design.pptx
@@ -6,8 +6,9 @@
   </p:sldMasterIdLst>
   <p:sldIdLst>
     <p:sldId id="257" r:id="rId2"/>
-    <p:sldId id="259" r:id="rId3"/>
-    <p:sldId id="258" r:id="rId4"/>
+    <p:sldId id="260" r:id="rId3"/>
+    <p:sldId id="259" r:id="rId4"/>
+    <p:sldId id="258" r:id="rId5"/>
   </p:sldIdLst>
   <p:sldSz cx="12192000" cy="6858000"/>
   <p:notesSz cx="6858000" cy="9144000"/>
@@ -261,7 +262,7 @@
           <a:p>
             <a:fld id="{65F3756F-6BA0-BE41-9226-AD7D2B2262FF}" type="datetimeFigureOut">
               <a:rPr lang="en-US" smtClean="0"/>
-              <a:t>7/23/20</a:t>
+              <a:t>7/24/20</a:t>
             </a:fld>
             <a:endParaRPr lang="en-US"/>
           </a:p>
@@ -459,7 +460,7 @@
           <a:p>
             <a:fld id="{65F3756F-6BA0-BE41-9226-AD7D2B2262FF}" type="datetimeFigureOut">
               <a:rPr lang="en-US" smtClean="0"/>
-              <a:t>7/23/20</a:t>
+              <a:t>7/24/20</a:t>
             </a:fld>
             <a:endParaRPr lang="en-US"/>
           </a:p>
@@ -667,7 +668,7 @@
           <a:p>
             <a:fld id="{65F3756F-6BA0-BE41-9226-AD7D2B2262FF}" type="datetimeFigureOut">
               <a:rPr lang="en-US" smtClean="0"/>
-              <a:t>7/23/20</a:t>
+              <a:t>7/24/20</a:t>
             </a:fld>
             <a:endParaRPr lang="en-US"/>
           </a:p>
@@ -865,7 +866,7 @@
           <a:p>
             <a:fld id="{65F3756F-6BA0-BE41-9226-AD7D2B2262FF}" type="datetimeFigureOut">
               <a:rPr lang="en-US" smtClean="0"/>
-              <a:t>7/23/20</a:t>
+              <a:t>7/24/20</a:t>
             </a:fld>
             <a:endParaRPr lang="en-US"/>
           </a:p>
@@ -1140,7 +1141,7 @@
           <a:p>
             <a:fld id="{65F3756F-6BA0-BE41-9226-AD7D2B2262FF}" type="datetimeFigureOut">
               <a:rPr lang="en-US" smtClean="0"/>
-              <a:t>7/23/20</a:t>
+              <a:t>7/24/20</a:t>
             </a:fld>
             <a:endParaRPr lang="en-US"/>
           </a:p>
@@ -1405,7 +1406,7 @@
           <a:p>
             <a:fld id="{65F3756F-6BA0-BE41-9226-AD7D2B2262FF}" type="datetimeFigureOut">
               <a:rPr lang="en-US" smtClean="0"/>
-              <a:t>7/23/20</a:t>
+              <a:t>7/24/20</a:t>
             </a:fld>
             <a:endParaRPr lang="en-US"/>
           </a:p>
@@ -1817,7 +1818,7 @@
           <a:p>
             <a:fld id="{65F3756F-6BA0-BE41-9226-AD7D2B2262FF}" type="datetimeFigureOut">
               <a:rPr lang="en-US" smtClean="0"/>
-              <a:t>7/23/20</a:t>
+              <a:t>7/24/20</a:t>
             </a:fld>
             <a:endParaRPr lang="en-US"/>
           </a:p>
@@ -1958,7 +1959,7 @@
           <a:p>
             <a:fld id="{65F3756F-6BA0-BE41-9226-AD7D2B2262FF}" type="datetimeFigureOut">
               <a:rPr lang="en-US" smtClean="0"/>
-              <a:t>7/23/20</a:t>
+              <a:t>7/24/20</a:t>
             </a:fld>
             <a:endParaRPr lang="en-US"/>
           </a:p>
@@ -2071,7 +2072,7 @@
           <a:p>
             <a:fld id="{65F3756F-6BA0-BE41-9226-AD7D2B2262FF}" type="datetimeFigureOut">
               <a:rPr lang="en-US" smtClean="0"/>
-              <a:t>7/23/20</a:t>
+              <a:t>7/24/20</a:t>
             </a:fld>
             <a:endParaRPr lang="en-US"/>
           </a:p>
@@ -2382,7 +2383,7 @@
           <a:p>
             <a:fld id="{65F3756F-6BA0-BE41-9226-AD7D2B2262FF}" type="datetimeFigureOut">
               <a:rPr lang="en-US" smtClean="0"/>
-              <a:t>7/23/20</a:t>
+              <a:t>7/24/20</a:t>
             </a:fld>
             <a:endParaRPr lang="en-US"/>
           </a:p>
@@ -2670,7 +2671,7 @@
           <a:p>
             <a:fld id="{65F3756F-6BA0-BE41-9226-AD7D2B2262FF}" type="datetimeFigureOut">
               <a:rPr lang="en-US" smtClean="0"/>
-              <a:t>7/23/20</a:t>
+              <a:t>7/24/20</a:t>
             </a:fld>
             <a:endParaRPr lang="en-US"/>
           </a:p>
@@ -2911,7 +2912,7 @@
           <a:p>
             <a:fld id="{65F3756F-6BA0-BE41-9226-AD7D2B2262FF}" type="datetimeFigureOut">
               <a:rPr lang="en-US" smtClean="0"/>
-              <a:t>7/23/20</a:t>
+              <a:t>7/24/20</a:t>
             </a:fld>
             <a:endParaRPr lang="en-US"/>
           </a:p>
@@ -7060,6 +7061,3221 @@
       </p:grpSpPr>
       <p:sp>
         <p:nvSpPr>
+          <p:cNvPr id="82" name="Oval 81">
+            <a:extLst>
+              <a:ext uri="{FF2B5EF4-FFF2-40B4-BE49-F238E27FC236}">
+                <a16:creationId xmlns:a16="http://schemas.microsoft.com/office/drawing/2014/main" id="{559677F5-E2CA-2741-B80D-BCC657ADBC31}"/>
+              </a:ext>
+            </a:extLst>
+          </p:cNvPr>
+          <p:cNvSpPr/>
+          <p:nvPr/>
+        </p:nvSpPr>
+        <p:spPr>
+          <a:xfrm>
+            <a:off x="1968353" y="-58941"/>
+            <a:ext cx="4785873" cy="1079687"/>
+          </a:xfrm>
+          <a:prstGeom prst="ellipse">
+            <a:avLst/>
+          </a:prstGeom>
+          <a:solidFill>
+            <a:schemeClr val="bg1">
+              <a:lumMod val="85000"/>
+            </a:schemeClr>
+          </a:solidFill>
+        </p:spPr>
+        <p:style>
+          <a:lnRef idx="2">
+            <a:schemeClr val="accent1">
+              <a:shade val="50000"/>
+            </a:schemeClr>
+          </a:lnRef>
+          <a:fillRef idx="1">
+            <a:schemeClr val="accent1"/>
+          </a:fillRef>
+          <a:effectRef idx="0">
+            <a:schemeClr val="accent1"/>
+          </a:effectRef>
+          <a:fontRef idx="minor">
+            <a:schemeClr val="lt1"/>
+          </a:fontRef>
+        </p:style>
+        <p:txBody>
+          <a:bodyPr rtlCol="0" anchor="ctr"/>
+          <a:lstStyle/>
+          <a:p>
+            <a:pPr algn="ctr"/>
+            <a:endParaRPr lang="en-US" dirty="0"/>
+          </a:p>
+        </p:txBody>
+      </p:sp>
+      <p:sp>
+        <p:nvSpPr>
+          <p:cNvPr id="83" name="TextBox 82">
+            <a:extLst>
+              <a:ext uri="{FF2B5EF4-FFF2-40B4-BE49-F238E27FC236}">
+                <a16:creationId xmlns:a16="http://schemas.microsoft.com/office/drawing/2014/main" id="{B84AA3E1-9C69-0745-BFB2-4C232B2E2713}"/>
+              </a:ext>
+            </a:extLst>
+          </p:cNvPr>
+          <p:cNvSpPr txBox="1"/>
+          <p:nvPr/>
+        </p:nvSpPr>
+        <p:spPr>
+          <a:xfrm>
+            <a:off x="3844330" y="-85506"/>
+            <a:ext cx="1351924" cy="246221"/>
+          </a:xfrm>
+          <a:prstGeom prst="rect">
+            <a:avLst/>
+          </a:prstGeom>
+          <a:noFill/>
+        </p:spPr>
+        <p:txBody>
+          <a:bodyPr wrap="square" rtlCol="0">
+            <a:spAutoFit/>
+          </a:bodyPr>
+          <a:lstStyle/>
+          <a:p>
+            <a:r>
+              <a:rPr lang="en-US" sz="1000" dirty="0" err="1"/>
+              <a:t>Admin.html</a:t>
+            </a:r>
+            <a:endParaRPr lang="en-US" sz="1000" dirty="0"/>
+          </a:p>
+        </p:txBody>
+      </p:sp>
+      <p:sp>
+        <p:nvSpPr>
+          <p:cNvPr id="78" name="Oval 77">
+            <a:extLst>
+              <a:ext uri="{FF2B5EF4-FFF2-40B4-BE49-F238E27FC236}">
+                <a16:creationId xmlns:a16="http://schemas.microsoft.com/office/drawing/2014/main" id="{D0FCAD9C-4A09-0347-B146-6B5F58C105ED}"/>
+              </a:ext>
+            </a:extLst>
+          </p:cNvPr>
+          <p:cNvSpPr/>
+          <p:nvPr/>
+        </p:nvSpPr>
+        <p:spPr>
+          <a:xfrm>
+            <a:off x="102264" y="1619821"/>
+            <a:ext cx="2516650" cy="2093204"/>
+          </a:xfrm>
+          <a:prstGeom prst="ellipse">
+            <a:avLst/>
+          </a:prstGeom>
+          <a:solidFill>
+            <a:schemeClr val="bg1">
+              <a:lumMod val="85000"/>
+            </a:schemeClr>
+          </a:solidFill>
+        </p:spPr>
+        <p:style>
+          <a:lnRef idx="2">
+            <a:schemeClr val="accent1">
+              <a:shade val="50000"/>
+            </a:schemeClr>
+          </a:lnRef>
+          <a:fillRef idx="1">
+            <a:schemeClr val="accent1"/>
+          </a:fillRef>
+          <a:effectRef idx="0">
+            <a:schemeClr val="accent1"/>
+          </a:effectRef>
+          <a:fontRef idx="minor">
+            <a:schemeClr val="lt1"/>
+          </a:fontRef>
+        </p:style>
+        <p:txBody>
+          <a:bodyPr rtlCol="0" anchor="ctr"/>
+          <a:lstStyle/>
+          <a:p>
+            <a:pPr algn="ctr"/>
+            <a:endParaRPr lang="en-US" dirty="0"/>
+          </a:p>
+        </p:txBody>
+      </p:sp>
+      <p:sp>
+        <p:nvSpPr>
+          <p:cNvPr id="79" name="TextBox 78">
+            <a:extLst>
+              <a:ext uri="{FF2B5EF4-FFF2-40B4-BE49-F238E27FC236}">
+                <a16:creationId xmlns:a16="http://schemas.microsoft.com/office/drawing/2014/main" id="{437A9EDE-F974-6B48-98A8-D723F6274817}"/>
+              </a:ext>
+            </a:extLst>
+          </p:cNvPr>
+          <p:cNvSpPr txBox="1"/>
+          <p:nvPr/>
+        </p:nvSpPr>
+        <p:spPr>
+          <a:xfrm>
+            <a:off x="782405" y="1742972"/>
+            <a:ext cx="1396536" cy="246221"/>
+          </a:xfrm>
+          <a:prstGeom prst="rect">
+            <a:avLst/>
+          </a:prstGeom>
+          <a:noFill/>
+        </p:spPr>
+        <p:txBody>
+          <a:bodyPr wrap="none" rtlCol="0">
+            <a:spAutoFit/>
+          </a:bodyPr>
+          <a:lstStyle/>
+          <a:p>
+            <a:r>
+              <a:rPr lang="en-US" sz="1000" dirty="0" err="1"/>
+              <a:t>PoolTeamRegistry.html</a:t>
+            </a:r>
+            <a:endParaRPr lang="en-US" sz="1000" dirty="0"/>
+          </a:p>
+        </p:txBody>
+      </p:sp>
+      <p:sp>
+        <p:nvSpPr>
+          <p:cNvPr id="26" name="Oval 25">
+            <a:extLst>
+              <a:ext uri="{FF2B5EF4-FFF2-40B4-BE49-F238E27FC236}">
+                <a16:creationId xmlns:a16="http://schemas.microsoft.com/office/drawing/2014/main" id="{5E38BE2B-8ACA-9B4C-B8CB-F86438AE840D}"/>
+              </a:ext>
+            </a:extLst>
+          </p:cNvPr>
+          <p:cNvSpPr/>
+          <p:nvPr/>
+        </p:nvSpPr>
+        <p:spPr>
+          <a:xfrm>
+            <a:off x="7944873" y="62418"/>
+            <a:ext cx="2516650" cy="2093204"/>
+          </a:xfrm>
+          <a:prstGeom prst="ellipse">
+            <a:avLst/>
+          </a:prstGeom>
+          <a:solidFill>
+            <a:schemeClr val="bg1">
+              <a:lumMod val="85000"/>
+            </a:schemeClr>
+          </a:solidFill>
+        </p:spPr>
+        <p:style>
+          <a:lnRef idx="2">
+            <a:schemeClr val="accent1">
+              <a:shade val="50000"/>
+            </a:schemeClr>
+          </a:lnRef>
+          <a:fillRef idx="1">
+            <a:schemeClr val="accent1"/>
+          </a:fillRef>
+          <a:effectRef idx="0">
+            <a:schemeClr val="accent1"/>
+          </a:effectRef>
+          <a:fontRef idx="minor">
+            <a:schemeClr val="lt1"/>
+          </a:fontRef>
+        </p:style>
+        <p:txBody>
+          <a:bodyPr rtlCol="0" anchor="ctr"/>
+          <a:lstStyle/>
+          <a:p>
+            <a:pPr algn="ctr"/>
+            <a:endParaRPr lang="en-US" dirty="0"/>
+          </a:p>
+        </p:txBody>
+      </p:sp>
+      <p:grpSp>
+        <p:nvGrpSpPr>
+          <p:cNvPr id="7" name="Group 6">
+            <a:extLst>
+              <a:ext uri="{FF2B5EF4-FFF2-40B4-BE49-F238E27FC236}">
+                <a16:creationId xmlns:a16="http://schemas.microsoft.com/office/drawing/2014/main" id="{A75BD7D7-6113-EB41-A1E2-2EFE78B659F6}"/>
+              </a:ext>
+            </a:extLst>
+          </p:cNvPr>
+          <p:cNvGrpSpPr/>
+          <p:nvPr/>
+        </p:nvGrpSpPr>
+        <p:grpSpPr>
+          <a:xfrm>
+            <a:off x="6643988" y="1731526"/>
+            <a:ext cx="1108954" cy="1410510"/>
+            <a:chOff x="7091463" y="3258766"/>
+            <a:chExt cx="1108954" cy="1410510"/>
+          </a:xfrm>
+        </p:grpSpPr>
+        <p:sp>
+          <p:nvSpPr>
+            <p:cNvPr id="2" name="Oval 1">
+              <a:extLst>
+                <a:ext uri="{FF2B5EF4-FFF2-40B4-BE49-F238E27FC236}">
+                  <a16:creationId xmlns:a16="http://schemas.microsoft.com/office/drawing/2014/main" id="{A1104814-AB93-0A43-AEC5-24BF9AE4D2FB}"/>
+                </a:ext>
+              </a:extLst>
+            </p:cNvPr>
+            <p:cNvSpPr/>
+            <p:nvPr/>
+          </p:nvSpPr>
+          <p:spPr>
+            <a:xfrm>
+              <a:off x="7091464" y="3258766"/>
+              <a:ext cx="1108953" cy="321013"/>
+            </a:xfrm>
+            <a:prstGeom prst="ellipse">
+              <a:avLst/>
+            </a:prstGeom>
+            <a:solidFill>
+              <a:schemeClr val="accent3">
+                <a:lumMod val="60000"/>
+                <a:lumOff val="40000"/>
+              </a:schemeClr>
+            </a:solidFill>
+          </p:spPr>
+          <p:style>
+            <a:lnRef idx="2">
+              <a:schemeClr val="accent1">
+                <a:shade val="50000"/>
+              </a:schemeClr>
+            </a:lnRef>
+            <a:fillRef idx="1">
+              <a:schemeClr val="accent1"/>
+            </a:fillRef>
+            <a:effectRef idx="0">
+              <a:schemeClr val="accent1"/>
+            </a:effectRef>
+            <a:fontRef idx="minor">
+              <a:schemeClr val="lt1"/>
+            </a:fontRef>
+          </p:style>
+          <p:txBody>
+            <a:bodyPr rtlCol="0" anchor="ctr"/>
+            <a:lstStyle/>
+            <a:p>
+              <a:pPr algn="ctr"/>
+              <a:r>
+                <a:rPr lang="en-US" sz="1100" dirty="0" err="1">
+                  <a:solidFill>
+                    <a:schemeClr val="tx1"/>
+                  </a:solidFill>
+                </a:rPr>
+                <a:t>playersDB</a:t>
+              </a:r>
+              <a:endParaRPr lang="en-US" sz="1100" dirty="0">
+                <a:solidFill>
+                  <a:schemeClr val="tx1"/>
+                </a:solidFill>
+              </a:endParaRPr>
+            </a:p>
+          </p:txBody>
+        </p:sp>
+        <p:cxnSp>
+          <p:nvCxnSpPr>
+            <p:cNvPr id="4" name="Straight Connector 3">
+              <a:extLst>
+                <a:ext uri="{FF2B5EF4-FFF2-40B4-BE49-F238E27FC236}">
+                  <a16:creationId xmlns:a16="http://schemas.microsoft.com/office/drawing/2014/main" id="{0C8283AE-8BDE-1540-96FE-90EADC76CCC8}"/>
+                </a:ext>
+              </a:extLst>
+            </p:cNvPr>
+            <p:cNvCxnSpPr>
+              <a:stCxn id="2" idx="2"/>
+            </p:cNvCxnSpPr>
+            <p:nvPr/>
+          </p:nvCxnSpPr>
+          <p:spPr>
+            <a:xfrm>
+              <a:off x="7091464" y="3419273"/>
+              <a:ext cx="0" cy="1055450"/>
+            </a:xfrm>
+            <a:prstGeom prst="line">
+              <a:avLst/>
+            </a:prstGeom>
+            <a:ln w="12700"/>
+          </p:spPr>
+          <p:style>
+            <a:lnRef idx="1">
+              <a:schemeClr val="accent1"/>
+            </a:lnRef>
+            <a:fillRef idx="0">
+              <a:schemeClr val="accent1"/>
+            </a:fillRef>
+            <a:effectRef idx="0">
+              <a:schemeClr val="accent1"/>
+            </a:effectRef>
+            <a:fontRef idx="minor">
+              <a:schemeClr val="tx1"/>
+            </a:fontRef>
+          </p:style>
+        </p:cxnSp>
+        <p:cxnSp>
+          <p:nvCxnSpPr>
+            <p:cNvPr id="5" name="Straight Connector 4">
+              <a:extLst>
+                <a:ext uri="{FF2B5EF4-FFF2-40B4-BE49-F238E27FC236}">
+                  <a16:creationId xmlns:a16="http://schemas.microsoft.com/office/drawing/2014/main" id="{B0447826-1B50-7749-A989-8FA6838DD30B}"/>
+                </a:ext>
+              </a:extLst>
+            </p:cNvPr>
+            <p:cNvCxnSpPr/>
+            <p:nvPr/>
+          </p:nvCxnSpPr>
+          <p:spPr>
+            <a:xfrm>
+              <a:off x="8200417" y="3429000"/>
+              <a:ext cx="0" cy="1055450"/>
+            </a:xfrm>
+            <a:prstGeom prst="line">
+              <a:avLst/>
+            </a:prstGeom>
+            <a:ln w="12700"/>
+          </p:spPr>
+          <p:style>
+            <a:lnRef idx="1">
+              <a:schemeClr val="accent1"/>
+            </a:lnRef>
+            <a:fillRef idx="0">
+              <a:schemeClr val="accent1"/>
+            </a:fillRef>
+            <a:effectRef idx="0">
+              <a:schemeClr val="accent1"/>
+            </a:effectRef>
+            <a:fontRef idx="minor">
+              <a:schemeClr val="tx1"/>
+            </a:fontRef>
+          </p:style>
+        </p:cxnSp>
+        <p:sp>
+          <p:nvSpPr>
+            <p:cNvPr id="6" name="Oval 5">
+              <a:extLst>
+                <a:ext uri="{FF2B5EF4-FFF2-40B4-BE49-F238E27FC236}">
+                  <a16:creationId xmlns:a16="http://schemas.microsoft.com/office/drawing/2014/main" id="{CC90BA5D-1422-F24C-9BDA-D56CC5C9C1E4}"/>
+                </a:ext>
+              </a:extLst>
+            </p:cNvPr>
+            <p:cNvSpPr/>
+            <p:nvPr/>
+          </p:nvSpPr>
+          <p:spPr>
+            <a:xfrm>
+              <a:off x="7091463" y="4348263"/>
+              <a:ext cx="1108953" cy="321013"/>
+            </a:xfrm>
+            <a:prstGeom prst="ellipse">
+              <a:avLst/>
+            </a:prstGeom>
+            <a:solidFill>
+              <a:schemeClr val="accent3">
+                <a:lumMod val="50000"/>
+              </a:schemeClr>
+            </a:solidFill>
+          </p:spPr>
+          <p:style>
+            <a:lnRef idx="2">
+              <a:schemeClr val="accent1">
+                <a:shade val="50000"/>
+              </a:schemeClr>
+            </a:lnRef>
+            <a:fillRef idx="1">
+              <a:schemeClr val="accent1"/>
+            </a:fillRef>
+            <a:effectRef idx="0">
+              <a:schemeClr val="accent1"/>
+            </a:effectRef>
+            <a:fontRef idx="minor">
+              <a:schemeClr val="lt1"/>
+            </a:fontRef>
+          </p:style>
+          <p:txBody>
+            <a:bodyPr rtlCol="0" anchor="ctr"/>
+            <a:lstStyle/>
+            <a:p>
+              <a:pPr algn="ctr"/>
+              <a:endParaRPr lang="en-US"/>
+            </a:p>
+          </p:txBody>
+        </p:sp>
+      </p:grpSp>
+      <p:sp>
+        <p:nvSpPr>
+          <p:cNvPr id="9" name="Cloud 8">
+            <a:extLst>
+              <a:ext uri="{FF2B5EF4-FFF2-40B4-BE49-F238E27FC236}">
+                <a16:creationId xmlns:a16="http://schemas.microsoft.com/office/drawing/2014/main" id="{4AA6A60E-2681-2244-A903-BC0175200DDB}"/>
+              </a:ext>
+            </a:extLst>
+          </p:cNvPr>
+          <p:cNvSpPr/>
+          <p:nvPr/>
+        </p:nvSpPr>
+        <p:spPr>
+          <a:xfrm>
+            <a:off x="9834667" y="2130357"/>
+            <a:ext cx="2159538" cy="1298643"/>
+          </a:xfrm>
+          <a:prstGeom prst="cloud">
+            <a:avLst/>
+          </a:prstGeom>
+        </p:spPr>
+        <p:style>
+          <a:lnRef idx="2">
+            <a:schemeClr val="accent1">
+              <a:shade val="50000"/>
+            </a:schemeClr>
+          </a:lnRef>
+          <a:fillRef idx="1">
+            <a:schemeClr val="accent1"/>
+          </a:fillRef>
+          <a:effectRef idx="0">
+            <a:schemeClr val="accent1"/>
+          </a:effectRef>
+          <a:fontRef idx="minor">
+            <a:schemeClr val="lt1"/>
+          </a:fontRef>
+        </p:style>
+        <p:txBody>
+          <a:bodyPr rtlCol="0" anchor="ctr"/>
+          <a:lstStyle/>
+          <a:p>
+            <a:pPr algn="ctr"/>
+            <a:r>
+              <a:rPr lang="en-US" dirty="0"/>
+              <a:t>NHL API</a:t>
+            </a:r>
+          </a:p>
+        </p:txBody>
+      </p:sp>
+      <p:sp>
+        <p:nvSpPr>
+          <p:cNvPr id="10" name="TextBox 9">
+            <a:extLst>
+              <a:ext uri="{FF2B5EF4-FFF2-40B4-BE49-F238E27FC236}">
+                <a16:creationId xmlns:a16="http://schemas.microsoft.com/office/drawing/2014/main" id="{30AEBB77-3E9A-FA4E-8657-9206C752232F}"/>
+              </a:ext>
+            </a:extLst>
+          </p:cNvPr>
+          <p:cNvSpPr txBox="1"/>
+          <p:nvPr/>
+        </p:nvSpPr>
+        <p:spPr>
+          <a:xfrm>
+            <a:off x="6636802" y="2171862"/>
+            <a:ext cx="1073499" cy="461665"/>
+          </a:xfrm>
+          <a:prstGeom prst="rect">
+            <a:avLst/>
+          </a:prstGeom>
+          <a:noFill/>
+        </p:spPr>
+        <p:txBody>
+          <a:bodyPr wrap="none" rtlCol="0">
+            <a:spAutoFit/>
+          </a:bodyPr>
+          <a:lstStyle/>
+          <a:p>
+            <a:pPr algn="ctr"/>
+            <a:r>
+              <a:rPr lang="en-US" sz="1200" dirty="0"/>
+              <a:t>active_players</a:t>
+            </a:r>
+          </a:p>
+          <a:p>
+            <a:pPr algn="ctr"/>
+            <a:r>
+              <a:rPr lang="en-US" sz="1200" dirty="0"/>
+              <a:t>table</a:t>
+            </a:r>
+          </a:p>
+        </p:txBody>
+      </p:sp>
+      <p:sp>
+        <p:nvSpPr>
+          <p:cNvPr id="11" name="Arc 10">
+            <a:extLst>
+              <a:ext uri="{FF2B5EF4-FFF2-40B4-BE49-F238E27FC236}">
+                <a16:creationId xmlns:a16="http://schemas.microsoft.com/office/drawing/2014/main" id="{05EA9D22-554B-F247-B1A9-58F4EA1CA9E5}"/>
+              </a:ext>
+            </a:extLst>
+          </p:cNvPr>
+          <p:cNvSpPr/>
+          <p:nvPr/>
+        </p:nvSpPr>
+        <p:spPr>
+          <a:xfrm>
+            <a:off x="9599900" y="1365077"/>
+            <a:ext cx="1235410" cy="1534538"/>
+          </a:xfrm>
+          <a:prstGeom prst="arc">
+            <a:avLst>
+              <a:gd name="adj1" fmla="val 16011110"/>
+              <a:gd name="adj2" fmla="val 0"/>
+            </a:avLst>
+          </a:prstGeom>
+          <a:ln w="19050">
+            <a:headEnd type="triangle" w="med" len="med"/>
+            <a:tailEnd type="none" w="med" len="med"/>
+          </a:ln>
+        </p:spPr>
+        <p:style>
+          <a:lnRef idx="1">
+            <a:schemeClr val="accent1"/>
+          </a:lnRef>
+          <a:fillRef idx="0">
+            <a:schemeClr val="accent1"/>
+          </a:fillRef>
+          <a:effectRef idx="0">
+            <a:schemeClr val="accent1"/>
+          </a:effectRef>
+          <a:fontRef idx="minor">
+            <a:schemeClr val="tx1"/>
+          </a:fontRef>
+        </p:style>
+        <p:txBody>
+          <a:bodyPr rtlCol="0" anchor="ctr"/>
+          <a:lstStyle/>
+          <a:p>
+            <a:pPr algn="ctr"/>
+            <a:endParaRPr lang="en-US"/>
+          </a:p>
+        </p:txBody>
+      </p:sp>
+      <p:sp>
+        <p:nvSpPr>
+          <p:cNvPr id="12" name="Arc 11">
+            <a:extLst>
+              <a:ext uri="{FF2B5EF4-FFF2-40B4-BE49-F238E27FC236}">
+                <a16:creationId xmlns:a16="http://schemas.microsoft.com/office/drawing/2014/main" id="{A80B8323-FD5E-EA44-A1CF-26C035E20A41}"/>
+              </a:ext>
+            </a:extLst>
+          </p:cNvPr>
+          <p:cNvSpPr/>
+          <p:nvPr/>
+        </p:nvSpPr>
+        <p:spPr>
+          <a:xfrm rot="17102652">
+            <a:off x="7391877" y="1525446"/>
+            <a:ext cx="1471207" cy="778035"/>
+          </a:xfrm>
+          <a:prstGeom prst="arc">
+            <a:avLst>
+              <a:gd name="adj1" fmla="val 16200000"/>
+              <a:gd name="adj2" fmla="val 20021132"/>
+            </a:avLst>
+          </a:prstGeom>
+          <a:ln w="12700">
+            <a:headEnd type="triangle" w="med" len="med"/>
+            <a:tailEnd type="none" w="med" len="med"/>
+          </a:ln>
+        </p:spPr>
+        <p:style>
+          <a:lnRef idx="1">
+            <a:schemeClr val="accent1"/>
+          </a:lnRef>
+          <a:fillRef idx="0">
+            <a:schemeClr val="accent1"/>
+          </a:fillRef>
+          <a:effectRef idx="0">
+            <a:schemeClr val="accent1"/>
+          </a:effectRef>
+          <a:fontRef idx="minor">
+            <a:schemeClr val="tx1"/>
+          </a:fontRef>
+        </p:style>
+        <p:txBody>
+          <a:bodyPr rtlCol="0" anchor="ctr"/>
+          <a:lstStyle/>
+          <a:p>
+            <a:pPr algn="ctr"/>
+            <a:endParaRPr lang="en-US"/>
+          </a:p>
+        </p:txBody>
+      </p:sp>
+      <p:grpSp>
+        <p:nvGrpSpPr>
+          <p:cNvPr id="13" name="Group 12">
+            <a:extLst>
+              <a:ext uri="{FF2B5EF4-FFF2-40B4-BE49-F238E27FC236}">
+                <a16:creationId xmlns:a16="http://schemas.microsoft.com/office/drawing/2014/main" id="{306AAD7F-893E-FF4F-A094-69B385B30342}"/>
+              </a:ext>
+            </a:extLst>
+          </p:cNvPr>
+          <p:cNvGrpSpPr/>
+          <p:nvPr/>
+        </p:nvGrpSpPr>
+        <p:grpSpPr>
+          <a:xfrm>
+            <a:off x="3446122" y="1731526"/>
+            <a:ext cx="1108954" cy="1410510"/>
+            <a:chOff x="7091463" y="3258766"/>
+            <a:chExt cx="1108954" cy="1410510"/>
+          </a:xfrm>
+        </p:grpSpPr>
+        <p:sp>
+          <p:nvSpPr>
+            <p:cNvPr id="14" name="Oval 13">
+              <a:extLst>
+                <a:ext uri="{FF2B5EF4-FFF2-40B4-BE49-F238E27FC236}">
+                  <a16:creationId xmlns:a16="http://schemas.microsoft.com/office/drawing/2014/main" id="{F2CFC519-0219-4648-8A7D-9E7691F8AD61}"/>
+                </a:ext>
+              </a:extLst>
+            </p:cNvPr>
+            <p:cNvSpPr/>
+            <p:nvPr/>
+          </p:nvSpPr>
+          <p:spPr>
+            <a:xfrm>
+              <a:off x="7091464" y="3258766"/>
+              <a:ext cx="1108953" cy="321013"/>
+            </a:xfrm>
+            <a:prstGeom prst="ellipse">
+              <a:avLst/>
+            </a:prstGeom>
+            <a:solidFill>
+              <a:schemeClr val="accent1">
+                <a:lumMod val="60000"/>
+                <a:lumOff val="40000"/>
+              </a:schemeClr>
+            </a:solidFill>
+          </p:spPr>
+          <p:style>
+            <a:lnRef idx="2">
+              <a:schemeClr val="accent1">
+                <a:shade val="50000"/>
+              </a:schemeClr>
+            </a:lnRef>
+            <a:fillRef idx="1">
+              <a:schemeClr val="accent1"/>
+            </a:fillRef>
+            <a:effectRef idx="0">
+              <a:schemeClr val="accent1"/>
+            </a:effectRef>
+            <a:fontRef idx="minor">
+              <a:schemeClr val="lt1"/>
+            </a:fontRef>
+          </p:style>
+          <p:txBody>
+            <a:bodyPr rtlCol="0" anchor="ctr"/>
+            <a:lstStyle/>
+            <a:p>
+              <a:pPr algn="ctr"/>
+              <a:r>
+                <a:rPr lang="en-US" sz="1400" dirty="0" err="1">
+                  <a:solidFill>
+                    <a:schemeClr val="tx1"/>
+                  </a:solidFill>
+                </a:rPr>
+                <a:t>poolDB</a:t>
+              </a:r>
+              <a:endParaRPr lang="en-US" sz="1400" dirty="0">
+                <a:solidFill>
+                  <a:schemeClr val="tx1"/>
+                </a:solidFill>
+              </a:endParaRPr>
+            </a:p>
+          </p:txBody>
+        </p:sp>
+        <p:cxnSp>
+          <p:nvCxnSpPr>
+            <p:cNvPr id="15" name="Straight Connector 14">
+              <a:extLst>
+                <a:ext uri="{FF2B5EF4-FFF2-40B4-BE49-F238E27FC236}">
+                  <a16:creationId xmlns:a16="http://schemas.microsoft.com/office/drawing/2014/main" id="{21FC6301-D0E6-AD48-90BC-379487BC5D1F}"/>
+                </a:ext>
+              </a:extLst>
+            </p:cNvPr>
+            <p:cNvCxnSpPr>
+              <a:cxnSpLocks/>
+              <a:stCxn id="14" idx="2"/>
+            </p:cNvCxnSpPr>
+            <p:nvPr/>
+          </p:nvCxnSpPr>
+          <p:spPr>
+            <a:xfrm>
+              <a:off x="7091464" y="3419273"/>
+              <a:ext cx="0" cy="1055450"/>
+            </a:xfrm>
+            <a:prstGeom prst="line">
+              <a:avLst/>
+            </a:prstGeom>
+            <a:ln w="12700"/>
+          </p:spPr>
+          <p:style>
+            <a:lnRef idx="1">
+              <a:schemeClr val="accent1"/>
+            </a:lnRef>
+            <a:fillRef idx="0">
+              <a:schemeClr val="accent1"/>
+            </a:fillRef>
+            <a:effectRef idx="0">
+              <a:schemeClr val="accent1"/>
+            </a:effectRef>
+            <a:fontRef idx="minor">
+              <a:schemeClr val="tx1"/>
+            </a:fontRef>
+          </p:style>
+        </p:cxnSp>
+        <p:cxnSp>
+          <p:nvCxnSpPr>
+            <p:cNvPr id="16" name="Straight Connector 15">
+              <a:extLst>
+                <a:ext uri="{FF2B5EF4-FFF2-40B4-BE49-F238E27FC236}">
+                  <a16:creationId xmlns:a16="http://schemas.microsoft.com/office/drawing/2014/main" id="{7FD89E1C-8005-E543-9D37-2C7673D48752}"/>
+                </a:ext>
+              </a:extLst>
+            </p:cNvPr>
+            <p:cNvCxnSpPr/>
+            <p:nvPr/>
+          </p:nvCxnSpPr>
+          <p:spPr>
+            <a:xfrm>
+              <a:off x="8200417" y="3429000"/>
+              <a:ext cx="0" cy="1055450"/>
+            </a:xfrm>
+            <a:prstGeom prst="line">
+              <a:avLst/>
+            </a:prstGeom>
+            <a:ln w="12700"/>
+          </p:spPr>
+          <p:style>
+            <a:lnRef idx="1">
+              <a:schemeClr val="accent1"/>
+            </a:lnRef>
+            <a:fillRef idx="0">
+              <a:schemeClr val="accent1"/>
+            </a:fillRef>
+            <a:effectRef idx="0">
+              <a:schemeClr val="accent1"/>
+            </a:effectRef>
+            <a:fontRef idx="minor">
+              <a:schemeClr val="tx1"/>
+            </a:fontRef>
+          </p:style>
+        </p:cxnSp>
+        <p:sp>
+          <p:nvSpPr>
+            <p:cNvPr id="17" name="Oval 16">
+              <a:extLst>
+                <a:ext uri="{FF2B5EF4-FFF2-40B4-BE49-F238E27FC236}">
+                  <a16:creationId xmlns:a16="http://schemas.microsoft.com/office/drawing/2014/main" id="{3C4120C2-F450-8E45-970C-E939BE0DC15B}"/>
+                </a:ext>
+              </a:extLst>
+            </p:cNvPr>
+            <p:cNvSpPr/>
+            <p:nvPr/>
+          </p:nvSpPr>
+          <p:spPr>
+            <a:xfrm>
+              <a:off x="7091463" y="4348263"/>
+              <a:ext cx="1108953" cy="321013"/>
+            </a:xfrm>
+            <a:prstGeom prst="ellipse">
+              <a:avLst/>
+            </a:prstGeom>
+          </p:spPr>
+          <p:style>
+            <a:lnRef idx="2">
+              <a:schemeClr val="accent1">
+                <a:shade val="50000"/>
+              </a:schemeClr>
+            </a:lnRef>
+            <a:fillRef idx="1">
+              <a:schemeClr val="accent1"/>
+            </a:fillRef>
+            <a:effectRef idx="0">
+              <a:schemeClr val="accent1"/>
+            </a:effectRef>
+            <a:fontRef idx="minor">
+              <a:schemeClr val="lt1"/>
+            </a:fontRef>
+          </p:style>
+          <p:txBody>
+            <a:bodyPr rtlCol="0" anchor="ctr"/>
+            <a:lstStyle/>
+            <a:p>
+              <a:pPr algn="ctr"/>
+              <a:endParaRPr lang="en-US"/>
+            </a:p>
+          </p:txBody>
+        </p:sp>
+      </p:grpSp>
+      <p:sp>
+        <p:nvSpPr>
+          <p:cNvPr id="18" name="TextBox 17">
+            <a:extLst>
+              <a:ext uri="{FF2B5EF4-FFF2-40B4-BE49-F238E27FC236}">
+                <a16:creationId xmlns:a16="http://schemas.microsoft.com/office/drawing/2014/main" id="{1608FE50-3C34-3E46-9E1E-F3FD7D04CEDC}"/>
+              </a:ext>
+            </a:extLst>
+          </p:cNvPr>
+          <p:cNvSpPr txBox="1"/>
+          <p:nvPr/>
+        </p:nvSpPr>
+        <p:spPr>
+          <a:xfrm>
+            <a:off x="3535316" y="2251983"/>
+            <a:ext cx="884345" cy="461665"/>
+          </a:xfrm>
+          <a:prstGeom prst="rect">
+            <a:avLst/>
+          </a:prstGeom>
+          <a:noFill/>
+        </p:spPr>
+        <p:txBody>
+          <a:bodyPr wrap="none" rtlCol="0">
+            <a:spAutoFit/>
+          </a:bodyPr>
+          <a:lstStyle/>
+          <a:p>
+            <a:pPr algn="ctr"/>
+            <a:r>
+              <a:rPr lang="en-US" sz="1200" dirty="0"/>
+              <a:t>entry_stats</a:t>
+            </a:r>
+          </a:p>
+          <a:p>
+            <a:pPr algn="ctr"/>
+            <a:r>
+              <a:rPr lang="en-US" sz="1200" dirty="0"/>
+              <a:t>table</a:t>
+            </a:r>
+          </a:p>
+        </p:txBody>
+      </p:sp>
+      <p:sp>
+        <p:nvSpPr>
+          <p:cNvPr id="19" name="Oval 18">
+            <a:extLst>
+              <a:ext uri="{FF2B5EF4-FFF2-40B4-BE49-F238E27FC236}">
+                <a16:creationId xmlns:a16="http://schemas.microsoft.com/office/drawing/2014/main" id="{4DC0554B-7023-2A46-85FF-E41794DA72C6}"/>
+              </a:ext>
+            </a:extLst>
+          </p:cNvPr>
+          <p:cNvSpPr/>
+          <p:nvPr/>
+        </p:nvSpPr>
+        <p:spPr>
+          <a:xfrm>
+            <a:off x="7801685" y="1575927"/>
+            <a:ext cx="2408715" cy="541959"/>
+          </a:xfrm>
+          <a:prstGeom prst="ellipse">
+            <a:avLst/>
+          </a:prstGeom>
+          <a:solidFill>
+            <a:schemeClr val="accent4">
+              <a:lumMod val="75000"/>
+            </a:schemeClr>
+          </a:solidFill>
+          <a:ln>
+            <a:solidFill>
+              <a:schemeClr val="accent4">
+                <a:lumMod val="50000"/>
+              </a:schemeClr>
+            </a:solidFill>
+          </a:ln>
+        </p:spPr>
+        <p:style>
+          <a:lnRef idx="2">
+            <a:schemeClr val="accent1">
+              <a:shade val="50000"/>
+            </a:schemeClr>
+          </a:lnRef>
+          <a:fillRef idx="1">
+            <a:schemeClr val="accent1"/>
+          </a:fillRef>
+          <a:effectRef idx="0">
+            <a:schemeClr val="accent1"/>
+          </a:effectRef>
+          <a:fontRef idx="minor">
+            <a:schemeClr val="lt1"/>
+          </a:fontRef>
+        </p:style>
+        <p:txBody>
+          <a:bodyPr rtlCol="0" anchor="ctr"/>
+          <a:lstStyle/>
+          <a:p>
+            <a:pPr algn="ctr"/>
+            <a:endParaRPr lang="en-US" sz="1200" dirty="0"/>
+          </a:p>
+          <a:p>
+            <a:pPr algn="ctr"/>
+            <a:r>
+              <a:rPr lang="en-US" sz="1000" dirty="0">
+                <a:solidFill>
+                  <a:schemeClr val="bg1"/>
+                </a:solidFill>
+              </a:rPr>
+              <a:t>PoolUpdate.py</a:t>
+            </a:r>
+          </a:p>
+          <a:p>
+            <a:pPr marL="171450" indent="-171450" algn="ctr">
+              <a:buFontTx/>
+              <a:buChar char="-"/>
+            </a:pPr>
+            <a:r>
+              <a:rPr lang="en-US" sz="1000" dirty="0">
+                <a:solidFill>
+                  <a:schemeClr val="accent6">
+                    <a:lumMod val="50000"/>
+                  </a:schemeClr>
+                </a:solidFill>
+              </a:rPr>
+              <a:t>Update </a:t>
+            </a:r>
+            <a:r>
+              <a:rPr lang="en-US" sz="1000" dirty="0" err="1">
+                <a:solidFill>
+                  <a:schemeClr val="accent6">
+                    <a:lumMod val="50000"/>
+                  </a:schemeClr>
+                </a:solidFill>
+              </a:rPr>
+              <a:t>entry_stats</a:t>
+            </a:r>
+            <a:r>
+              <a:rPr lang="en-US" sz="1000" dirty="0">
+                <a:solidFill>
+                  <a:schemeClr val="accent6">
+                    <a:lumMod val="50000"/>
+                  </a:schemeClr>
+                </a:solidFill>
+              </a:rPr>
+              <a:t>_ table</a:t>
+            </a:r>
+          </a:p>
+          <a:p>
+            <a:pPr marL="171450" indent="-171450" algn="ctr">
+              <a:buFontTx/>
+              <a:buChar char="-"/>
+            </a:pPr>
+            <a:r>
+              <a:rPr lang="en-US" sz="1000" dirty="0">
+                <a:solidFill>
+                  <a:schemeClr val="accent6">
+                    <a:lumMod val="50000"/>
+                  </a:schemeClr>
+                </a:solidFill>
+              </a:rPr>
+              <a:t>Update pool table</a:t>
+            </a:r>
+          </a:p>
+          <a:p>
+            <a:pPr algn="ctr"/>
+            <a:endParaRPr lang="en-US" dirty="0"/>
+          </a:p>
+        </p:txBody>
+      </p:sp>
+      <p:sp>
+        <p:nvSpPr>
+          <p:cNvPr id="20" name="Arc 19">
+            <a:extLst>
+              <a:ext uri="{FF2B5EF4-FFF2-40B4-BE49-F238E27FC236}">
+                <a16:creationId xmlns:a16="http://schemas.microsoft.com/office/drawing/2014/main" id="{E73A7DBD-0959-C048-B9DD-458111CF5924}"/>
+              </a:ext>
+            </a:extLst>
+          </p:cNvPr>
+          <p:cNvSpPr/>
+          <p:nvPr/>
+        </p:nvSpPr>
+        <p:spPr>
+          <a:xfrm rot="16506388">
+            <a:off x="3988704" y="1271171"/>
+            <a:ext cx="924128" cy="846467"/>
+          </a:xfrm>
+          <a:prstGeom prst="arc">
+            <a:avLst/>
+          </a:prstGeom>
+          <a:ln w="12700">
+            <a:headEnd type="triangle" w="med" len="med"/>
+            <a:tailEnd type="none" w="med" len="med"/>
+          </a:ln>
+        </p:spPr>
+        <p:style>
+          <a:lnRef idx="1">
+            <a:schemeClr val="accent1"/>
+          </a:lnRef>
+          <a:fillRef idx="0">
+            <a:schemeClr val="accent1"/>
+          </a:fillRef>
+          <a:effectRef idx="0">
+            <a:schemeClr val="accent1"/>
+          </a:effectRef>
+          <a:fontRef idx="minor">
+            <a:schemeClr val="tx1"/>
+          </a:fontRef>
+        </p:style>
+        <p:txBody>
+          <a:bodyPr rtlCol="0" anchor="ctr"/>
+          <a:lstStyle/>
+          <a:p>
+            <a:pPr algn="ctr"/>
+            <a:endParaRPr lang="en-US"/>
+          </a:p>
+        </p:txBody>
+      </p:sp>
+      <p:sp>
+        <p:nvSpPr>
+          <p:cNvPr id="21" name="Arc 20">
+            <a:extLst>
+              <a:ext uri="{FF2B5EF4-FFF2-40B4-BE49-F238E27FC236}">
+                <a16:creationId xmlns:a16="http://schemas.microsoft.com/office/drawing/2014/main" id="{120188A5-BCCF-1C41-95AD-D968DF3F4A64}"/>
+              </a:ext>
+            </a:extLst>
+          </p:cNvPr>
+          <p:cNvSpPr/>
+          <p:nvPr/>
+        </p:nvSpPr>
+        <p:spPr>
+          <a:xfrm>
+            <a:off x="6197181" y="1247418"/>
+            <a:ext cx="1116139" cy="805122"/>
+          </a:xfrm>
+          <a:prstGeom prst="arc">
+            <a:avLst>
+              <a:gd name="adj1" fmla="val 16011110"/>
+              <a:gd name="adj2" fmla="val 0"/>
+            </a:avLst>
+          </a:prstGeom>
+          <a:ln w="19050">
+            <a:headEnd type="triangle" w="med" len="med"/>
+            <a:tailEnd type="none" w="med" len="med"/>
+          </a:ln>
+        </p:spPr>
+        <p:style>
+          <a:lnRef idx="1">
+            <a:schemeClr val="accent1"/>
+          </a:lnRef>
+          <a:fillRef idx="0">
+            <a:schemeClr val="accent1"/>
+          </a:fillRef>
+          <a:effectRef idx="0">
+            <a:schemeClr val="accent1"/>
+          </a:effectRef>
+          <a:fontRef idx="minor">
+            <a:schemeClr val="tx1"/>
+          </a:fontRef>
+        </p:style>
+        <p:txBody>
+          <a:bodyPr rtlCol="0" anchor="ctr"/>
+          <a:lstStyle/>
+          <a:p>
+            <a:pPr algn="ctr"/>
+            <a:endParaRPr lang="en-US"/>
+          </a:p>
+        </p:txBody>
+      </p:sp>
+      <p:sp>
+        <p:nvSpPr>
+          <p:cNvPr id="22" name="Oval 21">
+            <a:extLst>
+              <a:ext uri="{FF2B5EF4-FFF2-40B4-BE49-F238E27FC236}">
+                <a16:creationId xmlns:a16="http://schemas.microsoft.com/office/drawing/2014/main" id="{6929D1F3-F8C7-B748-B3DE-50809BB4897C}"/>
+              </a:ext>
+            </a:extLst>
+          </p:cNvPr>
+          <p:cNvSpPr/>
+          <p:nvPr/>
+        </p:nvSpPr>
+        <p:spPr>
+          <a:xfrm>
+            <a:off x="1220278" y="1030977"/>
+            <a:ext cx="2074537" cy="432881"/>
+          </a:xfrm>
+          <a:prstGeom prst="ellipse">
+            <a:avLst/>
+          </a:prstGeom>
+          <a:solidFill>
+            <a:schemeClr val="accent4">
+              <a:lumMod val="75000"/>
+            </a:schemeClr>
+          </a:solidFill>
+          <a:ln>
+            <a:solidFill>
+              <a:schemeClr val="accent4">
+                <a:lumMod val="50000"/>
+              </a:schemeClr>
+            </a:solidFill>
+          </a:ln>
+        </p:spPr>
+        <p:style>
+          <a:lnRef idx="2">
+            <a:schemeClr val="accent1">
+              <a:shade val="50000"/>
+            </a:schemeClr>
+          </a:lnRef>
+          <a:fillRef idx="1">
+            <a:schemeClr val="accent1"/>
+          </a:fillRef>
+          <a:effectRef idx="0">
+            <a:schemeClr val="accent1"/>
+          </a:effectRef>
+          <a:fontRef idx="minor">
+            <a:schemeClr val="lt1"/>
+          </a:fontRef>
+        </p:style>
+        <p:txBody>
+          <a:bodyPr rtlCol="0" anchor="ctr"/>
+          <a:lstStyle/>
+          <a:p>
+            <a:pPr algn="ctr"/>
+            <a:endParaRPr lang="en-US" sz="1200" dirty="0"/>
+          </a:p>
+          <a:p>
+            <a:pPr algn="ctr"/>
+            <a:r>
+              <a:rPr lang="en-US" sz="1400" dirty="0"/>
+              <a:t>RenderPool.py</a:t>
+            </a:r>
+          </a:p>
+          <a:p>
+            <a:pPr algn="ctr"/>
+            <a:endParaRPr lang="en-US" dirty="0"/>
+          </a:p>
+        </p:txBody>
+      </p:sp>
+      <p:sp>
+        <p:nvSpPr>
+          <p:cNvPr id="27" name="Arc 26">
+            <a:extLst>
+              <a:ext uri="{FF2B5EF4-FFF2-40B4-BE49-F238E27FC236}">
+                <a16:creationId xmlns:a16="http://schemas.microsoft.com/office/drawing/2014/main" id="{32A7393A-1012-4E48-AA32-291E207B9247}"/>
+              </a:ext>
+            </a:extLst>
+          </p:cNvPr>
+          <p:cNvSpPr/>
+          <p:nvPr/>
+        </p:nvSpPr>
+        <p:spPr>
+          <a:xfrm>
+            <a:off x="2769605" y="1257302"/>
+            <a:ext cx="1116139" cy="805122"/>
+          </a:xfrm>
+          <a:prstGeom prst="arc">
+            <a:avLst>
+              <a:gd name="adj1" fmla="val 16011110"/>
+              <a:gd name="adj2" fmla="val 0"/>
+            </a:avLst>
+          </a:prstGeom>
+          <a:ln w="19050">
+            <a:headEnd type="triangle" w="med" len="med"/>
+            <a:tailEnd type="none" w="med" len="med"/>
+          </a:ln>
+        </p:spPr>
+        <p:style>
+          <a:lnRef idx="1">
+            <a:schemeClr val="accent1"/>
+          </a:lnRef>
+          <a:fillRef idx="0">
+            <a:schemeClr val="accent1"/>
+          </a:fillRef>
+          <a:effectRef idx="0">
+            <a:schemeClr val="accent1"/>
+          </a:effectRef>
+          <a:fontRef idx="minor">
+            <a:schemeClr val="tx1"/>
+          </a:fontRef>
+        </p:style>
+        <p:txBody>
+          <a:bodyPr rtlCol="0" anchor="ctr"/>
+          <a:lstStyle/>
+          <a:p>
+            <a:pPr algn="ctr"/>
+            <a:endParaRPr lang="en-US"/>
+          </a:p>
+        </p:txBody>
+      </p:sp>
+      <p:sp>
+        <p:nvSpPr>
+          <p:cNvPr id="57" name="Oval 56">
+            <a:extLst>
+              <a:ext uri="{FF2B5EF4-FFF2-40B4-BE49-F238E27FC236}">
+                <a16:creationId xmlns:a16="http://schemas.microsoft.com/office/drawing/2014/main" id="{601AE9CA-21EF-A149-8798-F16BBFDC9B61}"/>
+              </a:ext>
+            </a:extLst>
+          </p:cNvPr>
+          <p:cNvSpPr/>
+          <p:nvPr/>
+        </p:nvSpPr>
+        <p:spPr>
+          <a:xfrm>
+            <a:off x="296914" y="2852065"/>
+            <a:ext cx="2188571" cy="432881"/>
+          </a:xfrm>
+          <a:prstGeom prst="ellipse">
+            <a:avLst/>
+          </a:prstGeom>
+          <a:solidFill>
+            <a:schemeClr val="accent4">
+              <a:lumMod val="75000"/>
+            </a:schemeClr>
+          </a:solidFill>
+          <a:ln>
+            <a:solidFill>
+              <a:schemeClr val="accent4">
+                <a:lumMod val="50000"/>
+              </a:schemeClr>
+            </a:solidFill>
+          </a:ln>
+        </p:spPr>
+        <p:style>
+          <a:lnRef idx="2">
+            <a:schemeClr val="accent1">
+              <a:shade val="50000"/>
+            </a:schemeClr>
+          </a:lnRef>
+          <a:fillRef idx="1">
+            <a:schemeClr val="accent1"/>
+          </a:fillRef>
+          <a:effectRef idx="0">
+            <a:schemeClr val="accent1"/>
+          </a:effectRef>
+          <a:fontRef idx="minor">
+            <a:schemeClr val="lt1"/>
+          </a:fontRef>
+        </p:style>
+        <p:txBody>
+          <a:bodyPr rtlCol="0" anchor="ctr"/>
+          <a:lstStyle/>
+          <a:p>
+            <a:pPr algn="ctr"/>
+            <a:endParaRPr lang="en-US" sz="1200" dirty="0"/>
+          </a:p>
+          <a:p>
+            <a:pPr algn="ctr"/>
+            <a:r>
+              <a:rPr lang="en-US" sz="1400" dirty="0">
+                <a:solidFill>
+                  <a:schemeClr val="bg1"/>
+                </a:solidFill>
+              </a:rPr>
+              <a:t>PlayerSelection.py</a:t>
+            </a:r>
+          </a:p>
+          <a:p>
+            <a:pPr algn="ctr"/>
+            <a:endParaRPr lang="en-US" dirty="0"/>
+          </a:p>
+        </p:txBody>
+      </p:sp>
+      <p:sp>
+        <p:nvSpPr>
+          <p:cNvPr id="60" name="TextBox 59">
+            <a:extLst>
+              <a:ext uri="{FF2B5EF4-FFF2-40B4-BE49-F238E27FC236}">
+                <a16:creationId xmlns:a16="http://schemas.microsoft.com/office/drawing/2014/main" id="{6E2E68D4-6739-E445-A5A7-9C77EB14D0C1}"/>
+              </a:ext>
+            </a:extLst>
+          </p:cNvPr>
+          <p:cNvSpPr txBox="1"/>
+          <p:nvPr/>
+        </p:nvSpPr>
+        <p:spPr>
+          <a:xfrm>
+            <a:off x="7021369" y="3580826"/>
+            <a:ext cx="5213436" cy="2923877"/>
+          </a:xfrm>
+          <a:prstGeom prst="rect">
+            <a:avLst/>
+          </a:prstGeom>
+          <a:noFill/>
+        </p:spPr>
+        <p:txBody>
+          <a:bodyPr wrap="square" rtlCol="0">
+            <a:spAutoFit/>
+          </a:bodyPr>
+          <a:lstStyle/>
+          <a:p>
+            <a:r>
+              <a:rPr lang="en-US" sz="1600" i="1" dirty="0" err="1">
+                <a:solidFill>
+                  <a:schemeClr val="accent6">
+                    <a:lumMod val="50000"/>
+                  </a:schemeClr>
+                </a:solidFill>
+              </a:rPr>
+              <a:t>pool_entry</a:t>
+            </a:r>
+            <a:r>
+              <a:rPr lang="en-US" sz="1600" i="1" dirty="0">
+                <a:solidFill>
+                  <a:schemeClr val="accent6">
+                    <a:lumMod val="50000"/>
+                  </a:schemeClr>
+                </a:solidFill>
+              </a:rPr>
+              <a:t> table;</a:t>
+            </a:r>
+            <a:endParaRPr lang="en-US" sz="1600" dirty="0">
+              <a:solidFill>
+                <a:schemeClr val="accent6">
+                  <a:lumMod val="50000"/>
+                </a:schemeClr>
+              </a:solidFill>
+            </a:endParaRPr>
+          </a:p>
+          <a:p>
+            <a:r>
+              <a:rPr lang="en-US" sz="1400" dirty="0">
+                <a:solidFill>
+                  <a:srgbClr val="FF0000"/>
+                </a:solidFill>
+              </a:rPr>
+              <a:t>PoolTeamName: [QuadSquad]</a:t>
+            </a:r>
+          </a:p>
+          <a:p>
+            <a:r>
+              <a:rPr lang="en-US" sz="1400" dirty="0">
+                <a:solidFill>
+                  <a:srgbClr val="FF0000"/>
+                </a:solidFill>
+              </a:rPr>
+              <a:t>GM: [GM Name]</a:t>
+            </a:r>
+          </a:p>
+          <a:p>
+            <a:r>
+              <a:rPr lang="en-US" sz="1400" dirty="0">
+                <a:solidFill>
+                  <a:srgbClr val="FF0000"/>
+                </a:solidFill>
+              </a:rPr>
+              <a:t>Email:</a:t>
+            </a:r>
+          </a:p>
+          <a:p>
+            <a:r>
+              <a:rPr lang="en-US" sz="1400" dirty="0">
+                <a:solidFill>
+                  <a:srgbClr val="FF0000"/>
+                </a:solidFill>
+              </a:rPr>
+              <a:t>Hometown:</a:t>
+            </a:r>
+          </a:p>
+          <a:p>
+            <a:r>
+              <a:rPr lang="en-US" sz="1400" dirty="0">
+                <a:solidFill>
+                  <a:srgbClr val="FF0000"/>
+                </a:solidFill>
+              </a:rPr>
+              <a:t>Country:</a:t>
+            </a:r>
+          </a:p>
+          <a:p>
+            <a:r>
+              <a:rPr lang="en-US" sz="1400" dirty="0">
+                <a:solidFill>
+                  <a:srgbClr val="FF0000"/>
+                </a:solidFill>
+              </a:rPr>
+              <a:t>Pay Status: [NotPaid, PayPal, Cheque, Cash, Coupon]</a:t>
+            </a:r>
+          </a:p>
+          <a:p>
+            <a:r>
+              <a:rPr lang="en-US" sz="1400" dirty="0">
+                <a:solidFill>
+                  <a:srgbClr val="FF0000"/>
+                </a:solidFill>
+              </a:rPr>
+              <a:t>Pay Amount: </a:t>
+            </a:r>
+          </a:p>
+          <a:p>
+            <a:r>
+              <a:rPr lang="en-US" sz="1400" dirty="0">
+                <a:solidFill>
+                  <a:srgbClr val="FF0000"/>
+                </a:solidFill>
+              </a:rPr>
+              <a:t>Status:  [Incomplete, complete]</a:t>
+            </a:r>
+          </a:p>
+          <a:p>
+            <a:r>
+              <a:rPr lang="en-US" sz="1400" dirty="0">
+                <a:solidFill>
+                  <a:srgbClr val="FF0000"/>
+                </a:solidFill>
+              </a:rPr>
+              <a:t>…  </a:t>
+            </a:r>
+          </a:p>
+          <a:p>
+            <a:endParaRPr lang="en-US" sz="1400" dirty="0">
+              <a:solidFill>
+                <a:srgbClr val="FF0000"/>
+              </a:solidFill>
+            </a:endParaRPr>
+          </a:p>
+          <a:p>
+            <a:r>
+              <a:rPr lang="en-US" sz="1400" dirty="0">
+                <a:solidFill>
+                  <a:srgbClr val="FF0000"/>
+                </a:solidFill>
+              </a:rPr>
+              <a:t>25* </a:t>
+            </a:r>
+          </a:p>
+          <a:p>
+            <a:r>
+              <a:rPr lang="en-US" sz="1400" dirty="0">
+                <a:solidFill>
+                  <a:srgbClr val="FF0000"/>
+                </a:solidFill>
+              </a:rPr>
+              <a:t>ID, Name, Team, G, A, W, SO, Pts, State</a:t>
+            </a:r>
+          </a:p>
+        </p:txBody>
+      </p:sp>
+      <p:sp>
+        <p:nvSpPr>
+          <p:cNvPr id="49" name="Oval 48">
+            <a:extLst>
+              <a:ext uri="{FF2B5EF4-FFF2-40B4-BE49-F238E27FC236}">
+                <a16:creationId xmlns:a16="http://schemas.microsoft.com/office/drawing/2014/main" id="{03A8D5E4-FFA6-4248-8C29-32D7B872CB27}"/>
+              </a:ext>
+            </a:extLst>
+          </p:cNvPr>
+          <p:cNvSpPr/>
+          <p:nvPr/>
+        </p:nvSpPr>
+        <p:spPr>
+          <a:xfrm>
+            <a:off x="4138550" y="174280"/>
+            <a:ext cx="2313566" cy="432881"/>
+          </a:xfrm>
+          <a:prstGeom prst="ellipse">
+            <a:avLst/>
+          </a:prstGeom>
+          <a:solidFill>
+            <a:schemeClr val="accent2">
+              <a:lumMod val="60000"/>
+              <a:lumOff val="40000"/>
+            </a:schemeClr>
+          </a:solidFill>
+          <a:ln>
+            <a:solidFill>
+              <a:schemeClr val="accent4">
+                <a:lumMod val="50000"/>
+              </a:schemeClr>
+            </a:solidFill>
+          </a:ln>
+        </p:spPr>
+        <p:style>
+          <a:lnRef idx="2">
+            <a:schemeClr val="accent1">
+              <a:shade val="50000"/>
+            </a:schemeClr>
+          </a:lnRef>
+          <a:fillRef idx="1">
+            <a:schemeClr val="accent1"/>
+          </a:fillRef>
+          <a:effectRef idx="0">
+            <a:schemeClr val="accent1"/>
+          </a:effectRef>
+          <a:fontRef idx="minor">
+            <a:schemeClr val="lt1"/>
+          </a:fontRef>
+        </p:style>
+        <p:txBody>
+          <a:bodyPr rtlCol="0" anchor="ctr"/>
+          <a:lstStyle/>
+          <a:p>
+            <a:pPr algn="ctr"/>
+            <a:endParaRPr lang="en-US" sz="1200" dirty="0"/>
+          </a:p>
+          <a:p>
+            <a:pPr algn="ctr"/>
+            <a:r>
+              <a:rPr lang="en-US" sz="1100" dirty="0">
+                <a:solidFill>
+                  <a:schemeClr val="bg1"/>
+                </a:solidFill>
+              </a:rPr>
+              <a:t>UpdateGoalieAssist.py</a:t>
+            </a:r>
+          </a:p>
+          <a:p>
+            <a:pPr algn="ctr"/>
+            <a:endParaRPr lang="en-US" dirty="0"/>
+          </a:p>
+        </p:txBody>
+      </p:sp>
+      <p:sp>
+        <p:nvSpPr>
+          <p:cNvPr id="62" name="Arc 61">
+            <a:extLst>
+              <a:ext uri="{FF2B5EF4-FFF2-40B4-BE49-F238E27FC236}">
+                <a16:creationId xmlns:a16="http://schemas.microsoft.com/office/drawing/2014/main" id="{D036EA86-FD2A-8D4C-B708-25AEF451A03F}"/>
+              </a:ext>
+            </a:extLst>
+          </p:cNvPr>
+          <p:cNvSpPr/>
+          <p:nvPr/>
+        </p:nvSpPr>
+        <p:spPr>
+          <a:xfrm>
+            <a:off x="5093204" y="464076"/>
+            <a:ext cx="2454646" cy="2494433"/>
+          </a:xfrm>
+          <a:prstGeom prst="arc">
+            <a:avLst>
+              <a:gd name="adj1" fmla="val 16476661"/>
+              <a:gd name="adj2" fmla="val 21383399"/>
+            </a:avLst>
+          </a:prstGeom>
+          <a:ln w="19050">
+            <a:headEnd type="none" w="med" len="med"/>
+            <a:tailEnd type="triangle" w="med" len="med"/>
+          </a:ln>
+        </p:spPr>
+        <p:style>
+          <a:lnRef idx="1">
+            <a:schemeClr val="accent1"/>
+          </a:lnRef>
+          <a:fillRef idx="0">
+            <a:schemeClr val="accent1"/>
+          </a:fillRef>
+          <a:effectRef idx="0">
+            <a:schemeClr val="accent1"/>
+          </a:effectRef>
+          <a:fontRef idx="minor">
+            <a:schemeClr val="tx1"/>
+          </a:fontRef>
+        </p:style>
+        <p:txBody>
+          <a:bodyPr rtlCol="0" anchor="ctr"/>
+          <a:lstStyle/>
+          <a:p>
+            <a:pPr algn="ctr"/>
+            <a:endParaRPr lang="en-US"/>
+          </a:p>
+        </p:txBody>
+      </p:sp>
+      <p:sp>
+        <p:nvSpPr>
+          <p:cNvPr id="63" name="Oval 62">
+            <a:extLst>
+              <a:ext uri="{FF2B5EF4-FFF2-40B4-BE49-F238E27FC236}">
+                <a16:creationId xmlns:a16="http://schemas.microsoft.com/office/drawing/2014/main" id="{F84548AE-C567-2E46-AFB2-552FEF3EDB1B}"/>
+              </a:ext>
+            </a:extLst>
+          </p:cNvPr>
+          <p:cNvSpPr/>
+          <p:nvPr/>
+        </p:nvSpPr>
+        <p:spPr>
+          <a:xfrm>
+            <a:off x="282506" y="2247923"/>
+            <a:ext cx="2163967" cy="432881"/>
+          </a:xfrm>
+          <a:prstGeom prst="ellipse">
+            <a:avLst/>
+          </a:prstGeom>
+          <a:solidFill>
+            <a:schemeClr val="accent4">
+              <a:lumMod val="75000"/>
+            </a:schemeClr>
+          </a:solidFill>
+          <a:ln>
+            <a:solidFill>
+              <a:schemeClr val="accent4">
+                <a:lumMod val="50000"/>
+              </a:schemeClr>
+            </a:solidFill>
+          </a:ln>
+        </p:spPr>
+        <p:style>
+          <a:lnRef idx="2">
+            <a:schemeClr val="accent1">
+              <a:shade val="50000"/>
+            </a:schemeClr>
+          </a:lnRef>
+          <a:fillRef idx="1">
+            <a:schemeClr val="accent1"/>
+          </a:fillRef>
+          <a:effectRef idx="0">
+            <a:schemeClr val="accent1"/>
+          </a:effectRef>
+          <a:fontRef idx="minor">
+            <a:schemeClr val="lt1"/>
+          </a:fontRef>
+        </p:style>
+        <p:txBody>
+          <a:bodyPr rtlCol="0" anchor="ctr"/>
+          <a:lstStyle/>
+          <a:p>
+            <a:pPr algn="ctr"/>
+            <a:endParaRPr lang="en-US" sz="1200" dirty="0"/>
+          </a:p>
+          <a:p>
+            <a:pPr algn="ctr"/>
+            <a:r>
+              <a:rPr lang="en-US" sz="1400" dirty="0" err="1">
+                <a:solidFill>
+                  <a:schemeClr val="bg1"/>
+                </a:solidFill>
+              </a:rPr>
+              <a:t>entryRegister.py</a:t>
+            </a:r>
+            <a:endParaRPr lang="en-US" sz="1400" dirty="0">
+              <a:solidFill>
+                <a:schemeClr val="bg1"/>
+              </a:solidFill>
+            </a:endParaRPr>
+          </a:p>
+          <a:p>
+            <a:pPr algn="ctr"/>
+            <a:endParaRPr lang="en-US" dirty="0"/>
+          </a:p>
+        </p:txBody>
+      </p:sp>
+      <p:grpSp>
+        <p:nvGrpSpPr>
+          <p:cNvPr id="66" name="Group 65">
+            <a:extLst>
+              <a:ext uri="{FF2B5EF4-FFF2-40B4-BE49-F238E27FC236}">
+                <a16:creationId xmlns:a16="http://schemas.microsoft.com/office/drawing/2014/main" id="{A3B48FC0-1E29-4546-8E64-7990E7388A61}"/>
+              </a:ext>
+            </a:extLst>
+          </p:cNvPr>
+          <p:cNvGrpSpPr/>
+          <p:nvPr/>
+        </p:nvGrpSpPr>
+        <p:grpSpPr>
+          <a:xfrm>
+            <a:off x="5051025" y="2315055"/>
+            <a:ext cx="1108954" cy="1410510"/>
+            <a:chOff x="7091463" y="3258766"/>
+            <a:chExt cx="1108954" cy="1410510"/>
+          </a:xfrm>
+        </p:grpSpPr>
+        <p:sp>
+          <p:nvSpPr>
+            <p:cNvPr id="67" name="Oval 66">
+              <a:extLst>
+                <a:ext uri="{FF2B5EF4-FFF2-40B4-BE49-F238E27FC236}">
+                  <a16:creationId xmlns:a16="http://schemas.microsoft.com/office/drawing/2014/main" id="{874C2BD9-6483-C746-B8EE-809D087F9701}"/>
+                </a:ext>
+              </a:extLst>
+            </p:cNvPr>
+            <p:cNvSpPr/>
+            <p:nvPr/>
+          </p:nvSpPr>
+          <p:spPr>
+            <a:xfrm>
+              <a:off x="7091464" y="3258766"/>
+              <a:ext cx="1108953" cy="321013"/>
+            </a:xfrm>
+            <a:prstGeom prst="ellipse">
+              <a:avLst/>
+            </a:prstGeom>
+            <a:solidFill>
+              <a:schemeClr val="accent2">
+                <a:lumMod val="60000"/>
+                <a:lumOff val="40000"/>
+              </a:schemeClr>
+            </a:solidFill>
+          </p:spPr>
+          <p:style>
+            <a:lnRef idx="2">
+              <a:schemeClr val="accent1">
+                <a:shade val="50000"/>
+              </a:schemeClr>
+            </a:lnRef>
+            <a:fillRef idx="1">
+              <a:schemeClr val="accent1"/>
+            </a:fillRef>
+            <a:effectRef idx="0">
+              <a:schemeClr val="accent1"/>
+            </a:effectRef>
+            <a:fontRef idx="minor">
+              <a:schemeClr val="lt1"/>
+            </a:fontRef>
+          </p:style>
+          <p:txBody>
+            <a:bodyPr rtlCol="0" anchor="ctr"/>
+            <a:lstStyle/>
+            <a:p>
+              <a:pPr algn="ctr"/>
+              <a:r>
+                <a:rPr lang="en-US" sz="1200" dirty="0" err="1">
+                  <a:solidFill>
+                    <a:schemeClr val="tx1"/>
+                  </a:solidFill>
+                </a:rPr>
+                <a:t>teamsDB</a:t>
+              </a:r>
+              <a:endParaRPr lang="en-US" sz="1200" dirty="0">
+                <a:solidFill>
+                  <a:schemeClr val="tx1"/>
+                </a:solidFill>
+              </a:endParaRPr>
+            </a:p>
+          </p:txBody>
+        </p:sp>
+        <p:cxnSp>
+          <p:nvCxnSpPr>
+            <p:cNvPr id="68" name="Straight Connector 67">
+              <a:extLst>
+                <a:ext uri="{FF2B5EF4-FFF2-40B4-BE49-F238E27FC236}">
+                  <a16:creationId xmlns:a16="http://schemas.microsoft.com/office/drawing/2014/main" id="{64659F4F-3497-9340-A703-C602150A7EDF}"/>
+                </a:ext>
+              </a:extLst>
+            </p:cNvPr>
+            <p:cNvCxnSpPr>
+              <a:stCxn id="67" idx="2"/>
+            </p:cNvCxnSpPr>
+            <p:nvPr/>
+          </p:nvCxnSpPr>
+          <p:spPr>
+            <a:xfrm>
+              <a:off x="7091464" y="3419273"/>
+              <a:ext cx="0" cy="1055450"/>
+            </a:xfrm>
+            <a:prstGeom prst="line">
+              <a:avLst/>
+            </a:prstGeom>
+            <a:ln w="12700"/>
+          </p:spPr>
+          <p:style>
+            <a:lnRef idx="1">
+              <a:schemeClr val="accent1"/>
+            </a:lnRef>
+            <a:fillRef idx="0">
+              <a:schemeClr val="accent1"/>
+            </a:fillRef>
+            <a:effectRef idx="0">
+              <a:schemeClr val="accent1"/>
+            </a:effectRef>
+            <a:fontRef idx="minor">
+              <a:schemeClr val="tx1"/>
+            </a:fontRef>
+          </p:style>
+        </p:cxnSp>
+        <p:cxnSp>
+          <p:nvCxnSpPr>
+            <p:cNvPr id="69" name="Straight Connector 68">
+              <a:extLst>
+                <a:ext uri="{FF2B5EF4-FFF2-40B4-BE49-F238E27FC236}">
+                  <a16:creationId xmlns:a16="http://schemas.microsoft.com/office/drawing/2014/main" id="{193B502D-0B3C-374B-ABA7-60970D47675D}"/>
+                </a:ext>
+              </a:extLst>
+            </p:cNvPr>
+            <p:cNvCxnSpPr/>
+            <p:nvPr/>
+          </p:nvCxnSpPr>
+          <p:spPr>
+            <a:xfrm>
+              <a:off x="8200417" y="3429000"/>
+              <a:ext cx="0" cy="1055450"/>
+            </a:xfrm>
+            <a:prstGeom prst="line">
+              <a:avLst/>
+            </a:prstGeom>
+            <a:ln w="12700"/>
+          </p:spPr>
+          <p:style>
+            <a:lnRef idx="1">
+              <a:schemeClr val="accent1"/>
+            </a:lnRef>
+            <a:fillRef idx="0">
+              <a:schemeClr val="accent1"/>
+            </a:fillRef>
+            <a:effectRef idx="0">
+              <a:schemeClr val="accent1"/>
+            </a:effectRef>
+            <a:fontRef idx="minor">
+              <a:schemeClr val="tx1"/>
+            </a:fontRef>
+          </p:style>
+        </p:cxnSp>
+        <p:sp>
+          <p:nvSpPr>
+            <p:cNvPr id="70" name="Oval 69">
+              <a:extLst>
+                <a:ext uri="{FF2B5EF4-FFF2-40B4-BE49-F238E27FC236}">
+                  <a16:creationId xmlns:a16="http://schemas.microsoft.com/office/drawing/2014/main" id="{197095D4-FF58-EF4C-8490-74E6B3A943E3}"/>
+                </a:ext>
+              </a:extLst>
+            </p:cNvPr>
+            <p:cNvSpPr/>
+            <p:nvPr/>
+          </p:nvSpPr>
+          <p:spPr>
+            <a:xfrm>
+              <a:off x="7091463" y="4348263"/>
+              <a:ext cx="1108953" cy="321013"/>
+            </a:xfrm>
+            <a:prstGeom prst="ellipse">
+              <a:avLst/>
+            </a:prstGeom>
+            <a:solidFill>
+              <a:schemeClr val="accent2">
+                <a:lumMod val="75000"/>
+              </a:schemeClr>
+            </a:solidFill>
+          </p:spPr>
+          <p:style>
+            <a:lnRef idx="2">
+              <a:schemeClr val="accent1">
+                <a:shade val="50000"/>
+              </a:schemeClr>
+            </a:lnRef>
+            <a:fillRef idx="1">
+              <a:schemeClr val="accent1"/>
+            </a:fillRef>
+            <a:effectRef idx="0">
+              <a:schemeClr val="accent1"/>
+            </a:effectRef>
+            <a:fontRef idx="minor">
+              <a:schemeClr val="lt1"/>
+            </a:fontRef>
+          </p:style>
+          <p:txBody>
+            <a:bodyPr rtlCol="0" anchor="ctr"/>
+            <a:lstStyle/>
+            <a:p>
+              <a:pPr algn="ctr"/>
+              <a:endParaRPr lang="en-US"/>
+            </a:p>
+          </p:txBody>
+        </p:sp>
+      </p:grpSp>
+      <p:sp>
+        <p:nvSpPr>
+          <p:cNvPr id="72" name="TextBox 71">
+            <a:extLst>
+              <a:ext uri="{FF2B5EF4-FFF2-40B4-BE49-F238E27FC236}">
+                <a16:creationId xmlns:a16="http://schemas.microsoft.com/office/drawing/2014/main" id="{B7362B68-67EA-5947-985C-666955371042}"/>
+              </a:ext>
+            </a:extLst>
+          </p:cNvPr>
+          <p:cNvSpPr txBox="1"/>
+          <p:nvPr/>
+        </p:nvSpPr>
+        <p:spPr>
+          <a:xfrm>
+            <a:off x="1776343" y="3745762"/>
+            <a:ext cx="3663028" cy="2062103"/>
+          </a:xfrm>
+          <a:prstGeom prst="rect">
+            <a:avLst/>
+          </a:prstGeom>
+          <a:noFill/>
+        </p:spPr>
+        <p:txBody>
+          <a:bodyPr wrap="square" rtlCol="0">
+            <a:spAutoFit/>
+          </a:bodyPr>
+          <a:lstStyle/>
+          <a:p>
+            <a:r>
+              <a:rPr lang="en-US" sz="1600" i="1" dirty="0">
+                <a:solidFill>
+                  <a:schemeClr val="accent6">
+                    <a:lumMod val="50000"/>
+                  </a:schemeClr>
+                </a:solidFill>
+              </a:rPr>
+              <a:t>teamsDB</a:t>
+            </a:r>
+            <a:r>
+              <a:rPr lang="en-US" sz="1600" dirty="0">
+                <a:solidFill>
+                  <a:schemeClr val="accent6">
+                    <a:lumMod val="50000"/>
+                  </a:schemeClr>
+                </a:solidFill>
+              </a:rPr>
+              <a:t>:</a:t>
+            </a:r>
+          </a:p>
+          <a:p>
+            <a:r>
+              <a:rPr lang="en-US" sz="1400" dirty="0">
+                <a:solidFill>
+                  <a:srgbClr val="FF0000"/>
+                </a:solidFill>
+              </a:rPr>
+              <a:t>team_id: [taken from NHL </a:t>
+            </a:r>
+            <a:r>
+              <a:rPr lang="en-US" sz="1400" dirty="0" err="1">
+                <a:solidFill>
+                  <a:srgbClr val="FF0000"/>
+                </a:solidFill>
+              </a:rPr>
+              <a:t>api</a:t>
+            </a:r>
+            <a:r>
+              <a:rPr lang="en-US" sz="1400" dirty="0">
+                <a:solidFill>
+                  <a:srgbClr val="FF0000"/>
+                </a:solidFill>
+              </a:rPr>
+              <a:t>]</a:t>
+            </a:r>
+          </a:p>
+          <a:p>
+            <a:r>
+              <a:rPr lang="en-US" sz="1400" dirty="0">
+                <a:solidFill>
+                  <a:srgbClr val="FF0000"/>
+                </a:solidFill>
+              </a:rPr>
+              <a:t>team_name: [NHL team name]</a:t>
+            </a:r>
+          </a:p>
+          <a:p>
+            <a:r>
+              <a:rPr lang="en-US" sz="1400" dirty="0">
+                <a:solidFill>
+                  <a:srgbClr val="FF0000"/>
+                </a:solidFill>
+              </a:rPr>
+              <a:t>status_id:  [0 = not qualified; </a:t>
+            </a:r>
+          </a:p>
+          <a:p>
+            <a:r>
+              <a:rPr lang="en-US" sz="1400" dirty="0">
+                <a:solidFill>
+                  <a:srgbClr val="FF0000"/>
+                </a:solidFill>
+              </a:rPr>
+              <a:t>	   1 = eliminated – 1</a:t>
+            </a:r>
+            <a:r>
+              <a:rPr lang="en-US" sz="1400" baseline="30000" dirty="0">
+                <a:solidFill>
+                  <a:srgbClr val="FF0000"/>
+                </a:solidFill>
+              </a:rPr>
+              <a:t>st</a:t>
+            </a:r>
+            <a:r>
+              <a:rPr lang="en-US" sz="1400" dirty="0">
+                <a:solidFill>
+                  <a:srgbClr val="FF0000"/>
+                </a:solidFill>
+              </a:rPr>
+              <a:t> </a:t>
+            </a:r>
+            <a:r>
+              <a:rPr lang="en-US" sz="1400" dirty="0" err="1">
+                <a:solidFill>
+                  <a:srgbClr val="FF0000"/>
+                </a:solidFill>
+              </a:rPr>
+              <a:t>rd</a:t>
+            </a:r>
+            <a:endParaRPr lang="en-US" sz="1400" dirty="0">
+              <a:solidFill>
+                <a:srgbClr val="FF0000"/>
+              </a:solidFill>
+            </a:endParaRPr>
+          </a:p>
+          <a:p>
+            <a:r>
+              <a:rPr lang="en-US" sz="1400" dirty="0">
+                <a:solidFill>
+                  <a:srgbClr val="FF0000"/>
+                </a:solidFill>
+              </a:rPr>
+              <a:t>	   2 = eliminated – 2</a:t>
+            </a:r>
+            <a:r>
+              <a:rPr lang="en-US" sz="1400" baseline="30000" dirty="0">
+                <a:solidFill>
+                  <a:srgbClr val="FF0000"/>
+                </a:solidFill>
+              </a:rPr>
+              <a:t>nd</a:t>
+            </a:r>
+            <a:r>
+              <a:rPr lang="en-US" sz="1400" dirty="0">
+                <a:solidFill>
+                  <a:srgbClr val="FF0000"/>
+                </a:solidFill>
+              </a:rPr>
+              <a:t> </a:t>
+            </a:r>
+            <a:r>
+              <a:rPr lang="en-US" sz="1400" dirty="0" err="1">
+                <a:solidFill>
+                  <a:srgbClr val="FF0000"/>
+                </a:solidFill>
+              </a:rPr>
+              <a:t>rd</a:t>
+            </a:r>
+            <a:endParaRPr lang="en-US" sz="1400" dirty="0">
+              <a:solidFill>
+                <a:srgbClr val="FF0000"/>
+              </a:solidFill>
+            </a:endParaRPr>
+          </a:p>
+          <a:p>
+            <a:r>
+              <a:rPr lang="en-US" sz="1400" dirty="0">
+                <a:solidFill>
+                  <a:srgbClr val="FF0000"/>
+                </a:solidFill>
+              </a:rPr>
+              <a:t>	   3 = eliminated – 3</a:t>
+            </a:r>
+            <a:r>
+              <a:rPr lang="en-US" sz="1400" baseline="30000" dirty="0">
+                <a:solidFill>
+                  <a:srgbClr val="FF0000"/>
+                </a:solidFill>
+              </a:rPr>
+              <a:t>rd</a:t>
+            </a:r>
+            <a:r>
+              <a:rPr lang="en-US" sz="1400" dirty="0">
+                <a:solidFill>
+                  <a:srgbClr val="FF0000"/>
+                </a:solidFill>
+              </a:rPr>
+              <a:t> </a:t>
+            </a:r>
+            <a:r>
+              <a:rPr lang="en-US" sz="1400" dirty="0" err="1">
+                <a:solidFill>
+                  <a:srgbClr val="FF0000"/>
+                </a:solidFill>
+              </a:rPr>
+              <a:t>rd</a:t>
+            </a:r>
+            <a:endParaRPr lang="en-US" sz="1400" dirty="0">
+              <a:solidFill>
+                <a:srgbClr val="FF0000"/>
+              </a:solidFill>
+            </a:endParaRPr>
+          </a:p>
+          <a:p>
+            <a:r>
+              <a:rPr lang="en-US" sz="1400" dirty="0">
+                <a:solidFill>
+                  <a:srgbClr val="FF0000"/>
+                </a:solidFill>
+              </a:rPr>
+              <a:t>	   4 = eliminated – 4</a:t>
+            </a:r>
+            <a:r>
+              <a:rPr lang="en-US" sz="1400" baseline="30000" dirty="0">
+                <a:solidFill>
+                  <a:srgbClr val="FF0000"/>
+                </a:solidFill>
+              </a:rPr>
+              <a:t>th</a:t>
+            </a:r>
+            <a:r>
+              <a:rPr lang="en-US" sz="1400" dirty="0">
+                <a:solidFill>
+                  <a:srgbClr val="FF0000"/>
+                </a:solidFill>
+              </a:rPr>
+              <a:t> </a:t>
+            </a:r>
+            <a:r>
+              <a:rPr lang="en-US" sz="1400" dirty="0" err="1">
+                <a:solidFill>
+                  <a:srgbClr val="FF0000"/>
+                </a:solidFill>
+              </a:rPr>
+              <a:t>rd</a:t>
+            </a:r>
+            <a:endParaRPr lang="en-US" sz="1400" dirty="0">
+              <a:solidFill>
+                <a:srgbClr val="FF0000"/>
+              </a:solidFill>
+            </a:endParaRPr>
+          </a:p>
+          <a:p>
+            <a:r>
+              <a:rPr lang="en-US" sz="1400" dirty="0">
+                <a:solidFill>
+                  <a:srgbClr val="FF0000"/>
+                </a:solidFill>
+              </a:rPr>
+              <a:t>	   5 = active]</a:t>
+            </a:r>
+          </a:p>
+        </p:txBody>
+      </p:sp>
+      <p:sp>
+        <p:nvSpPr>
+          <p:cNvPr id="3" name="Rectangle 2">
+            <a:extLst>
+              <a:ext uri="{FF2B5EF4-FFF2-40B4-BE49-F238E27FC236}">
+                <a16:creationId xmlns:a16="http://schemas.microsoft.com/office/drawing/2014/main" id="{DF026A85-7C08-B14F-AA1C-33DA507D996B}"/>
+              </a:ext>
+            </a:extLst>
+          </p:cNvPr>
+          <p:cNvSpPr/>
+          <p:nvPr/>
+        </p:nvSpPr>
+        <p:spPr>
+          <a:xfrm>
+            <a:off x="6853859" y="3605673"/>
+            <a:ext cx="4837472" cy="2665404"/>
+          </a:xfrm>
+          <a:prstGeom prst="rect">
+            <a:avLst/>
+          </a:prstGeom>
+          <a:noFill/>
+          <a:ln>
+            <a:solidFill>
+              <a:srgbClr val="C00000"/>
+            </a:solidFill>
+          </a:ln>
+        </p:spPr>
+        <p:style>
+          <a:lnRef idx="2">
+            <a:schemeClr val="accent1">
+              <a:shade val="50000"/>
+            </a:schemeClr>
+          </a:lnRef>
+          <a:fillRef idx="1">
+            <a:schemeClr val="accent1"/>
+          </a:fillRef>
+          <a:effectRef idx="0">
+            <a:schemeClr val="accent1"/>
+          </a:effectRef>
+          <a:fontRef idx="minor">
+            <a:schemeClr val="lt1"/>
+          </a:fontRef>
+        </p:style>
+        <p:txBody>
+          <a:bodyPr rtlCol="0" anchor="ctr"/>
+          <a:lstStyle/>
+          <a:p>
+            <a:pPr algn="ctr"/>
+            <a:endParaRPr lang="en-US"/>
+          </a:p>
+        </p:txBody>
+      </p:sp>
+      <p:sp>
+        <p:nvSpPr>
+          <p:cNvPr id="73" name="Rectangle 72">
+            <a:extLst>
+              <a:ext uri="{FF2B5EF4-FFF2-40B4-BE49-F238E27FC236}">
+                <a16:creationId xmlns:a16="http://schemas.microsoft.com/office/drawing/2014/main" id="{060F79C7-89B4-B34D-8E11-F0AD4B078599}"/>
+              </a:ext>
+            </a:extLst>
+          </p:cNvPr>
+          <p:cNvSpPr/>
+          <p:nvPr/>
+        </p:nvSpPr>
+        <p:spPr>
+          <a:xfrm>
+            <a:off x="1594238" y="3763075"/>
+            <a:ext cx="3449601" cy="2077527"/>
+          </a:xfrm>
+          <a:prstGeom prst="rect">
+            <a:avLst/>
+          </a:prstGeom>
+          <a:noFill/>
+          <a:ln>
+            <a:solidFill>
+              <a:srgbClr val="C00000"/>
+            </a:solidFill>
+          </a:ln>
+        </p:spPr>
+        <p:style>
+          <a:lnRef idx="2">
+            <a:schemeClr val="accent1">
+              <a:shade val="50000"/>
+            </a:schemeClr>
+          </a:lnRef>
+          <a:fillRef idx="1">
+            <a:schemeClr val="accent1"/>
+          </a:fillRef>
+          <a:effectRef idx="0">
+            <a:schemeClr val="accent1"/>
+          </a:effectRef>
+          <a:fontRef idx="minor">
+            <a:schemeClr val="lt1"/>
+          </a:fontRef>
+        </p:style>
+        <p:txBody>
+          <a:bodyPr rtlCol="0" anchor="ctr"/>
+          <a:lstStyle/>
+          <a:p>
+            <a:pPr algn="ctr"/>
+            <a:endParaRPr lang="en-US"/>
+          </a:p>
+        </p:txBody>
+      </p:sp>
+      <p:sp>
+        <p:nvSpPr>
+          <p:cNvPr id="75" name="Oval 74">
+            <a:extLst>
+              <a:ext uri="{FF2B5EF4-FFF2-40B4-BE49-F238E27FC236}">
+                <a16:creationId xmlns:a16="http://schemas.microsoft.com/office/drawing/2014/main" id="{50019371-EF4C-B343-8408-B7CFBE4C05AA}"/>
+              </a:ext>
+            </a:extLst>
+          </p:cNvPr>
+          <p:cNvSpPr/>
+          <p:nvPr/>
+        </p:nvSpPr>
+        <p:spPr>
+          <a:xfrm>
+            <a:off x="1994762" y="191593"/>
+            <a:ext cx="2163967" cy="432881"/>
+          </a:xfrm>
+          <a:prstGeom prst="ellipse">
+            <a:avLst/>
+          </a:prstGeom>
+          <a:solidFill>
+            <a:schemeClr val="accent2">
+              <a:lumMod val="60000"/>
+              <a:lumOff val="40000"/>
+            </a:schemeClr>
+          </a:solidFill>
+          <a:ln>
+            <a:solidFill>
+              <a:schemeClr val="accent4">
+                <a:lumMod val="50000"/>
+              </a:schemeClr>
+            </a:solidFill>
+          </a:ln>
+        </p:spPr>
+        <p:style>
+          <a:lnRef idx="2">
+            <a:schemeClr val="accent1">
+              <a:shade val="50000"/>
+            </a:schemeClr>
+          </a:lnRef>
+          <a:fillRef idx="1">
+            <a:schemeClr val="accent1"/>
+          </a:fillRef>
+          <a:effectRef idx="0">
+            <a:schemeClr val="accent1"/>
+          </a:effectRef>
+          <a:fontRef idx="minor">
+            <a:schemeClr val="lt1"/>
+          </a:fontRef>
+        </p:style>
+        <p:txBody>
+          <a:bodyPr rtlCol="0" anchor="ctr"/>
+          <a:lstStyle/>
+          <a:p>
+            <a:pPr algn="ctr"/>
+            <a:endParaRPr lang="en-US" sz="1200" dirty="0"/>
+          </a:p>
+          <a:p>
+            <a:pPr algn="ctr"/>
+            <a:r>
+              <a:rPr lang="en-US" sz="1100" dirty="0">
+                <a:solidFill>
+                  <a:schemeClr val="bg1"/>
+                </a:solidFill>
+              </a:rPr>
+              <a:t>UpdatePayment</a:t>
+            </a:r>
+          </a:p>
+          <a:p>
+            <a:pPr algn="ctr"/>
+            <a:endParaRPr lang="en-US" dirty="0"/>
+          </a:p>
+        </p:txBody>
+      </p:sp>
+      <p:sp>
+        <p:nvSpPr>
+          <p:cNvPr id="76" name="Oval 75">
+            <a:extLst>
+              <a:ext uri="{FF2B5EF4-FFF2-40B4-BE49-F238E27FC236}">
+                <a16:creationId xmlns:a16="http://schemas.microsoft.com/office/drawing/2014/main" id="{A4E1C507-C436-0B47-BF69-408879A76AFE}"/>
+              </a:ext>
+            </a:extLst>
+          </p:cNvPr>
+          <p:cNvSpPr/>
+          <p:nvPr/>
+        </p:nvSpPr>
+        <p:spPr>
+          <a:xfrm>
+            <a:off x="2838036" y="444295"/>
+            <a:ext cx="2278883" cy="432881"/>
+          </a:xfrm>
+          <a:prstGeom prst="ellipse">
+            <a:avLst/>
+          </a:prstGeom>
+          <a:solidFill>
+            <a:schemeClr val="accent2">
+              <a:lumMod val="60000"/>
+              <a:lumOff val="40000"/>
+            </a:schemeClr>
+          </a:solidFill>
+          <a:ln>
+            <a:solidFill>
+              <a:schemeClr val="accent4">
+                <a:lumMod val="50000"/>
+              </a:schemeClr>
+            </a:solidFill>
+          </a:ln>
+        </p:spPr>
+        <p:style>
+          <a:lnRef idx="2">
+            <a:schemeClr val="accent1">
+              <a:shade val="50000"/>
+            </a:schemeClr>
+          </a:lnRef>
+          <a:fillRef idx="1">
+            <a:schemeClr val="accent1"/>
+          </a:fillRef>
+          <a:effectRef idx="0">
+            <a:schemeClr val="accent1"/>
+          </a:effectRef>
+          <a:fontRef idx="minor">
+            <a:schemeClr val="lt1"/>
+          </a:fontRef>
+        </p:style>
+        <p:txBody>
+          <a:bodyPr rtlCol="0" anchor="ctr"/>
+          <a:lstStyle/>
+          <a:p>
+            <a:pPr algn="ctr"/>
+            <a:endParaRPr lang="en-US" sz="1200" dirty="0"/>
+          </a:p>
+          <a:p>
+            <a:pPr algn="ctr"/>
+            <a:r>
+              <a:rPr lang="en-US" sz="1100" dirty="0">
+                <a:solidFill>
+                  <a:schemeClr val="bg1"/>
+                </a:solidFill>
+              </a:rPr>
+              <a:t>TeamsUpdate.py</a:t>
+            </a:r>
+          </a:p>
+          <a:p>
+            <a:pPr algn="ctr"/>
+            <a:endParaRPr lang="en-US" dirty="0"/>
+          </a:p>
+        </p:txBody>
+      </p:sp>
+      <p:sp>
+        <p:nvSpPr>
+          <p:cNvPr id="77" name="Oval 76">
+            <a:extLst>
+              <a:ext uri="{FF2B5EF4-FFF2-40B4-BE49-F238E27FC236}">
+                <a16:creationId xmlns:a16="http://schemas.microsoft.com/office/drawing/2014/main" id="{38631806-EB7A-ED46-92F2-562EA7E3B36D}"/>
+              </a:ext>
+            </a:extLst>
+          </p:cNvPr>
+          <p:cNvSpPr/>
+          <p:nvPr/>
+        </p:nvSpPr>
+        <p:spPr>
+          <a:xfrm>
+            <a:off x="8135159" y="557618"/>
+            <a:ext cx="2163967" cy="432881"/>
+          </a:xfrm>
+          <a:prstGeom prst="ellipse">
+            <a:avLst/>
+          </a:prstGeom>
+          <a:solidFill>
+            <a:schemeClr val="accent4">
+              <a:lumMod val="75000"/>
+            </a:schemeClr>
+          </a:solidFill>
+          <a:ln>
+            <a:solidFill>
+              <a:schemeClr val="accent4">
+                <a:lumMod val="50000"/>
+              </a:schemeClr>
+            </a:solidFill>
+          </a:ln>
+        </p:spPr>
+        <p:style>
+          <a:lnRef idx="2">
+            <a:schemeClr val="accent1">
+              <a:shade val="50000"/>
+            </a:schemeClr>
+          </a:lnRef>
+          <a:fillRef idx="1">
+            <a:schemeClr val="accent1"/>
+          </a:fillRef>
+          <a:effectRef idx="0">
+            <a:schemeClr val="accent1"/>
+          </a:effectRef>
+          <a:fontRef idx="minor">
+            <a:schemeClr val="lt1"/>
+          </a:fontRef>
+        </p:style>
+        <p:txBody>
+          <a:bodyPr rtlCol="0" anchor="ctr"/>
+          <a:lstStyle/>
+          <a:p>
+            <a:pPr algn="ctr"/>
+            <a:endParaRPr lang="en-US" sz="1200" dirty="0"/>
+          </a:p>
+          <a:p>
+            <a:pPr algn="ctr"/>
+            <a:r>
+              <a:rPr lang="en-US" sz="1050" dirty="0">
+                <a:solidFill>
+                  <a:schemeClr val="bg1"/>
+                </a:solidFill>
+              </a:rPr>
+              <a:t>UpdatePlayerStatus.py</a:t>
+            </a:r>
+          </a:p>
+          <a:p>
+            <a:pPr algn="ctr"/>
+            <a:endParaRPr lang="en-US" dirty="0"/>
+          </a:p>
+        </p:txBody>
+      </p:sp>
+      <p:sp>
+        <p:nvSpPr>
+          <p:cNvPr id="24" name="Freeform 23">
+            <a:extLst>
+              <a:ext uri="{FF2B5EF4-FFF2-40B4-BE49-F238E27FC236}">
+                <a16:creationId xmlns:a16="http://schemas.microsoft.com/office/drawing/2014/main" id="{53DE8149-F815-AD45-9C20-3F38E0D2B1C8}"/>
+              </a:ext>
+            </a:extLst>
+          </p:cNvPr>
+          <p:cNvSpPr/>
+          <p:nvPr/>
+        </p:nvSpPr>
+        <p:spPr>
+          <a:xfrm>
+            <a:off x="5979333" y="1030977"/>
+            <a:ext cx="3154816" cy="2438864"/>
+          </a:xfrm>
+          <a:custGeom>
+            <a:avLst/>
+            <a:gdLst>
+              <a:gd name="connsiteX0" fmla="*/ 3203996 w 3203996"/>
+              <a:gd name="connsiteY0" fmla="*/ 0 h 1316576"/>
+              <a:gd name="connsiteX1" fmla="*/ 1896306 w 3203996"/>
+              <a:gd name="connsiteY1" fmla="*/ 1160206 h 1316576"/>
+              <a:gd name="connsiteX2" fmla="*/ 38009 w 3203996"/>
+              <a:gd name="connsiteY2" fmla="*/ 1238864 h 1316576"/>
+              <a:gd name="connsiteX3" fmla="*/ 824590 w 3203996"/>
+              <a:gd name="connsiteY3" fmla="*/ 540774 h 1316576"/>
+            </a:gdLst>
+            <a:ahLst/>
+            <a:cxnLst>
+              <a:cxn ang="0">
+                <a:pos x="connsiteX0" y="connsiteY0"/>
+              </a:cxn>
+              <a:cxn ang="0">
+                <a:pos x="connsiteX1" y="connsiteY1"/>
+              </a:cxn>
+              <a:cxn ang="0">
+                <a:pos x="connsiteX2" y="connsiteY2"/>
+              </a:cxn>
+              <a:cxn ang="0">
+                <a:pos x="connsiteX3" y="connsiteY3"/>
+              </a:cxn>
+            </a:cxnLst>
+            <a:rect l="l" t="t" r="r" b="b"/>
+            <a:pathLst>
+              <a:path w="3203996" h="1316576">
+                <a:moveTo>
+                  <a:pt x="3203996" y="0"/>
+                </a:moveTo>
+                <a:cubicBezTo>
+                  <a:pt x="2813983" y="476864"/>
+                  <a:pt x="2423970" y="953729"/>
+                  <a:pt x="1896306" y="1160206"/>
+                </a:cubicBezTo>
+                <a:cubicBezTo>
+                  <a:pt x="1368642" y="1366683"/>
+                  <a:pt x="216628" y="1342103"/>
+                  <a:pt x="38009" y="1238864"/>
+                </a:cubicBezTo>
+                <a:cubicBezTo>
+                  <a:pt x="-140610" y="1135625"/>
+                  <a:pt x="341990" y="838199"/>
+                  <a:pt x="824590" y="540774"/>
+                </a:cubicBezTo>
+              </a:path>
+            </a:pathLst>
+          </a:custGeom>
+          <a:noFill/>
+          <a:ln>
+            <a:headEnd type="none" w="med" len="med"/>
+            <a:tailEnd type="triangle" w="med" len="med"/>
+          </a:ln>
+        </p:spPr>
+        <p:style>
+          <a:lnRef idx="2">
+            <a:schemeClr val="accent1">
+              <a:shade val="50000"/>
+            </a:schemeClr>
+          </a:lnRef>
+          <a:fillRef idx="1">
+            <a:schemeClr val="accent1"/>
+          </a:fillRef>
+          <a:effectRef idx="0">
+            <a:schemeClr val="accent1"/>
+          </a:effectRef>
+          <a:fontRef idx="minor">
+            <a:schemeClr val="lt1"/>
+          </a:fontRef>
+        </p:style>
+        <p:txBody>
+          <a:bodyPr rtlCol="0" anchor="ctr"/>
+          <a:lstStyle/>
+          <a:p>
+            <a:pPr algn="ctr"/>
+            <a:endParaRPr lang="en-US"/>
+          </a:p>
+        </p:txBody>
+      </p:sp>
+      <p:sp>
+        <p:nvSpPr>
+          <p:cNvPr id="8" name="Oval 7">
+            <a:extLst>
+              <a:ext uri="{FF2B5EF4-FFF2-40B4-BE49-F238E27FC236}">
+                <a16:creationId xmlns:a16="http://schemas.microsoft.com/office/drawing/2014/main" id="{0CF7FAF7-E620-BE47-B41E-1182D2321F4A}"/>
+              </a:ext>
+            </a:extLst>
+          </p:cNvPr>
+          <p:cNvSpPr/>
+          <p:nvPr/>
+        </p:nvSpPr>
+        <p:spPr>
+          <a:xfrm>
+            <a:off x="8146060" y="1108354"/>
+            <a:ext cx="2074537" cy="432881"/>
+          </a:xfrm>
+          <a:prstGeom prst="ellipse">
+            <a:avLst/>
+          </a:prstGeom>
+          <a:solidFill>
+            <a:schemeClr val="accent4">
+              <a:lumMod val="75000"/>
+            </a:schemeClr>
+          </a:solidFill>
+          <a:ln>
+            <a:solidFill>
+              <a:schemeClr val="accent4">
+                <a:lumMod val="50000"/>
+              </a:schemeClr>
+            </a:solidFill>
+          </a:ln>
+        </p:spPr>
+        <p:style>
+          <a:lnRef idx="2">
+            <a:schemeClr val="accent1">
+              <a:shade val="50000"/>
+            </a:schemeClr>
+          </a:lnRef>
+          <a:fillRef idx="1">
+            <a:schemeClr val="accent1"/>
+          </a:fillRef>
+          <a:effectRef idx="0">
+            <a:schemeClr val="accent1"/>
+          </a:effectRef>
+          <a:fontRef idx="minor">
+            <a:schemeClr val="lt1"/>
+          </a:fontRef>
+        </p:style>
+        <p:txBody>
+          <a:bodyPr rtlCol="0" anchor="ctr"/>
+          <a:lstStyle/>
+          <a:p>
+            <a:pPr algn="ctr"/>
+            <a:endParaRPr lang="en-US" sz="1200" dirty="0"/>
+          </a:p>
+          <a:p>
+            <a:pPr algn="ctr"/>
+            <a:r>
+              <a:rPr lang="en-US" sz="1400" dirty="0">
+                <a:solidFill>
+                  <a:schemeClr val="accent6">
+                    <a:lumMod val="50000"/>
+                  </a:schemeClr>
+                </a:solidFill>
+              </a:rPr>
+              <a:t>PlayersUpdate.py</a:t>
+            </a:r>
+          </a:p>
+          <a:p>
+            <a:pPr algn="ctr"/>
+            <a:endParaRPr lang="en-US" dirty="0"/>
+          </a:p>
+        </p:txBody>
+      </p:sp>
+      <p:sp>
+        <p:nvSpPr>
+          <p:cNvPr id="28" name="TextBox 27">
+            <a:extLst>
+              <a:ext uri="{FF2B5EF4-FFF2-40B4-BE49-F238E27FC236}">
+                <a16:creationId xmlns:a16="http://schemas.microsoft.com/office/drawing/2014/main" id="{415673DB-B932-0B40-BD99-026601981078}"/>
+              </a:ext>
+            </a:extLst>
+          </p:cNvPr>
+          <p:cNvSpPr txBox="1"/>
+          <p:nvPr/>
+        </p:nvSpPr>
+        <p:spPr>
+          <a:xfrm>
+            <a:off x="8625322" y="254768"/>
+            <a:ext cx="1116011" cy="246221"/>
+          </a:xfrm>
+          <a:prstGeom prst="rect">
+            <a:avLst/>
+          </a:prstGeom>
+          <a:noFill/>
+        </p:spPr>
+        <p:txBody>
+          <a:bodyPr wrap="none" rtlCol="0">
+            <a:spAutoFit/>
+          </a:bodyPr>
+          <a:lstStyle/>
+          <a:p>
+            <a:r>
+              <a:rPr lang="en-US" sz="1000" dirty="0"/>
+              <a:t>maintainPlayerDB</a:t>
+            </a:r>
+          </a:p>
+        </p:txBody>
+      </p:sp>
+      <p:sp>
+        <p:nvSpPr>
+          <p:cNvPr id="30" name="Left Brace 29">
+            <a:extLst>
+              <a:ext uri="{FF2B5EF4-FFF2-40B4-BE49-F238E27FC236}">
+                <a16:creationId xmlns:a16="http://schemas.microsoft.com/office/drawing/2014/main" id="{0EF15CB1-AB21-4C4E-B2FE-635329A4F3C6}"/>
+              </a:ext>
+            </a:extLst>
+          </p:cNvPr>
+          <p:cNvSpPr/>
+          <p:nvPr/>
+        </p:nvSpPr>
+        <p:spPr>
+          <a:xfrm>
+            <a:off x="6755250" y="4050890"/>
+            <a:ext cx="304311" cy="1559692"/>
+          </a:xfrm>
+          <a:prstGeom prst="leftBrace">
+            <a:avLst/>
+          </a:prstGeom>
+          <a:ln w="28575"/>
+        </p:spPr>
+        <p:style>
+          <a:lnRef idx="1">
+            <a:schemeClr val="accent1"/>
+          </a:lnRef>
+          <a:fillRef idx="0">
+            <a:schemeClr val="accent1"/>
+          </a:fillRef>
+          <a:effectRef idx="0">
+            <a:schemeClr val="accent1"/>
+          </a:effectRef>
+          <a:fontRef idx="minor">
+            <a:schemeClr val="tx1"/>
+          </a:fontRef>
+        </p:style>
+        <p:txBody>
+          <a:bodyPr rtlCol="0" anchor="ctr"/>
+          <a:lstStyle/>
+          <a:p>
+            <a:pPr algn="ctr"/>
+            <a:endParaRPr lang="en-US"/>
+          </a:p>
+        </p:txBody>
+      </p:sp>
+      <p:sp>
+        <p:nvSpPr>
+          <p:cNvPr id="31" name="TextBox 30">
+            <a:extLst>
+              <a:ext uri="{FF2B5EF4-FFF2-40B4-BE49-F238E27FC236}">
+                <a16:creationId xmlns:a16="http://schemas.microsoft.com/office/drawing/2014/main" id="{02E31234-BFB0-B144-A5BE-33DE8D19A758}"/>
+              </a:ext>
+            </a:extLst>
+          </p:cNvPr>
+          <p:cNvSpPr txBox="1"/>
+          <p:nvPr/>
+        </p:nvSpPr>
+        <p:spPr>
+          <a:xfrm>
+            <a:off x="5988849" y="4731990"/>
+            <a:ext cx="831089" cy="230832"/>
+          </a:xfrm>
+          <a:prstGeom prst="rect">
+            <a:avLst/>
+          </a:prstGeom>
+          <a:noFill/>
+        </p:spPr>
+        <p:txBody>
+          <a:bodyPr wrap="square" rtlCol="0">
+            <a:spAutoFit/>
+          </a:bodyPr>
+          <a:lstStyle/>
+          <a:p>
+            <a:r>
+              <a:rPr lang="en-US" sz="900" dirty="0" err="1"/>
+              <a:t>pool_entry</a:t>
+            </a:r>
+            <a:endParaRPr lang="en-US" sz="900" dirty="0"/>
+          </a:p>
+        </p:txBody>
+      </p:sp>
+      <p:sp>
+        <p:nvSpPr>
+          <p:cNvPr id="80" name="Left Brace 79">
+            <a:extLst>
+              <a:ext uri="{FF2B5EF4-FFF2-40B4-BE49-F238E27FC236}">
+                <a16:creationId xmlns:a16="http://schemas.microsoft.com/office/drawing/2014/main" id="{F75D39F8-E96C-6842-B0E6-2EBD440FBB42}"/>
+              </a:ext>
+            </a:extLst>
+          </p:cNvPr>
+          <p:cNvSpPr/>
+          <p:nvPr/>
+        </p:nvSpPr>
+        <p:spPr>
+          <a:xfrm>
+            <a:off x="6769919" y="5755730"/>
+            <a:ext cx="304311" cy="552094"/>
+          </a:xfrm>
+          <a:prstGeom prst="leftBrace">
+            <a:avLst/>
+          </a:prstGeom>
+          <a:ln w="28575"/>
+        </p:spPr>
+        <p:style>
+          <a:lnRef idx="1">
+            <a:schemeClr val="accent1"/>
+          </a:lnRef>
+          <a:fillRef idx="0">
+            <a:schemeClr val="accent1"/>
+          </a:fillRef>
+          <a:effectRef idx="0">
+            <a:schemeClr val="accent1"/>
+          </a:effectRef>
+          <a:fontRef idx="minor">
+            <a:schemeClr val="tx1"/>
+          </a:fontRef>
+        </p:style>
+        <p:txBody>
+          <a:bodyPr rtlCol="0" anchor="ctr"/>
+          <a:lstStyle/>
+          <a:p>
+            <a:pPr algn="ctr"/>
+            <a:endParaRPr lang="en-US"/>
+          </a:p>
+        </p:txBody>
+      </p:sp>
+      <p:sp>
+        <p:nvSpPr>
+          <p:cNvPr id="81" name="TextBox 80">
+            <a:extLst>
+              <a:ext uri="{FF2B5EF4-FFF2-40B4-BE49-F238E27FC236}">
+                <a16:creationId xmlns:a16="http://schemas.microsoft.com/office/drawing/2014/main" id="{E2FC7433-E22B-AE43-9EA4-F260EDAD1F45}"/>
+              </a:ext>
+            </a:extLst>
+          </p:cNvPr>
+          <p:cNvSpPr txBox="1"/>
+          <p:nvPr/>
+        </p:nvSpPr>
+        <p:spPr>
+          <a:xfrm>
+            <a:off x="6091031" y="5916361"/>
+            <a:ext cx="728907" cy="230832"/>
+          </a:xfrm>
+          <a:prstGeom prst="rect">
+            <a:avLst/>
+          </a:prstGeom>
+          <a:noFill/>
+        </p:spPr>
+        <p:txBody>
+          <a:bodyPr wrap="square" rtlCol="0">
+            <a:spAutoFit/>
+          </a:bodyPr>
+          <a:lstStyle/>
+          <a:p>
+            <a:r>
+              <a:rPr lang="en-US" sz="900" dirty="0" err="1"/>
+              <a:t>pool_team</a:t>
+            </a:r>
+            <a:endParaRPr lang="en-US" sz="900" dirty="0"/>
+          </a:p>
+        </p:txBody>
+      </p:sp>
+      <p:sp>
+        <p:nvSpPr>
+          <p:cNvPr id="23" name="Snip and Round Single Corner Rectangle 22">
+            <a:extLst>
+              <a:ext uri="{FF2B5EF4-FFF2-40B4-BE49-F238E27FC236}">
+                <a16:creationId xmlns:a16="http://schemas.microsoft.com/office/drawing/2014/main" id="{AFFC5995-CA2F-7549-B1C7-191C994CC3E7}"/>
+              </a:ext>
+            </a:extLst>
+          </p:cNvPr>
+          <p:cNvSpPr/>
+          <p:nvPr/>
+        </p:nvSpPr>
+        <p:spPr>
+          <a:xfrm>
+            <a:off x="2712719" y="2247923"/>
+            <a:ext cx="606709" cy="531755"/>
+          </a:xfrm>
+          <a:prstGeom prst="snipRoundRect">
+            <a:avLst/>
+          </a:prstGeom>
+        </p:spPr>
+        <p:style>
+          <a:lnRef idx="2">
+            <a:schemeClr val="accent1">
+              <a:shade val="50000"/>
+            </a:schemeClr>
+          </a:lnRef>
+          <a:fillRef idx="1">
+            <a:schemeClr val="accent1"/>
+          </a:fillRef>
+          <a:effectRef idx="0">
+            <a:schemeClr val="accent1"/>
+          </a:effectRef>
+          <a:fontRef idx="minor">
+            <a:schemeClr val="lt1"/>
+          </a:fontRef>
+        </p:style>
+        <p:txBody>
+          <a:bodyPr rtlCol="0" anchor="ctr"/>
+          <a:lstStyle/>
+          <a:p>
+            <a:pPr algn="ctr"/>
+            <a:r>
+              <a:rPr lang="en-US" sz="800" dirty="0"/>
+              <a:t>Pool_</a:t>
+            </a:r>
+          </a:p>
+          <a:p>
+            <a:pPr algn="ctr"/>
+            <a:r>
+              <a:rPr lang="en-US" sz="800" dirty="0"/>
+              <a:t>entry</a:t>
+            </a:r>
+          </a:p>
+        </p:txBody>
+      </p:sp>
+      <p:sp>
+        <p:nvSpPr>
+          <p:cNvPr id="55" name="Snip and Round Single Corner Rectangle 54">
+            <a:extLst>
+              <a:ext uri="{FF2B5EF4-FFF2-40B4-BE49-F238E27FC236}">
+                <a16:creationId xmlns:a16="http://schemas.microsoft.com/office/drawing/2014/main" id="{4F78ECCA-9F78-5443-B9B8-7E83853A61F4}"/>
+              </a:ext>
+            </a:extLst>
+          </p:cNvPr>
+          <p:cNvSpPr/>
+          <p:nvPr/>
+        </p:nvSpPr>
+        <p:spPr>
+          <a:xfrm>
+            <a:off x="2711359" y="2894477"/>
+            <a:ext cx="583451" cy="531755"/>
+          </a:xfrm>
+          <a:prstGeom prst="snipRoundRect">
+            <a:avLst/>
+          </a:prstGeom>
+        </p:spPr>
+        <p:style>
+          <a:lnRef idx="2">
+            <a:schemeClr val="accent1">
+              <a:shade val="50000"/>
+            </a:schemeClr>
+          </a:lnRef>
+          <a:fillRef idx="1">
+            <a:schemeClr val="accent1"/>
+          </a:fillRef>
+          <a:effectRef idx="0">
+            <a:schemeClr val="accent1"/>
+          </a:effectRef>
+          <a:fontRef idx="minor">
+            <a:schemeClr val="lt1"/>
+          </a:fontRef>
+        </p:style>
+        <p:txBody>
+          <a:bodyPr rtlCol="0" anchor="ctr"/>
+          <a:lstStyle/>
+          <a:p>
+            <a:pPr algn="ctr"/>
+            <a:r>
+              <a:rPr lang="en-US" sz="800" dirty="0"/>
+              <a:t>entry_</a:t>
+            </a:r>
+          </a:p>
+          <a:p>
+            <a:pPr algn="ctr"/>
+            <a:r>
+              <a:rPr lang="en-US" sz="800" dirty="0"/>
+              <a:t>players</a:t>
+            </a:r>
+          </a:p>
+        </p:txBody>
+      </p:sp>
+      <p:cxnSp>
+        <p:nvCxnSpPr>
+          <p:cNvPr id="29" name="Straight Arrow Connector 28">
+            <a:extLst>
+              <a:ext uri="{FF2B5EF4-FFF2-40B4-BE49-F238E27FC236}">
+                <a16:creationId xmlns:a16="http://schemas.microsoft.com/office/drawing/2014/main" id="{E5B9E9D2-47FC-DE45-8542-11AACD72336B}"/>
+              </a:ext>
+            </a:extLst>
+          </p:cNvPr>
+          <p:cNvCxnSpPr>
+            <a:stCxn id="63" idx="6"/>
+            <a:endCxn id="23" idx="2"/>
+          </p:cNvCxnSpPr>
+          <p:nvPr/>
+        </p:nvCxnSpPr>
+        <p:spPr>
+          <a:xfrm>
+            <a:off x="2446473" y="2464364"/>
+            <a:ext cx="266246" cy="49437"/>
+          </a:xfrm>
+          <a:prstGeom prst="straightConnector1">
+            <a:avLst/>
+          </a:prstGeom>
+          <a:ln>
+            <a:tailEnd type="triangle"/>
+          </a:ln>
+        </p:spPr>
+        <p:style>
+          <a:lnRef idx="1">
+            <a:schemeClr val="accent1"/>
+          </a:lnRef>
+          <a:fillRef idx="0">
+            <a:schemeClr val="accent1"/>
+          </a:fillRef>
+          <a:effectRef idx="0">
+            <a:schemeClr val="accent1"/>
+          </a:effectRef>
+          <a:fontRef idx="minor">
+            <a:schemeClr val="tx1"/>
+          </a:fontRef>
+        </p:style>
+      </p:cxnSp>
+      <p:cxnSp>
+        <p:nvCxnSpPr>
+          <p:cNvPr id="58" name="Straight Arrow Connector 57">
+            <a:extLst>
+              <a:ext uri="{FF2B5EF4-FFF2-40B4-BE49-F238E27FC236}">
+                <a16:creationId xmlns:a16="http://schemas.microsoft.com/office/drawing/2014/main" id="{B4EE315F-FF7D-1D4D-8472-CDF085706015}"/>
+              </a:ext>
+            </a:extLst>
+          </p:cNvPr>
+          <p:cNvCxnSpPr/>
+          <p:nvPr/>
+        </p:nvCxnSpPr>
+        <p:spPr>
+          <a:xfrm>
+            <a:off x="2461549" y="3117317"/>
+            <a:ext cx="266246" cy="49437"/>
+          </a:xfrm>
+          <a:prstGeom prst="straightConnector1">
+            <a:avLst/>
+          </a:prstGeom>
+          <a:ln>
+            <a:tailEnd type="triangle"/>
+          </a:ln>
+        </p:spPr>
+        <p:style>
+          <a:lnRef idx="1">
+            <a:schemeClr val="accent1"/>
+          </a:lnRef>
+          <a:fillRef idx="0">
+            <a:schemeClr val="accent1"/>
+          </a:fillRef>
+          <a:effectRef idx="0">
+            <a:schemeClr val="accent1"/>
+          </a:effectRef>
+          <a:fontRef idx="minor">
+            <a:schemeClr val="tx1"/>
+          </a:fontRef>
+        </p:style>
+      </p:cxnSp>
+      <p:sp>
+        <p:nvSpPr>
+          <p:cNvPr id="32" name="TextBox 31">
+            <a:extLst>
+              <a:ext uri="{FF2B5EF4-FFF2-40B4-BE49-F238E27FC236}">
+                <a16:creationId xmlns:a16="http://schemas.microsoft.com/office/drawing/2014/main" id="{D6E2B5DF-6B41-0140-936E-838350CF863F}"/>
+              </a:ext>
+            </a:extLst>
+          </p:cNvPr>
+          <p:cNvSpPr txBox="1"/>
+          <p:nvPr/>
+        </p:nvSpPr>
+        <p:spPr>
+          <a:xfrm>
+            <a:off x="3465996" y="2040314"/>
+            <a:ext cx="1249680" cy="276999"/>
+          </a:xfrm>
+          <a:prstGeom prst="rect">
+            <a:avLst/>
+          </a:prstGeom>
+          <a:noFill/>
+        </p:spPr>
+        <p:txBody>
+          <a:bodyPr wrap="square" rtlCol="0">
+            <a:spAutoFit/>
+          </a:bodyPr>
+          <a:lstStyle/>
+          <a:p>
+            <a:r>
+              <a:rPr lang="en-US" sz="1200" dirty="0">
+                <a:solidFill>
+                  <a:schemeClr val="accent1"/>
+                </a:solidFill>
+              </a:rPr>
+              <a:t>active, updating</a:t>
+            </a:r>
+          </a:p>
+        </p:txBody>
+      </p:sp>
+      <p:sp>
+        <p:nvSpPr>
+          <p:cNvPr id="36" name="Rectangle 35">
+            <a:extLst>
+              <a:ext uri="{FF2B5EF4-FFF2-40B4-BE49-F238E27FC236}">
+                <a16:creationId xmlns:a16="http://schemas.microsoft.com/office/drawing/2014/main" id="{13F77FA5-A8D3-5B4B-8273-58CA5B2F730B}"/>
+              </a:ext>
+            </a:extLst>
+          </p:cNvPr>
+          <p:cNvSpPr/>
+          <p:nvPr/>
+        </p:nvSpPr>
+        <p:spPr>
+          <a:xfrm>
+            <a:off x="5116919" y="2779678"/>
+            <a:ext cx="974112" cy="505268"/>
+          </a:xfrm>
+          <a:prstGeom prst="rect">
+            <a:avLst/>
+          </a:prstGeom>
+          <a:solidFill>
+            <a:schemeClr val="accent2">
+              <a:lumMod val="50000"/>
+            </a:schemeClr>
+          </a:solidFill>
+        </p:spPr>
+        <p:style>
+          <a:lnRef idx="2">
+            <a:schemeClr val="accent1">
+              <a:shade val="50000"/>
+            </a:schemeClr>
+          </a:lnRef>
+          <a:fillRef idx="1">
+            <a:schemeClr val="accent1"/>
+          </a:fillRef>
+          <a:effectRef idx="0">
+            <a:schemeClr val="accent1"/>
+          </a:effectRef>
+          <a:fontRef idx="minor">
+            <a:schemeClr val="lt1"/>
+          </a:fontRef>
+        </p:style>
+        <p:txBody>
+          <a:bodyPr rtlCol="0" anchor="ctr"/>
+          <a:lstStyle/>
+          <a:p>
+            <a:pPr algn="ctr"/>
+            <a:r>
+              <a:rPr lang="en-US" dirty="0"/>
+              <a:t>teams</a:t>
+            </a:r>
+          </a:p>
+        </p:txBody>
+      </p:sp>
+      <p:sp>
+        <p:nvSpPr>
+          <p:cNvPr id="84" name="Arc 83">
+            <a:extLst>
+              <a:ext uri="{FF2B5EF4-FFF2-40B4-BE49-F238E27FC236}">
+                <a16:creationId xmlns:a16="http://schemas.microsoft.com/office/drawing/2014/main" id="{EED2F484-14A4-1C47-9B67-5F25A40EEA99}"/>
+              </a:ext>
+            </a:extLst>
+          </p:cNvPr>
+          <p:cNvSpPr/>
+          <p:nvPr/>
+        </p:nvSpPr>
+        <p:spPr>
+          <a:xfrm>
+            <a:off x="4247128" y="1494422"/>
+            <a:ext cx="3615415" cy="536002"/>
+          </a:xfrm>
+          <a:prstGeom prst="arc">
+            <a:avLst>
+              <a:gd name="adj1" fmla="val 10863840"/>
+              <a:gd name="adj2" fmla="val 0"/>
+            </a:avLst>
+          </a:prstGeom>
+          <a:ln w="19050">
+            <a:headEnd type="triangle" w="med" len="med"/>
+            <a:tailEnd type="none" w="med" len="med"/>
+          </a:ln>
+        </p:spPr>
+        <p:style>
+          <a:lnRef idx="1">
+            <a:schemeClr val="accent1"/>
+          </a:lnRef>
+          <a:fillRef idx="0">
+            <a:schemeClr val="accent1"/>
+          </a:fillRef>
+          <a:effectRef idx="0">
+            <a:schemeClr val="accent1"/>
+          </a:effectRef>
+          <a:fontRef idx="minor">
+            <a:schemeClr val="tx1"/>
+          </a:fontRef>
+        </p:style>
+        <p:txBody>
+          <a:bodyPr rtlCol="0" anchor="ctr"/>
+          <a:lstStyle/>
+          <a:p>
+            <a:pPr algn="ctr"/>
+            <a:endParaRPr lang="en-US"/>
+          </a:p>
+        </p:txBody>
+      </p:sp>
+    </p:spTree>
+    <p:extLst>
+      <p:ext uri="{BB962C8B-B14F-4D97-AF65-F5344CB8AC3E}">
+        <p14:creationId xmlns:p14="http://schemas.microsoft.com/office/powerpoint/2010/main" val="235970579"/>
+      </p:ext>
+    </p:extLst>
+  </p:cSld>
+  <p:clrMapOvr>
+    <a:masterClrMapping/>
+  </p:clrMapOvr>
+</p:sld>
+</file>
+
+<file path=ppt/slides/slide3.xml><?xml version="1.0" encoding="utf-8"?>
+<p:sld xmlns:a="http://schemas.openxmlformats.org/drawingml/2006/main" xmlns:r="http://schemas.openxmlformats.org/officeDocument/2006/relationships" xmlns:p="http://schemas.openxmlformats.org/presentationml/2006/main">
+  <p:cSld>
+    <p:spTree>
+      <p:nvGrpSpPr>
+        <p:cNvPr id="1" name=""/>
+        <p:cNvGrpSpPr/>
+        <p:nvPr/>
+      </p:nvGrpSpPr>
+      <p:grpSpPr>
+        <a:xfrm>
+          <a:off x="0" y="0"/>
+          <a:ext cx="0" cy="0"/>
+          <a:chOff x="0" y="0"/>
+          <a:chExt cx="0" cy="0"/>
+        </a:xfrm>
+      </p:grpSpPr>
+      <p:sp>
+        <p:nvSpPr>
           <p:cNvPr id="2" name="TextBox 1">
             <a:extLst>
               <a:ext uri="{FF2B5EF4-FFF2-40B4-BE49-F238E27FC236}">
@@ -7991,7 +11207,7 @@
 </p:sld>
 </file>
 
-<file path=ppt/slides/slide3.xml><?xml version="1.0" encoding="utf-8"?>
+<file path=ppt/slides/slide4.xml><?xml version="1.0" encoding="utf-8"?>
 <p:sld xmlns:a="http://schemas.openxmlformats.org/drawingml/2006/main" xmlns:r="http://schemas.openxmlformats.org/officeDocument/2006/relationships" xmlns:p="http://schemas.openxmlformats.org/presentationml/2006/main">
   <p:cSld>
     <p:spTree>

</xml_diff>